<commit_message>
final ptt reconstruction done up to sldie 10
</commit_message>
<xml_diff>
--- a/Final presentation.pptx
+++ b/Final presentation.pptx
@@ -4,6 +4,9 @@
   <p:sldMasterIdLst>
     <p:sldMasterId id="2147483648" r:id="rId1"/>
   </p:sldMasterIdLst>
+  <p:notesMasterIdLst>
+    <p:notesMasterId r:id="rId46"/>
+  </p:notesMasterIdLst>
   <p:sldIdLst>
     <p:sldId id="256" r:id="rId2"/>
     <p:sldId id="257" r:id="rId3"/>
@@ -155,6 +158,870 @@
 </p:presentation>
 </file>
 
+<file path=ppt/notesMasters/notesMaster1.xml><?xml version="1.0" encoding="utf-8"?>
+<p:notesMaster xmlns:a="http://schemas.openxmlformats.org/drawingml/2006/main" xmlns:r="http://schemas.openxmlformats.org/officeDocument/2006/relationships" xmlns:p="http://schemas.openxmlformats.org/presentationml/2006/main">
+  <p:cSld>
+    <p:bg>
+      <p:bgRef idx="1001">
+        <a:schemeClr val="bg1"/>
+      </p:bgRef>
+    </p:bg>
+    <p:spTree>
+      <p:nvGrpSpPr>
+        <p:cNvPr id="1" name=""/>
+        <p:cNvGrpSpPr/>
+        <p:nvPr/>
+      </p:nvGrpSpPr>
+      <p:grpSpPr>
+        <a:xfrm>
+          <a:off x="0" y="0"/>
+          <a:ext cx="0" cy="0"/>
+          <a:chOff x="0" y="0"/>
+          <a:chExt cx="0" cy="0"/>
+        </a:xfrm>
+      </p:grpSpPr>
+      <p:sp>
+        <p:nvSpPr>
+          <p:cNvPr id="2" name="Header Placeholder 1"/>
+          <p:cNvSpPr>
+            <a:spLocks noGrp="1"/>
+          </p:cNvSpPr>
+          <p:nvPr>
+            <p:ph type="hdr" sz="quarter"/>
+          </p:nvPr>
+        </p:nvSpPr>
+        <p:spPr>
+          <a:xfrm>
+            <a:off x="0" y="0"/>
+            <a:ext cx="2971800" cy="458788"/>
+          </a:xfrm>
+          <a:prstGeom prst="rect">
+            <a:avLst/>
+          </a:prstGeom>
+        </p:spPr>
+        <p:txBody>
+          <a:bodyPr vert="horz" lIns="91440" tIns="45720" rIns="91440" bIns="45720" rtlCol="0"/>
+          <a:lstStyle>
+            <a:lvl1pPr algn="l">
+              <a:defRPr sz="1200"/>
+            </a:lvl1pPr>
+          </a:lstStyle>
+          <a:p>
+            <a:endParaRPr lang="en-US"/>
+          </a:p>
+        </p:txBody>
+      </p:sp>
+      <p:sp>
+        <p:nvSpPr>
+          <p:cNvPr id="3" name="Date Placeholder 2"/>
+          <p:cNvSpPr>
+            <a:spLocks noGrp="1"/>
+          </p:cNvSpPr>
+          <p:nvPr>
+            <p:ph type="dt" idx="1"/>
+          </p:nvPr>
+        </p:nvSpPr>
+        <p:spPr>
+          <a:xfrm>
+            <a:off x="3884613" y="0"/>
+            <a:ext cx="2971800" cy="458788"/>
+          </a:xfrm>
+          <a:prstGeom prst="rect">
+            <a:avLst/>
+          </a:prstGeom>
+        </p:spPr>
+        <p:txBody>
+          <a:bodyPr vert="horz" lIns="91440" tIns="45720" rIns="91440" bIns="45720" rtlCol="0"/>
+          <a:lstStyle>
+            <a:lvl1pPr algn="r">
+              <a:defRPr sz="1200"/>
+            </a:lvl1pPr>
+          </a:lstStyle>
+          <a:p>
+            <a:fld id="{B2E107C9-5FE0-4864-97C4-A8FF847E0675}" type="datetimeFigureOut">
+              <a:rPr lang="en-US" smtClean="0"/>
+              <a:t>12/26/2020</a:t>
+            </a:fld>
+            <a:endParaRPr lang="en-US"/>
+          </a:p>
+        </p:txBody>
+      </p:sp>
+      <p:sp>
+        <p:nvSpPr>
+          <p:cNvPr id="4" name="Slide Image Placeholder 3"/>
+          <p:cNvSpPr>
+            <a:spLocks noGrp="1" noRot="1" noChangeAspect="1"/>
+          </p:cNvSpPr>
+          <p:nvPr>
+            <p:ph type="sldImg" idx="2"/>
+          </p:nvPr>
+        </p:nvSpPr>
+        <p:spPr>
+          <a:xfrm>
+            <a:off x="685800" y="1143000"/>
+            <a:ext cx="5486400" cy="3086100"/>
+          </a:xfrm>
+          <a:prstGeom prst="rect">
+            <a:avLst/>
+          </a:prstGeom>
+          <a:noFill/>
+          <a:ln w="12700">
+            <a:solidFill>
+              <a:prstClr val="black"/>
+            </a:solidFill>
+          </a:ln>
+        </p:spPr>
+        <p:txBody>
+          <a:bodyPr vert="horz" lIns="91440" tIns="45720" rIns="91440" bIns="45720" rtlCol="0" anchor="ctr"/>
+          <a:lstStyle/>
+          <a:p>
+            <a:endParaRPr lang="en-US"/>
+          </a:p>
+        </p:txBody>
+      </p:sp>
+      <p:sp>
+        <p:nvSpPr>
+          <p:cNvPr id="5" name="Notes Placeholder 4"/>
+          <p:cNvSpPr>
+            <a:spLocks noGrp="1"/>
+          </p:cNvSpPr>
+          <p:nvPr>
+            <p:ph type="body" sz="quarter" idx="3"/>
+          </p:nvPr>
+        </p:nvSpPr>
+        <p:spPr>
+          <a:xfrm>
+            <a:off x="685800" y="4400550"/>
+            <a:ext cx="5486400" cy="3600450"/>
+          </a:xfrm>
+          <a:prstGeom prst="rect">
+            <a:avLst/>
+          </a:prstGeom>
+        </p:spPr>
+        <p:txBody>
+          <a:bodyPr vert="horz" lIns="91440" tIns="45720" rIns="91440" bIns="45720" rtlCol="0"/>
+          <a:lstStyle/>
+          <a:p>
+            <a:pPr lvl="0"/>
+            <a:r>
+              <a:rPr lang="en-US"/>
+              <a:t>Click to edit Master text styles</a:t>
+            </a:r>
+          </a:p>
+          <a:p>
+            <a:pPr lvl="1"/>
+            <a:r>
+              <a:rPr lang="en-US"/>
+              <a:t>Second level</a:t>
+            </a:r>
+          </a:p>
+          <a:p>
+            <a:pPr lvl="2"/>
+            <a:r>
+              <a:rPr lang="en-US"/>
+              <a:t>Third level</a:t>
+            </a:r>
+          </a:p>
+          <a:p>
+            <a:pPr lvl="3"/>
+            <a:r>
+              <a:rPr lang="en-US"/>
+              <a:t>Fourth level</a:t>
+            </a:r>
+          </a:p>
+          <a:p>
+            <a:pPr lvl="4"/>
+            <a:r>
+              <a:rPr lang="en-US"/>
+              <a:t>Fifth level</a:t>
+            </a:r>
+          </a:p>
+        </p:txBody>
+      </p:sp>
+      <p:sp>
+        <p:nvSpPr>
+          <p:cNvPr id="6" name="Footer Placeholder 5"/>
+          <p:cNvSpPr>
+            <a:spLocks noGrp="1"/>
+          </p:cNvSpPr>
+          <p:nvPr>
+            <p:ph type="ftr" sz="quarter" idx="4"/>
+          </p:nvPr>
+        </p:nvSpPr>
+        <p:spPr>
+          <a:xfrm>
+            <a:off x="0" y="8685213"/>
+            <a:ext cx="2971800" cy="458787"/>
+          </a:xfrm>
+          <a:prstGeom prst="rect">
+            <a:avLst/>
+          </a:prstGeom>
+        </p:spPr>
+        <p:txBody>
+          <a:bodyPr vert="horz" lIns="91440" tIns="45720" rIns="91440" bIns="45720" rtlCol="0" anchor="b"/>
+          <a:lstStyle>
+            <a:lvl1pPr algn="l">
+              <a:defRPr sz="1200"/>
+            </a:lvl1pPr>
+          </a:lstStyle>
+          <a:p>
+            <a:endParaRPr lang="en-US"/>
+          </a:p>
+        </p:txBody>
+      </p:sp>
+      <p:sp>
+        <p:nvSpPr>
+          <p:cNvPr id="7" name="Slide Number Placeholder 6"/>
+          <p:cNvSpPr>
+            <a:spLocks noGrp="1"/>
+          </p:cNvSpPr>
+          <p:nvPr>
+            <p:ph type="sldNum" sz="quarter" idx="5"/>
+          </p:nvPr>
+        </p:nvSpPr>
+        <p:spPr>
+          <a:xfrm>
+            <a:off x="3884613" y="8685213"/>
+            <a:ext cx="2971800" cy="458787"/>
+          </a:xfrm>
+          <a:prstGeom prst="rect">
+            <a:avLst/>
+          </a:prstGeom>
+        </p:spPr>
+        <p:txBody>
+          <a:bodyPr vert="horz" lIns="91440" tIns="45720" rIns="91440" bIns="45720" rtlCol="0" anchor="b"/>
+          <a:lstStyle>
+            <a:lvl1pPr algn="r">
+              <a:defRPr sz="1200"/>
+            </a:lvl1pPr>
+          </a:lstStyle>
+          <a:p>
+            <a:fld id="{509FA207-E8FD-4363-95A6-907EB6A63BD8}" type="slidenum">
+              <a:rPr lang="en-US" smtClean="0"/>
+              <a:t>‹#›</a:t>
+            </a:fld>
+            <a:endParaRPr lang="en-US"/>
+          </a:p>
+        </p:txBody>
+      </p:sp>
+    </p:spTree>
+    <p:extLst>
+      <p:ext uri="{BB962C8B-B14F-4D97-AF65-F5344CB8AC3E}">
+        <p14:creationId xmlns:p14="http://schemas.microsoft.com/office/powerpoint/2010/main" val="299276485"/>
+      </p:ext>
+    </p:extLst>
+  </p:cSld>
+  <p:clrMap bg1="lt1" tx1="dk1" bg2="lt2" tx2="dk2" accent1="accent1" accent2="accent2" accent3="accent3" accent4="accent4" accent5="accent5" accent6="accent6" hlink="hlink" folHlink="folHlink"/>
+  <p:notesStyle>
+    <a:lvl1pPr marL="0" algn="l" defTabSz="914400" rtl="0" eaLnBrk="1" latinLnBrk="0" hangingPunct="1">
+      <a:defRPr sz="1200" kern="1200">
+        <a:solidFill>
+          <a:schemeClr val="tx1"/>
+        </a:solidFill>
+        <a:latin typeface="+mn-lt"/>
+        <a:ea typeface="+mn-ea"/>
+        <a:cs typeface="+mn-cs"/>
+      </a:defRPr>
+    </a:lvl1pPr>
+    <a:lvl2pPr marL="457200" algn="l" defTabSz="914400" rtl="0" eaLnBrk="1" latinLnBrk="0" hangingPunct="1">
+      <a:defRPr sz="1200" kern="1200">
+        <a:solidFill>
+          <a:schemeClr val="tx1"/>
+        </a:solidFill>
+        <a:latin typeface="+mn-lt"/>
+        <a:ea typeface="+mn-ea"/>
+        <a:cs typeface="+mn-cs"/>
+      </a:defRPr>
+    </a:lvl2pPr>
+    <a:lvl3pPr marL="914400" algn="l" defTabSz="914400" rtl="0" eaLnBrk="1" latinLnBrk="0" hangingPunct="1">
+      <a:defRPr sz="1200" kern="1200">
+        <a:solidFill>
+          <a:schemeClr val="tx1"/>
+        </a:solidFill>
+        <a:latin typeface="+mn-lt"/>
+        <a:ea typeface="+mn-ea"/>
+        <a:cs typeface="+mn-cs"/>
+      </a:defRPr>
+    </a:lvl3pPr>
+    <a:lvl4pPr marL="1371600" algn="l" defTabSz="914400" rtl="0" eaLnBrk="1" latinLnBrk="0" hangingPunct="1">
+      <a:defRPr sz="1200" kern="1200">
+        <a:solidFill>
+          <a:schemeClr val="tx1"/>
+        </a:solidFill>
+        <a:latin typeface="+mn-lt"/>
+        <a:ea typeface="+mn-ea"/>
+        <a:cs typeface="+mn-cs"/>
+      </a:defRPr>
+    </a:lvl4pPr>
+    <a:lvl5pPr marL="1828800" algn="l" defTabSz="914400" rtl="0" eaLnBrk="1" latinLnBrk="0" hangingPunct="1">
+      <a:defRPr sz="1200" kern="1200">
+        <a:solidFill>
+          <a:schemeClr val="tx1"/>
+        </a:solidFill>
+        <a:latin typeface="+mn-lt"/>
+        <a:ea typeface="+mn-ea"/>
+        <a:cs typeface="+mn-cs"/>
+      </a:defRPr>
+    </a:lvl5pPr>
+    <a:lvl6pPr marL="2286000" algn="l" defTabSz="914400" rtl="0" eaLnBrk="1" latinLnBrk="0" hangingPunct="1">
+      <a:defRPr sz="1200" kern="1200">
+        <a:solidFill>
+          <a:schemeClr val="tx1"/>
+        </a:solidFill>
+        <a:latin typeface="+mn-lt"/>
+        <a:ea typeface="+mn-ea"/>
+        <a:cs typeface="+mn-cs"/>
+      </a:defRPr>
+    </a:lvl6pPr>
+    <a:lvl7pPr marL="2743200" algn="l" defTabSz="914400" rtl="0" eaLnBrk="1" latinLnBrk="0" hangingPunct="1">
+      <a:defRPr sz="1200" kern="1200">
+        <a:solidFill>
+          <a:schemeClr val="tx1"/>
+        </a:solidFill>
+        <a:latin typeface="+mn-lt"/>
+        <a:ea typeface="+mn-ea"/>
+        <a:cs typeface="+mn-cs"/>
+      </a:defRPr>
+    </a:lvl7pPr>
+    <a:lvl8pPr marL="3200400" algn="l" defTabSz="914400" rtl="0" eaLnBrk="1" latinLnBrk="0" hangingPunct="1">
+      <a:defRPr sz="1200" kern="1200">
+        <a:solidFill>
+          <a:schemeClr val="tx1"/>
+        </a:solidFill>
+        <a:latin typeface="+mn-lt"/>
+        <a:ea typeface="+mn-ea"/>
+        <a:cs typeface="+mn-cs"/>
+      </a:defRPr>
+    </a:lvl8pPr>
+    <a:lvl9pPr marL="3657600" algn="l" defTabSz="914400" rtl="0" eaLnBrk="1" latinLnBrk="0" hangingPunct="1">
+      <a:defRPr sz="1200" kern="1200">
+        <a:solidFill>
+          <a:schemeClr val="tx1"/>
+        </a:solidFill>
+        <a:latin typeface="+mn-lt"/>
+        <a:ea typeface="+mn-ea"/>
+        <a:cs typeface="+mn-cs"/>
+      </a:defRPr>
+    </a:lvl9pPr>
+  </p:notesStyle>
+</p:notesMaster>
+</file>
+
+<file path=ppt/notesSlides/notesSlide1.xml><?xml version="1.0" encoding="utf-8"?>
+<p:notes xmlns:a="http://schemas.openxmlformats.org/drawingml/2006/main" xmlns:r="http://schemas.openxmlformats.org/officeDocument/2006/relationships" xmlns:p="http://schemas.openxmlformats.org/presentationml/2006/main">
+  <p:cSld>
+    <p:spTree>
+      <p:nvGrpSpPr>
+        <p:cNvPr id="1" name=""/>
+        <p:cNvGrpSpPr/>
+        <p:nvPr/>
+      </p:nvGrpSpPr>
+      <p:grpSpPr>
+        <a:xfrm>
+          <a:off x="0" y="0"/>
+          <a:ext cx="0" cy="0"/>
+          <a:chOff x="0" y="0"/>
+          <a:chExt cx="0" cy="0"/>
+        </a:xfrm>
+      </p:grpSpPr>
+      <p:sp>
+        <p:nvSpPr>
+          <p:cNvPr id="2" name="Slide Image Placeholder 1"/>
+          <p:cNvSpPr>
+            <a:spLocks noGrp="1" noRot="1" noChangeAspect="1"/>
+          </p:cNvSpPr>
+          <p:nvPr>
+            <p:ph type="sldImg"/>
+          </p:nvPr>
+        </p:nvSpPr>
+        <p:spPr/>
+      </p:sp>
+      <p:sp>
+        <p:nvSpPr>
+          <p:cNvPr id="3" name="Notes Placeholder 2"/>
+          <p:cNvSpPr>
+            <a:spLocks noGrp="1"/>
+          </p:cNvSpPr>
+          <p:nvPr>
+            <p:ph type="body" idx="1"/>
+          </p:nvPr>
+        </p:nvSpPr>
+        <p:spPr/>
+        <p:txBody>
+          <a:bodyPr/>
+          <a:lstStyle/>
+          <a:p>
+            <a:r>
+              <a:rPr lang="en-US" sz="1200" dirty="0">
+                <a:effectLst/>
+                <a:latin typeface="Calibri" panose="020F0502020204030204" pitchFamily="34" charset="0"/>
+                <a:ea typeface="Calibri" panose="020F0502020204030204" pitchFamily="34" charset="0"/>
+                <a:cs typeface="Arial" panose="020B0604020202020204" pitchFamily="34" charset="0"/>
+              </a:rPr>
+              <a:t>The primary advantage of the UVM is that this methodology specifies and lays out a set of guidelines to be followed for creation of verification testbenches. This fact ensures testbench uniformity between different verification teams, cross-compatibility between IPs and standalone environment integration, as well as flexibility and ease of maintaining testbenches. </a:t>
+            </a:r>
+          </a:p>
+          <a:p>
+            <a:r>
+              <a:rPr lang="en-US" sz="1200" dirty="0">
+                <a:effectLst/>
+                <a:latin typeface="Calibri" panose="020F0502020204030204" pitchFamily="34" charset="0"/>
+                <a:ea typeface="Calibri" panose="020F0502020204030204" pitchFamily="34" charset="0"/>
+                <a:cs typeface="Arial" panose="020B0604020202020204" pitchFamily="34" charset="0"/>
+              </a:rPr>
+              <a:t>Every verification environment has similar components like drivers, monitors, stimulus generators and scoreboards. UVM provides a build in base class for each of these components with standardized functions to instantiate, connect and build the test bench environment.</a:t>
+            </a:r>
+          </a:p>
+          <a:p>
+            <a:endParaRPr lang="en-US" dirty="0"/>
+          </a:p>
+        </p:txBody>
+      </p:sp>
+      <p:sp>
+        <p:nvSpPr>
+          <p:cNvPr id="4" name="Slide Number Placeholder 3"/>
+          <p:cNvSpPr>
+            <a:spLocks noGrp="1"/>
+          </p:cNvSpPr>
+          <p:nvPr>
+            <p:ph type="sldNum" sz="quarter" idx="5"/>
+          </p:nvPr>
+        </p:nvSpPr>
+        <p:spPr/>
+        <p:txBody>
+          <a:bodyPr/>
+          <a:lstStyle/>
+          <a:p>
+            <a:fld id="{509FA207-E8FD-4363-95A6-907EB6A63BD8}" type="slidenum">
+              <a:rPr lang="en-US" smtClean="0"/>
+              <a:t>4</a:t>
+            </a:fld>
+            <a:endParaRPr lang="en-US"/>
+          </a:p>
+        </p:txBody>
+      </p:sp>
+    </p:spTree>
+    <p:extLst>
+      <p:ext uri="{BB962C8B-B14F-4D97-AF65-F5344CB8AC3E}">
+        <p14:creationId xmlns:p14="http://schemas.microsoft.com/office/powerpoint/2010/main" val="3771498769"/>
+      </p:ext>
+    </p:extLst>
+  </p:cSld>
+  <p:clrMapOvr>
+    <a:masterClrMapping/>
+  </p:clrMapOvr>
+</p:notes>
+</file>
+
+<file path=ppt/notesSlides/notesSlide2.xml><?xml version="1.0" encoding="utf-8"?>
+<p:notes xmlns:a="http://schemas.openxmlformats.org/drawingml/2006/main" xmlns:r="http://schemas.openxmlformats.org/officeDocument/2006/relationships" xmlns:p="http://schemas.openxmlformats.org/presentationml/2006/main">
+  <p:cSld>
+    <p:spTree>
+      <p:nvGrpSpPr>
+        <p:cNvPr id="1" name=""/>
+        <p:cNvGrpSpPr/>
+        <p:nvPr/>
+      </p:nvGrpSpPr>
+      <p:grpSpPr>
+        <a:xfrm>
+          <a:off x="0" y="0"/>
+          <a:ext cx="0" cy="0"/>
+          <a:chOff x="0" y="0"/>
+          <a:chExt cx="0" cy="0"/>
+        </a:xfrm>
+      </p:grpSpPr>
+      <p:sp>
+        <p:nvSpPr>
+          <p:cNvPr id="2" name="Slide Image Placeholder 1"/>
+          <p:cNvSpPr>
+            <a:spLocks noGrp="1" noRot="1" noChangeAspect="1"/>
+          </p:cNvSpPr>
+          <p:nvPr>
+            <p:ph type="sldImg"/>
+          </p:nvPr>
+        </p:nvSpPr>
+        <p:spPr/>
+      </p:sp>
+      <p:sp>
+        <p:nvSpPr>
+          <p:cNvPr id="3" name="Notes Placeholder 2"/>
+          <p:cNvSpPr>
+            <a:spLocks noGrp="1"/>
+          </p:cNvSpPr>
+          <p:nvPr>
+            <p:ph type="body" idx="1"/>
+          </p:nvPr>
+        </p:nvSpPr>
+        <p:spPr/>
+        <p:txBody>
+          <a:bodyPr/>
+          <a:lstStyle/>
+          <a:p>
+            <a:pPr marL="0" marR="0" indent="0">
+              <a:lnSpc>
+                <a:spcPct val="107000"/>
+              </a:lnSpc>
+              <a:spcBef>
+                <a:spcPts val="0"/>
+              </a:spcBef>
+              <a:spcAft>
+                <a:spcPts val="800"/>
+              </a:spcAft>
+              <a:buNone/>
+            </a:pPr>
+            <a:r>
+              <a:rPr lang="en-US" sz="1200" dirty="0">
+                <a:effectLst/>
+                <a:latin typeface="Calibri" panose="020F0502020204030204" pitchFamily="34" charset="0"/>
+                <a:ea typeface="Calibri" panose="020F0502020204030204" pitchFamily="34" charset="0"/>
+                <a:cs typeface="Arial" panose="020B0604020202020204" pitchFamily="34" charset="0"/>
+              </a:rPr>
+              <a:t>The top block will create instances of the DUT, the Reference model and of the testbench. It will also declare the virtual interface, which will act as a bridge between the Test component and the DUT/Reference Model.</a:t>
+            </a:r>
+          </a:p>
+          <a:p>
+            <a:pPr marL="0" marR="0" indent="0">
+              <a:lnSpc>
+                <a:spcPct val="107000"/>
+              </a:lnSpc>
+              <a:spcBef>
+                <a:spcPts val="0"/>
+              </a:spcBef>
+              <a:spcAft>
+                <a:spcPts val="800"/>
+              </a:spcAft>
+              <a:buNone/>
+            </a:pPr>
+            <a:r>
+              <a:rPr lang="en-US" sz="1200" dirty="0">
+                <a:effectLst/>
+                <a:latin typeface="Calibri" panose="020F0502020204030204" pitchFamily="34" charset="0"/>
+                <a:ea typeface="Calibri" panose="020F0502020204030204" pitchFamily="34" charset="0"/>
+                <a:cs typeface="Arial" panose="020B0604020202020204" pitchFamily="34" charset="0"/>
+              </a:rPr>
+              <a:t>The interface is a module that holds all the signals of the DUT. The monitor, the driver and the DUT are all going to be connected to this module.</a:t>
+            </a:r>
+          </a:p>
+          <a:p>
+            <a:pPr marL="0" marR="0" indent="0">
+              <a:lnSpc>
+                <a:spcPct val="107000"/>
+              </a:lnSpc>
+              <a:spcBef>
+                <a:spcPts val="0"/>
+              </a:spcBef>
+              <a:spcAft>
+                <a:spcPts val="800"/>
+              </a:spcAft>
+              <a:buNone/>
+            </a:pPr>
+            <a:r>
+              <a:rPr lang="en-US" sz="1200" dirty="0">
+                <a:effectLst/>
+                <a:latin typeface="Calibri" panose="020F0502020204030204" pitchFamily="34" charset="0"/>
+                <a:ea typeface="Calibri" panose="020F0502020204030204" pitchFamily="34" charset="0"/>
+                <a:cs typeface="Arial" panose="020B0604020202020204" pitchFamily="34" charset="0"/>
+              </a:rPr>
+              <a:t>This block will be a typical SystemVerilog module and it will be responsible for:</a:t>
+            </a:r>
+          </a:p>
+          <a:p>
+            <a:pPr lvl="1">
+              <a:lnSpc>
+                <a:spcPct val="107000"/>
+              </a:lnSpc>
+              <a:spcBef>
+                <a:spcPts val="0"/>
+              </a:spcBef>
+            </a:pPr>
+            <a:r>
+              <a:rPr lang="en-US" sz="1200" dirty="0">
+                <a:effectLst/>
+                <a:latin typeface="Calibri" panose="020F0502020204030204" pitchFamily="34" charset="0"/>
+                <a:ea typeface="Calibri" panose="020F0502020204030204" pitchFamily="34" charset="0"/>
+                <a:cs typeface="Arial" panose="020B0604020202020204" pitchFamily="34" charset="0"/>
+              </a:rPr>
+              <a:t>Connecting the DUT and Reference Model to the test class, using the interface defined before.</a:t>
+            </a:r>
+          </a:p>
+          <a:p>
+            <a:pPr lvl="1">
+              <a:lnSpc>
+                <a:spcPct val="107000"/>
+              </a:lnSpc>
+              <a:spcBef>
+                <a:spcPts val="0"/>
+              </a:spcBef>
+            </a:pPr>
+            <a:r>
+              <a:rPr lang="en-US" sz="1200" dirty="0">
+                <a:effectLst/>
+                <a:latin typeface="Calibri" panose="020F0502020204030204" pitchFamily="34" charset="0"/>
+                <a:ea typeface="Calibri" panose="020F0502020204030204" pitchFamily="34" charset="0"/>
+                <a:cs typeface="Arial" panose="020B0604020202020204" pitchFamily="34" charset="0"/>
+              </a:rPr>
+              <a:t>Generating the clock for the DUT.</a:t>
+            </a:r>
+          </a:p>
+          <a:p>
+            <a:pPr lvl="1">
+              <a:lnSpc>
+                <a:spcPct val="107000"/>
+              </a:lnSpc>
+              <a:spcBef>
+                <a:spcPts val="0"/>
+              </a:spcBef>
+            </a:pPr>
+            <a:r>
+              <a:rPr lang="en-US" sz="1200" dirty="0">
+                <a:effectLst/>
+                <a:latin typeface="Calibri" panose="020F0502020204030204" pitchFamily="34" charset="0"/>
+                <a:ea typeface="Calibri" panose="020F0502020204030204" pitchFamily="34" charset="0"/>
+                <a:cs typeface="Arial" panose="020B0604020202020204" pitchFamily="34" charset="0"/>
+              </a:rPr>
+              <a:t>Registering the interface in the UVM factory. This is necessary in order to pass this interface to all other classes that will be instantiated in the testbench. It will be registered in the UVM factory by using the </a:t>
+            </a:r>
+            <a:r>
+              <a:rPr lang="en-US" sz="1200" dirty="0" err="1">
+                <a:effectLst/>
+                <a:latin typeface="Calibri" panose="020F0502020204030204" pitchFamily="34" charset="0"/>
+                <a:ea typeface="Calibri" panose="020F0502020204030204" pitchFamily="34" charset="0"/>
+                <a:cs typeface="Arial" panose="020B0604020202020204" pitchFamily="34" charset="0"/>
+              </a:rPr>
+              <a:t>uvm_resource_db</a:t>
+            </a:r>
+            <a:r>
+              <a:rPr lang="en-US" sz="1200" dirty="0">
+                <a:effectLst/>
+                <a:latin typeface="Calibri" panose="020F0502020204030204" pitchFamily="34" charset="0"/>
+                <a:ea typeface="Calibri" panose="020F0502020204030204" pitchFamily="34" charset="0"/>
+                <a:cs typeface="Arial" panose="020B0604020202020204" pitchFamily="34" charset="0"/>
+              </a:rPr>
+              <a:t> method and every block that will use the same interface, will need to get it by calling the same method. </a:t>
+            </a:r>
+          </a:p>
+          <a:p>
+            <a:pPr lvl="1">
+              <a:lnSpc>
+                <a:spcPct val="107000"/>
+              </a:lnSpc>
+              <a:spcBef>
+                <a:spcPts val="0"/>
+              </a:spcBef>
+              <a:spcAft>
+                <a:spcPts val="800"/>
+              </a:spcAft>
+            </a:pPr>
+            <a:r>
+              <a:rPr lang="en-US" sz="1200" dirty="0">
+                <a:effectLst/>
+                <a:latin typeface="Calibri" panose="020F0502020204030204" pitchFamily="34" charset="0"/>
+                <a:ea typeface="Calibri" panose="020F0502020204030204" pitchFamily="34" charset="0"/>
+                <a:cs typeface="Arial" panose="020B0604020202020204" pitchFamily="34" charset="0"/>
+              </a:rPr>
+              <a:t>Running the test.</a:t>
+            </a:r>
+          </a:p>
+          <a:p>
+            <a:endParaRPr lang="en-US" dirty="0"/>
+          </a:p>
+        </p:txBody>
+      </p:sp>
+      <p:sp>
+        <p:nvSpPr>
+          <p:cNvPr id="4" name="Slide Number Placeholder 3"/>
+          <p:cNvSpPr>
+            <a:spLocks noGrp="1"/>
+          </p:cNvSpPr>
+          <p:nvPr>
+            <p:ph type="sldNum" sz="quarter" idx="5"/>
+          </p:nvPr>
+        </p:nvSpPr>
+        <p:spPr/>
+        <p:txBody>
+          <a:bodyPr/>
+          <a:lstStyle/>
+          <a:p>
+            <a:fld id="{509FA207-E8FD-4363-95A6-907EB6A63BD8}" type="slidenum">
+              <a:rPr lang="en-US" smtClean="0"/>
+              <a:t>6</a:t>
+            </a:fld>
+            <a:endParaRPr lang="en-US"/>
+          </a:p>
+        </p:txBody>
+      </p:sp>
+    </p:spTree>
+    <p:extLst>
+      <p:ext uri="{BB962C8B-B14F-4D97-AF65-F5344CB8AC3E}">
+        <p14:creationId xmlns:p14="http://schemas.microsoft.com/office/powerpoint/2010/main" val="2098685868"/>
+      </p:ext>
+    </p:extLst>
+  </p:cSld>
+  <p:clrMapOvr>
+    <a:masterClrMapping/>
+  </p:clrMapOvr>
+</p:notes>
+</file>
+
+<file path=ppt/notesSlides/notesSlide3.xml><?xml version="1.0" encoding="utf-8"?>
+<p:notes xmlns:a="http://schemas.openxmlformats.org/drawingml/2006/main" xmlns:r="http://schemas.openxmlformats.org/officeDocument/2006/relationships" xmlns:p="http://schemas.openxmlformats.org/presentationml/2006/main">
+  <p:cSld>
+    <p:spTree>
+      <p:nvGrpSpPr>
+        <p:cNvPr id="1" name=""/>
+        <p:cNvGrpSpPr/>
+        <p:nvPr/>
+      </p:nvGrpSpPr>
+      <p:grpSpPr>
+        <a:xfrm>
+          <a:off x="0" y="0"/>
+          <a:ext cx="0" cy="0"/>
+          <a:chOff x="0" y="0"/>
+          <a:chExt cx="0" cy="0"/>
+        </a:xfrm>
+      </p:grpSpPr>
+      <p:sp>
+        <p:nvSpPr>
+          <p:cNvPr id="2" name="Slide Image Placeholder 1"/>
+          <p:cNvSpPr>
+            <a:spLocks noGrp="1" noRot="1" noChangeAspect="1"/>
+          </p:cNvSpPr>
+          <p:nvPr>
+            <p:ph type="sldImg"/>
+          </p:nvPr>
+        </p:nvSpPr>
+        <p:spPr/>
+      </p:sp>
+      <p:sp>
+        <p:nvSpPr>
+          <p:cNvPr id="3" name="Notes Placeholder 2"/>
+          <p:cNvSpPr>
+            <a:spLocks noGrp="1"/>
+          </p:cNvSpPr>
+          <p:nvPr>
+            <p:ph type="body" idx="1"/>
+          </p:nvPr>
+        </p:nvSpPr>
+        <p:spPr/>
+        <p:txBody>
+          <a:bodyPr/>
+          <a:lstStyle/>
+          <a:p>
+            <a:pPr marL="0" marR="0">
+              <a:lnSpc>
+                <a:spcPct val="107000"/>
+              </a:lnSpc>
+              <a:spcBef>
+                <a:spcPts val="0"/>
+              </a:spcBef>
+              <a:spcAft>
+                <a:spcPts val="800"/>
+              </a:spcAft>
+            </a:pPr>
+            <a:r>
+              <a:rPr lang="en-US" sz="1200" dirty="0">
+                <a:effectLst/>
+                <a:latin typeface="Calibri" panose="020F0502020204030204" pitchFamily="34" charset="0"/>
+                <a:ea typeface="Calibri" panose="020F0502020204030204" pitchFamily="34" charset="0"/>
+                <a:cs typeface="Arial" panose="020B0604020202020204" pitchFamily="34" charset="0"/>
+              </a:rPr>
+              <a:t>The purpose of the agent module is to connect </a:t>
+            </a:r>
+            <a:r>
+              <a:rPr lang="en-US" dirty="0">
+                <a:effectLst/>
+                <a:latin typeface="Calibri" panose="020F0502020204030204" pitchFamily="34" charset="0"/>
+                <a:ea typeface="Calibri" panose="020F0502020204030204" pitchFamily="34" charset="0"/>
+                <a:cs typeface="Arial" panose="020B0604020202020204" pitchFamily="34" charset="0"/>
+              </a:rPr>
+              <a:t>both monitors, the sequencer and the driver. An agent doesn’t require a run phase, there is no simulation code to be executed in this block but there will be a connect phase, in addition to the build phase.</a:t>
+            </a:r>
+          </a:p>
+          <a:p>
+            <a:pPr marL="0" marR="0">
+              <a:lnSpc>
+                <a:spcPct val="107000"/>
+              </a:lnSpc>
+              <a:spcBef>
+                <a:spcPts val="0"/>
+              </a:spcBef>
+              <a:spcAft>
+                <a:spcPts val="800"/>
+              </a:spcAft>
+            </a:pPr>
+            <a:r>
+              <a:rPr lang="en-US" sz="1200" dirty="0">
+                <a:effectLst/>
+                <a:latin typeface="Calibri" panose="020F0502020204030204" pitchFamily="34" charset="0"/>
+                <a:ea typeface="Calibri" panose="020F0502020204030204" pitchFamily="34" charset="0"/>
+                <a:cs typeface="Arial" panose="020B0604020202020204" pitchFamily="34" charset="0"/>
+              </a:rPr>
+              <a:t>The Agent component will construct the monitors, the sequencer and the driver in the build phase. It will also need to create two analysis ports, these ports will act as proxies for the monitors to be connect to an external scoreboard through the agent’s ports.</a:t>
+            </a:r>
+          </a:p>
+          <a:p>
+            <a:pPr marL="0" marR="0">
+              <a:lnSpc>
+                <a:spcPct val="107000"/>
+              </a:lnSpc>
+              <a:spcBef>
+                <a:spcPts val="0"/>
+              </a:spcBef>
+              <a:spcAft>
+                <a:spcPts val="800"/>
+              </a:spcAft>
+            </a:pPr>
+            <a:r>
+              <a:rPr lang="en-US" sz="1200" dirty="0">
+                <a:effectLst/>
+                <a:latin typeface="Calibri" panose="020F0502020204030204" pitchFamily="34" charset="0"/>
+                <a:ea typeface="Calibri" panose="020F0502020204030204" pitchFamily="34" charset="0"/>
+                <a:cs typeface="Arial" panose="020B0604020202020204" pitchFamily="34" charset="0"/>
+              </a:rPr>
+              <a:t>After it has constructed the components previously mentioned , the Agent has to make the connections between them. Using the concept of TLM ports, it can connect each port to its destination.</a:t>
+            </a:r>
+          </a:p>
+          <a:p>
+            <a:endParaRPr lang="en-US" dirty="0"/>
+          </a:p>
+        </p:txBody>
+      </p:sp>
+      <p:sp>
+        <p:nvSpPr>
+          <p:cNvPr id="4" name="Slide Number Placeholder 3"/>
+          <p:cNvSpPr>
+            <a:spLocks noGrp="1"/>
+          </p:cNvSpPr>
+          <p:nvPr>
+            <p:ph type="sldNum" sz="quarter" idx="5"/>
+          </p:nvPr>
+        </p:nvSpPr>
+        <p:spPr/>
+        <p:txBody>
+          <a:bodyPr/>
+          <a:lstStyle/>
+          <a:p>
+            <a:fld id="{509FA207-E8FD-4363-95A6-907EB6A63BD8}" type="slidenum">
+              <a:rPr lang="en-US" smtClean="0"/>
+              <a:t>10</a:t>
+            </a:fld>
+            <a:endParaRPr lang="en-US"/>
+          </a:p>
+        </p:txBody>
+      </p:sp>
+    </p:spTree>
+    <p:extLst>
+      <p:ext uri="{BB962C8B-B14F-4D97-AF65-F5344CB8AC3E}">
+        <p14:creationId xmlns:p14="http://schemas.microsoft.com/office/powerpoint/2010/main" val="882604135"/>
+      </p:ext>
+    </p:extLst>
+  </p:cSld>
+  <p:clrMapOvr>
+    <a:masterClrMapping/>
+  </p:clrMapOvr>
+</p:notes>
+</file>
+
 <file path=ppt/slideLayouts/slideLayout1.xml><?xml version="1.0" encoding="utf-8"?>
 <p:sldLayout xmlns:a="http://schemas.openxmlformats.org/drawingml/2006/main" xmlns:r="http://schemas.openxmlformats.org/officeDocument/2006/relationships" xmlns:p="http://schemas.openxmlformats.org/presentationml/2006/main" type="title" preserve="1">
   <p:cSld name="Title Slide">
@@ -302,7 +1169,7 @@
           <a:p>
             <a:fld id="{CD2AB640-041E-414A-8FDF-E33E6A90A0DD}" type="datetimeFigureOut">
               <a:rPr lang="en-US" smtClean="0"/>
-              <a:t>12/25/2020</a:t>
+              <a:t>12/26/2020</a:t>
             </a:fld>
             <a:endParaRPr lang="en-US"/>
           </a:p>
@@ -500,7 +1367,7 @@
           <a:p>
             <a:fld id="{CD2AB640-041E-414A-8FDF-E33E6A90A0DD}" type="datetimeFigureOut">
               <a:rPr lang="en-US" smtClean="0"/>
-              <a:t>12/25/2020</a:t>
+              <a:t>12/26/2020</a:t>
             </a:fld>
             <a:endParaRPr lang="en-US"/>
           </a:p>
@@ -708,7 +1575,7 @@
           <a:p>
             <a:fld id="{CD2AB640-041E-414A-8FDF-E33E6A90A0DD}" type="datetimeFigureOut">
               <a:rPr lang="en-US" smtClean="0"/>
-              <a:t>12/25/2020</a:t>
+              <a:t>12/26/2020</a:t>
             </a:fld>
             <a:endParaRPr lang="en-US"/>
           </a:p>
@@ -906,7 +1773,7 @@
           <a:p>
             <a:fld id="{CD2AB640-041E-414A-8FDF-E33E6A90A0DD}" type="datetimeFigureOut">
               <a:rPr lang="en-US" smtClean="0"/>
-              <a:t>12/25/2020</a:t>
+              <a:t>12/26/2020</a:t>
             </a:fld>
             <a:endParaRPr lang="en-US"/>
           </a:p>
@@ -1181,7 +2048,7 @@
           <a:p>
             <a:fld id="{CD2AB640-041E-414A-8FDF-E33E6A90A0DD}" type="datetimeFigureOut">
               <a:rPr lang="en-US" smtClean="0"/>
-              <a:t>12/25/2020</a:t>
+              <a:t>12/26/2020</a:t>
             </a:fld>
             <a:endParaRPr lang="en-US"/>
           </a:p>
@@ -1446,7 +2313,7 @@
           <a:p>
             <a:fld id="{CD2AB640-041E-414A-8FDF-E33E6A90A0DD}" type="datetimeFigureOut">
               <a:rPr lang="en-US" smtClean="0"/>
-              <a:t>12/25/2020</a:t>
+              <a:t>12/26/2020</a:t>
             </a:fld>
             <a:endParaRPr lang="en-US"/>
           </a:p>
@@ -1858,7 +2725,7 @@
           <a:p>
             <a:fld id="{CD2AB640-041E-414A-8FDF-E33E6A90A0DD}" type="datetimeFigureOut">
               <a:rPr lang="en-US" smtClean="0"/>
-              <a:t>12/25/2020</a:t>
+              <a:t>12/26/2020</a:t>
             </a:fld>
             <a:endParaRPr lang="en-US"/>
           </a:p>
@@ -1999,7 +2866,7 @@
           <a:p>
             <a:fld id="{CD2AB640-041E-414A-8FDF-E33E6A90A0DD}" type="datetimeFigureOut">
               <a:rPr lang="en-US" smtClean="0"/>
-              <a:t>12/25/2020</a:t>
+              <a:t>12/26/2020</a:t>
             </a:fld>
             <a:endParaRPr lang="en-US"/>
           </a:p>
@@ -2112,7 +2979,7 @@
           <a:p>
             <a:fld id="{CD2AB640-041E-414A-8FDF-E33E6A90A0DD}" type="datetimeFigureOut">
               <a:rPr lang="en-US" smtClean="0"/>
-              <a:t>12/25/2020</a:t>
+              <a:t>12/26/2020</a:t>
             </a:fld>
             <a:endParaRPr lang="en-US"/>
           </a:p>
@@ -2423,7 +3290,7 @@
           <a:p>
             <a:fld id="{CD2AB640-041E-414A-8FDF-E33E6A90A0DD}" type="datetimeFigureOut">
               <a:rPr lang="en-US" smtClean="0"/>
-              <a:t>12/25/2020</a:t>
+              <a:t>12/26/2020</a:t>
             </a:fld>
             <a:endParaRPr lang="en-US"/>
           </a:p>
@@ -2711,7 +3578,7 @@
           <a:p>
             <a:fld id="{CD2AB640-041E-414A-8FDF-E33E6A90A0DD}" type="datetimeFigureOut">
               <a:rPr lang="en-US" smtClean="0"/>
-              <a:t>12/25/2020</a:t>
+              <a:t>12/26/2020</a:t>
             </a:fld>
             <a:endParaRPr lang="en-US"/>
           </a:p>
@@ -2952,7 +3819,7 @@
           <a:p>
             <a:fld id="{CD2AB640-041E-414A-8FDF-E33E6A90A0DD}" type="datetimeFigureOut">
               <a:rPr lang="en-US" smtClean="0"/>
-              <a:t>12/25/2020</a:t>
+              <a:t>12/26/2020</a:t>
             </a:fld>
             <a:endParaRPr lang="en-US"/>
           </a:p>
@@ -3577,12 +4444,40 @@
             <p:ph idx="1"/>
           </p:nvPr>
         </p:nvSpPr>
-        <p:spPr/>
+        <p:spPr>
+          <a:xfrm>
+            <a:off x="838200" y="1690688"/>
+            <a:ext cx="10515600" cy="4351338"/>
+          </a:xfrm>
+        </p:spPr>
         <p:txBody>
-          <a:bodyPr/>
+          <a:bodyPr>
+            <a:normAutofit/>
+          </a:bodyPr>
           <a:lstStyle/>
           <a:p>
-            <a:pPr marL="0" marR="0">
+            <a:pPr marL="0" marR="0" indent="0">
+              <a:lnSpc>
+                <a:spcPct val="107000"/>
+              </a:lnSpc>
+              <a:spcBef>
+                <a:spcPts val="0"/>
+              </a:spcBef>
+              <a:spcAft>
+                <a:spcPts val="800"/>
+              </a:spcAft>
+              <a:buNone/>
+            </a:pPr>
+            <a:r>
+              <a:rPr lang="en-US" dirty="0">
+                <a:latin typeface="Calibri" panose="020F0502020204030204" pitchFamily="34" charset="0"/>
+                <a:cs typeface="Arial" panose="020B0604020202020204" pitchFamily="34" charset="0"/>
+              </a:rPr>
+              <a:t>The purpose of the agent module is:</a:t>
+            </a:r>
+          </a:p>
+          <a:p>
+            <a:pPr>
               <a:lnSpc>
                 <a:spcPct val="107000"/>
               </a:lnSpc>
@@ -3594,17 +4489,15 @@
               </a:spcAft>
             </a:pPr>
             <a:r>
-              <a:rPr lang="en-US" sz="1800" dirty="0">
-                <a:effectLst/>
+              <a:rPr lang="en-US" dirty="0">
                 <a:latin typeface="Calibri" panose="020F0502020204030204" pitchFamily="34" charset="0"/>
-                <a:ea typeface="Calibri" panose="020F0502020204030204" pitchFamily="34" charset="0"/>
                 <a:cs typeface="Arial" panose="020B0604020202020204" pitchFamily="34" charset="0"/>
               </a:rPr>
-              <a:t>The purpose of the agent module is to connect both monitors, the sequencer and the driver. An agent doesn’t require a run phase, there is no simulation code to be executed in this block but there will be a connect phase, in addition to the build phase.</a:t>
-            </a:r>
-          </a:p>
-          <a:p>
-            <a:pPr marL="0" marR="0">
+              <a:t> Construct the monitors, the sequencer and the driver in the build phase.</a:t>
+            </a:r>
+          </a:p>
+          <a:p>
+            <a:pPr>
               <a:lnSpc>
                 <a:spcPct val="107000"/>
               </a:lnSpc>
@@ -3616,17 +4509,15 @@
               </a:spcAft>
             </a:pPr>
             <a:r>
-              <a:rPr lang="en-US" sz="1800" dirty="0">
-                <a:effectLst/>
+              <a:rPr lang="en-US" dirty="0">
                 <a:latin typeface="Calibri" panose="020F0502020204030204" pitchFamily="34" charset="0"/>
-                <a:ea typeface="Calibri" panose="020F0502020204030204" pitchFamily="34" charset="0"/>
                 <a:cs typeface="Arial" panose="020B0604020202020204" pitchFamily="34" charset="0"/>
               </a:rPr>
-              <a:t>The Agent component will construct the monitors, the sequencer and the driver in the build phase. It will also need to create two analysis ports, these ports will act as proxies for the monitors to be connect to an external scoreboard through the agent’s ports.</a:t>
-            </a:r>
-          </a:p>
-          <a:p>
-            <a:pPr marL="0" marR="0">
+              <a:t>Create two analysis ports, these ports will act as proxies for the monitors to be connect to an external scoreboard through the agent’s ports. Using the concept of TLM ports, it can connect each port to its destination.</a:t>
+            </a:r>
+          </a:p>
+          <a:p>
+            <a:pPr>
               <a:lnSpc>
                 <a:spcPct val="107000"/>
               </a:lnSpc>
@@ -3638,19 +4529,26 @@
               </a:spcAft>
             </a:pPr>
             <a:r>
-              <a:rPr lang="en-US" sz="1800" dirty="0">
-                <a:effectLst/>
+              <a:rPr lang="en-US" dirty="0">
                 <a:latin typeface="Calibri" panose="020F0502020204030204" pitchFamily="34" charset="0"/>
-                <a:ea typeface="Calibri" panose="020F0502020204030204" pitchFamily="34" charset="0"/>
                 <a:cs typeface="Arial" panose="020B0604020202020204" pitchFamily="34" charset="0"/>
               </a:rPr>
-              <a:t>After it has constructed the components previously mentioned , the Agent has to make the connections between them. Using the concept of TLM ports, it can connect each port to its destination.</a:t>
-            </a:r>
-          </a:p>
-          <a:p>
-            <a:pPr marL="0" indent="0">
-              <a:buNone/>
-            </a:pPr>
+              <a:t>Connect b</a:t>
+            </a:r>
+            <a:r>
+              <a:rPr lang="en-US" sz="2800" dirty="0">
+                <a:latin typeface="Calibri" panose="020F0502020204030204" pitchFamily="34" charset="0"/>
+                <a:cs typeface="Arial" panose="020B0604020202020204" pitchFamily="34" charset="0"/>
+              </a:rPr>
+              <a:t>oth monitors, the sequencer and the Driver</a:t>
+            </a:r>
+            <a:r>
+              <a:rPr lang="en-US" dirty="0">
+                <a:latin typeface="Calibri" panose="020F0502020204030204" pitchFamily="34" charset="0"/>
+                <a:cs typeface="Arial" panose="020B0604020202020204" pitchFamily="34" charset="0"/>
+              </a:rPr>
+              <a:t>. </a:t>
+            </a:r>
             <a:endParaRPr lang="en-US" dirty="0"/>
           </a:p>
         </p:txBody>
@@ -4597,8 +5495,8 @@
           </a:p>
         </p:txBody>
       </p:sp>
-      <mc:AlternateContent xmlns:mc="http://schemas.openxmlformats.org/markup-compatibility/2006">
-        <mc:Choice xmlns:a14="http://schemas.microsoft.com/office/drawing/2010/main" Requires="a14">
+      <mc:AlternateContent xmlns:mc="http://schemas.openxmlformats.org/markup-compatibility/2006" xmlns:a14="http://schemas.microsoft.com/office/drawing/2010/main">
+        <mc:Choice Requires="a14">
           <p:sp>
             <p:nvSpPr>
               <p:cNvPr id="3" name="Content Placeholder 2">
@@ -4841,7 +5739,7 @@
             </p:txBody>
           </p:sp>
         </mc:Choice>
-        <mc:Fallback>
+        <mc:Fallback xmlns="">
           <p:sp>
             <p:nvSpPr>
               <p:cNvPr id="3" name="Content Placeholder 2">
@@ -10487,7 +11385,27 @@
                 <a:latin typeface="Calibri" panose="020F0502020204030204" pitchFamily="34" charset="0"/>
                 <a:cs typeface="Arial" panose="020B0604020202020204" pitchFamily="34" charset="0"/>
               </a:rPr>
-              <a:t>The purpose of hardware verification is to ensure that the devices performs this task successfully, i.e. the device is an accurate representation of the specification.  Bugs are only the result of the discrepancy between the device design and the device specification.</a:t>
+              <a:t>Ensure that the devices performs this task successfully, </a:t>
+            </a:r>
+          </a:p>
+          <a:p>
+            <a:pPr lvl="1"/>
+            <a:r>
+              <a:rPr lang="en-US" sz="2000" dirty="0">
+                <a:latin typeface="Calibri" panose="020F0502020204030204" pitchFamily="34" charset="0"/>
+                <a:cs typeface="Arial" panose="020B0604020202020204" pitchFamily="34" charset="0"/>
+              </a:rPr>
+              <a:t>the device is an accurate representation of the specification. </a:t>
+            </a:r>
+          </a:p>
+          <a:p>
+            <a:pPr lvl="1"/>
+            <a:r>
+              <a:rPr lang="en-US" sz="2000" dirty="0">
+                <a:latin typeface="Calibri" panose="020F0502020204030204" pitchFamily="34" charset="0"/>
+                <a:cs typeface="Arial" panose="020B0604020202020204" pitchFamily="34" charset="0"/>
+              </a:rPr>
+              <a:t> Bugs are only the result of the discrepancy between the device design and the device specification.</a:t>
             </a:r>
           </a:p>
           <a:p>
@@ -10504,7 +11422,58 @@
                 <a:latin typeface="Calibri" panose="020F0502020204030204" pitchFamily="34" charset="0"/>
                 <a:cs typeface="Arial" panose="020B0604020202020204" pitchFamily="34" charset="0"/>
               </a:rPr>
-              <a:t>Design verification (DV) is a large and complex domain that contains many technologies, languages, and methodologies, like UVM (Universal Verification Methodology),UPF (Unified Power Format) low-power verification and AMS (analog/mixed signal) verification</a:t>
+              <a:t>Design verification (DV)  contains different technologies, languages, and methodologies:</a:t>
+            </a:r>
+          </a:p>
+          <a:p>
+            <a:pPr lvl="1">
+              <a:lnSpc>
+                <a:spcPct val="107000"/>
+              </a:lnSpc>
+              <a:spcBef>
+                <a:spcPts val="0"/>
+              </a:spcBef>
+            </a:pPr>
+            <a:r>
+              <a:rPr lang="en-US" sz="2000" dirty="0">
+                <a:latin typeface="Calibri" panose="020F0502020204030204" pitchFamily="34" charset="0"/>
+                <a:cs typeface="Arial" panose="020B0604020202020204" pitchFamily="34" charset="0"/>
+              </a:rPr>
+              <a:t> UVM (Universal Verification Methodology)</a:t>
+            </a:r>
+          </a:p>
+          <a:p>
+            <a:pPr lvl="1">
+              <a:lnSpc>
+                <a:spcPct val="107000"/>
+              </a:lnSpc>
+              <a:spcBef>
+                <a:spcPts val="0"/>
+              </a:spcBef>
+            </a:pPr>
+            <a:r>
+              <a:rPr lang="en-US" sz="2000" dirty="0">
+                <a:latin typeface="Calibri" panose="020F0502020204030204" pitchFamily="34" charset="0"/>
+                <a:cs typeface="Arial" panose="020B0604020202020204" pitchFamily="34" charset="0"/>
+              </a:rPr>
+              <a:t>UPF (Unified Power Format) low-power verification</a:t>
+            </a:r>
+          </a:p>
+          <a:p>
+            <a:pPr lvl="1">
+              <a:lnSpc>
+                <a:spcPct val="107000"/>
+              </a:lnSpc>
+              <a:spcBef>
+                <a:spcPts val="0"/>
+              </a:spcBef>
+            </a:pPr>
+            <a:r>
+              <a:rPr lang="en-US" sz="2000" dirty="0">
+                <a:latin typeface="Calibri" panose="020F0502020204030204" pitchFamily="34" charset="0"/>
+                <a:cs typeface="Arial" panose="020B0604020202020204" pitchFamily="34" charset="0"/>
+              </a:rPr>
+              <a:t> AMS (analog/mixed signal) verification</a:t>
             </a:r>
           </a:p>
           <a:p>
@@ -12799,7 +13768,65 @@
                 <a:ea typeface="Calibri" panose="020F0502020204030204" pitchFamily="34" charset="0"/>
                 <a:cs typeface="Arial" panose="020B0604020202020204" pitchFamily="34" charset="0"/>
               </a:rPr>
-              <a:t>The primary advantage of the UVM is that this methodology specifies and lays out a set of guidelines to be followed for creation of verification testbenches. This fact ensures testbench uniformity between different verification teams, cross-compatibility between IPs and standalone environment integration, as well as flexibility and ease of maintaining testbenches. </a:t>
+              <a:t>The primary advantage of the UVM is that it specifies and lays out a set of guidelines to be followed for creation of verification testbenches. This fact ensures:</a:t>
+            </a:r>
+          </a:p>
+          <a:p>
+            <a:pPr lvl="1"/>
+            <a:r>
+              <a:rPr lang="en-US" sz="2000" dirty="0">
+                <a:effectLst/>
+                <a:latin typeface="Calibri" panose="020F0502020204030204" pitchFamily="34" charset="0"/>
+                <a:ea typeface="Calibri" panose="020F0502020204030204" pitchFamily="34" charset="0"/>
+                <a:cs typeface="Arial" panose="020B0604020202020204" pitchFamily="34" charset="0"/>
+              </a:rPr>
+              <a:t> testbench uniformity between different verification teams</a:t>
+            </a:r>
+          </a:p>
+          <a:p>
+            <a:pPr lvl="1"/>
+            <a:r>
+              <a:rPr lang="en-US" sz="2000" dirty="0">
+                <a:effectLst/>
+                <a:latin typeface="Calibri" panose="020F0502020204030204" pitchFamily="34" charset="0"/>
+                <a:ea typeface="Calibri" panose="020F0502020204030204" pitchFamily="34" charset="0"/>
+                <a:cs typeface="Arial" panose="020B0604020202020204" pitchFamily="34" charset="0"/>
+              </a:rPr>
+              <a:t> cross-compatibility between IPs </a:t>
+            </a:r>
+            <a:endParaRPr lang="en-US" sz="2000" dirty="0">
+              <a:latin typeface="Calibri" panose="020F0502020204030204" pitchFamily="34" charset="0"/>
+              <a:ea typeface="Calibri" panose="020F0502020204030204" pitchFamily="34" charset="0"/>
+              <a:cs typeface="Arial" panose="020B0604020202020204" pitchFamily="34" charset="0"/>
+            </a:endParaRPr>
+          </a:p>
+          <a:p>
+            <a:pPr lvl="1"/>
+            <a:r>
+              <a:rPr lang="en-US" sz="2000" dirty="0">
+                <a:effectLst/>
+                <a:latin typeface="Calibri" panose="020F0502020204030204" pitchFamily="34" charset="0"/>
+                <a:ea typeface="Calibri" panose="020F0502020204030204" pitchFamily="34" charset="0"/>
+                <a:cs typeface="Arial" panose="020B0604020202020204" pitchFamily="34" charset="0"/>
+              </a:rPr>
+              <a:t> standalone environment integration</a:t>
+            </a:r>
+            <a:endParaRPr lang="en-US" sz="2000" dirty="0">
+              <a:latin typeface="Calibri" panose="020F0502020204030204" pitchFamily="34" charset="0"/>
+              <a:ea typeface="Calibri" panose="020F0502020204030204" pitchFamily="34" charset="0"/>
+              <a:cs typeface="Arial" panose="020B0604020202020204" pitchFamily="34" charset="0"/>
+            </a:endParaRPr>
+          </a:p>
+          <a:p>
+            <a:pPr lvl="1"/>
+            <a:r>
+              <a:rPr lang="en-US" sz="2000" dirty="0">
+                <a:effectLst/>
+                <a:latin typeface="Calibri" panose="020F0502020204030204" pitchFamily="34" charset="0"/>
+                <a:ea typeface="Calibri" panose="020F0502020204030204" pitchFamily="34" charset="0"/>
+                <a:cs typeface="Arial" panose="020B0604020202020204" pitchFamily="34" charset="0"/>
+              </a:rPr>
+              <a:t> flexibility and ease of maintaining testbenches. </a:t>
             </a:r>
           </a:p>
           <a:p>
@@ -12810,7 +13837,18 @@
                 <a:ea typeface="Calibri" panose="020F0502020204030204" pitchFamily="34" charset="0"/>
                 <a:cs typeface="Arial" panose="020B0604020202020204" pitchFamily="34" charset="0"/>
               </a:rPr>
-              <a:t>Every verification environment has similar components like drivers, monitors, stimulus generators and scoreboards. UVM provides a build in base class for each of these components with standardized functions to instantiate, connect and build the test bench environment.</a:t>
+              <a:t>Every verification environment has similar components like drivers, monitors, stimulus generators and scoreboards. </a:t>
+            </a:r>
+          </a:p>
+          <a:p>
+            <a:r>
+              <a:rPr lang="en-US" sz="2400" dirty="0">
+                <a:effectLst/>
+                <a:latin typeface="Calibri" panose="020F0502020204030204" pitchFamily="34" charset="0"/>
+                <a:ea typeface="Calibri" panose="020F0502020204030204" pitchFamily="34" charset="0"/>
+                <a:cs typeface="Arial" panose="020B0604020202020204" pitchFamily="34" charset="0"/>
+              </a:rPr>
+              <a:t>UVM provides a build in base class for each of these components with standardized functions to instantiate, connect and build the test bench environment.</a:t>
             </a:r>
           </a:p>
           <a:p>
@@ -14797,7 +15835,7 @@
         <p:spPr/>
         <p:txBody>
           <a:bodyPr>
-            <a:normAutofit lnSpcReduction="10000"/>
+            <a:normAutofit/>
           </a:bodyPr>
           <a:lstStyle/>
           <a:p>
@@ -14820,128 +15858,15 @@
                 <a:ea typeface="Calibri" panose="020F0502020204030204" pitchFamily="34" charset="0"/>
                 <a:cs typeface="Arial" panose="020B0604020202020204" pitchFamily="34" charset="0"/>
               </a:rPr>
-              <a:t>The top block will create instances of the DUT, the Reference model and of the testbench. It will also declare the virtual interface, which will act as a bridge between the Test component and the DUT/Reference Model.</a:t>
-            </a:r>
-          </a:p>
-          <a:p>
-            <a:pPr marL="0" marR="0" indent="0">
-              <a:lnSpc>
-                <a:spcPct val="107000"/>
-              </a:lnSpc>
-              <a:spcBef>
-                <a:spcPts val="0"/>
-              </a:spcBef>
-              <a:spcAft>
-                <a:spcPts val="800"/>
-              </a:spcAft>
-              <a:buNone/>
-            </a:pPr>
+              <a:t>The top block </a:t>
+            </a:r>
             <a:r>
               <a:rPr lang="en-US" sz="2000" dirty="0">
-                <a:effectLst/>
                 <a:latin typeface="Calibri" panose="020F0502020204030204" pitchFamily="34" charset="0"/>
                 <a:ea typeface="Calibri" panose="020F0502020204030204" pitchFamily="34" charset="0"/>
                 <a:cs typeface="Arial" panose="020B0604020202020204" pitchFamily="34" charset="0"/>
               </a:rPr>
-              <a:t>The interface is a module that holds all the signals of the DUT. The monitor, the driver and the DUT are all going to be connected to this module.</a:t>
-            </a:r>
-          </a:p>
-          <a:p>
-            <a:pPr marL="0" marR="0" indent="0">
-              <a:lnSpc>
-                <a:spcPct val="107000"/>
-              </a:lnSpc>
-              <a:spcBef>
-                <a:spcPts val="0"/>
-              </a:spcBef>
-              <a:spcAft>
-                <a:spcPts val="800"/>
-              </a:spcAft>
-              <a:buNone/>
-            </a:pPr>
-            <a:r>
-              <a:rPr lang="en-US" sz="2000" dirty="0">
-                <a:effectLst/>
-                <a:latin typeface="Calibri" panose="020F0502020204030204" pitchFamily="34" charset="0"/>
-                <a:ea typeface="Calibri" panose="020F0502020204030204" pitchFamily="34" charset="0"/>
-                <a:cs typeface="Arial" panose="020B0604020202020204" pitchFamily="34" charset="0"/>
-              </a:rPr>
-              <a:t>This block will be a typical SystemVerilog module and it will be responsible for:</a:t>
-            </a:r>
-          </a:p>
-          <a:p>
-            <a:pPr>
-              <a:lnSpc>
-                <a:spcPct val="107000"/>
-              </a:lnSpc>
-              <a:spcBef>
-                <a:spcPts val="0"/>
-              </a:spcBef>
-            </a:pPr>
-            <a:r>
-              <a:rPr lang="en-US" sz="2000" dirty="0">
-                <a:effectLst/>
-                <a:latin typeface="Calibri" panose="020F0502020204030204" pitchFamily="34" charset="0"/>
-                <a:ea typeface="Calibri" panose="020F0502020204030204" pitchFamily="34" charset="0"/>
-                <a:cs typeface="Arial" panose="020B0604020202020204" pitchFamily="34" charset="0"/>
-              </a:rPr>
-              <a:t>Connecting the DUT and Reference Model to the test class, using the interface defined before.</a:t>
-            </a:r>
-          </a:p>
-          <a:p>
-            <a:pPr>
-              <a:lnSpc>
-                <a:spcPct val="107000"/>
-              </a:lnSpc>
-              <a:spcBef>
-                <a:spcPts val="0"/>
-              </a:spcBef>
-            </a:pPr>
-            <a:r>
-              <a:rPr lang="en-US" sz="2000" dirty="0">
-                <a:effectLst/>
-                <a:latin typeface="Calibri" panose="020F0502020204030204" pitchFamily="34" charset="0"/>
-                <a:ea typeface="Calibri" panose="020F0502020204030204" pitchFamily="34" charset="0"/>
-                <a:cs typeface="Arial" panose="020B0604020202020204" pitchFamily="34" charset="0"/>
-              </a:rPr>
-              <a:t>Generating the clock for the DUT.</a:t>
-            </a:r>
-          </a:p>
-          <a:p>
-            <a:pPr>
-              <a:lnSpc>
-                <a:spcPct val="107000"/>
-              </a:lnSpc>
-              <a:spcBef>
-                <a:spcPts val="0"/>
-              </a:spcBef>
-            </a:pPr>
-            <a:r>
-              <a:rPr lang="en-US" sz="2000" dirty="0">
-                <a:effectLst/>
-                <a:latin typeface="Calibri" panose="020F0502020204030204" pitchFamily="34" charset="0"/>
-                <a:ea typeface="Calibri" panose="020F0502020204030204" pitchFamily="34" charset="0"/>
-                <a:cs typeface="Arial" panose="020B0604020202020204" pitchFamily="34" charset="0"/>
-              </a:rPr>
-              <a:t>Registering the interface in the UVM factory. This is necessary in order to pass this interface to all other classes that will be instantiated in the testbench. It will be registered in the UVM factory by using the </a:t>
-            </a:r>
-            <a:r>
-              <a:rPr lang="en-US" sz="2000" dirty="0" err="1">
-                <a:effectLst/>
-                <a:latin typeface="Calibri" panose="020F0502020204030204" pitchFamily="34" charset="0"/>
-                <a:ea typeface="Calibri" panose="020F0502020204030204" pitchFamily="34" charset="0"/>
-                <a:cs typeface="Arial" panose="020B0604020202020204" pitchFamily="34" charset="0"/>
-              </a:rPr>
-              <a:t>uvm_resource_db</a:t>
-            </a:r>
-            <a:r>
-              <a:rPr lang="en-US" sz="2000" dirty="0">
-                <a:effectLst/>
-                <a:latin typeface="Calibri" panose="020F0502020204030204" pitchFamily="34" charset="0"/>
-                <a:ea typeface="Calibri" panose="020F0502020204030204" pitchFamily="34" charset="0"/>
-                <a:cs typeface="Arial" panose="020B0604020202020204" pitchFamily="34" charset="0"/>
-              </a:rPr>
-              <a:t> method and every block that will use the same interface, will need to get it by calling the same method. </a:t>
+              <a:t>is responsible for:</a:t>
             </a:r>
           </a:p>
           <a:p>
@@ -14961,6 +15886,116 @@
                 <a:effectLst/>
                 <a:latin typeface="Calibri" panose="020F0502020204030204" pitchFamily="34" charset="0"/>
                 <a:ea typeface="Calibri" panose="020F0502020204030204" pitchFamily="34" charset="0"/>
+                <a:cs typeface="Arial" panose="020B0604020202020204" pitchFamily="34" charset="0"/>
+              </a:rPr>
+              <a:t> </a:t>
+            </a:r>
+            <a:r>
+              <a:rPr lang="en-US" sz="2000" dirty="0">
+                <a:latin typeface="Calibri" panose="020F0502020204030204" pitchFamily="34" charset="0"/>
+                <a:ea typeface="Calibri" panose="020F0502020204030204" pitchFamily="34" charset="0"/>
+                <a:cs typeface="Arial" panose="020B0604020202020204" pitchFamily="34" charset="0"/>
+              </a:rPr>
+              <a:t>C</a:t>
+            </a:r>
+            <a:r>
+              <a:rPr lang="en-US" sz="2000" dirty="0">
+                <a:effectLst/>
+                <a:latin typeface="Calibri" panose="020F0502020204030204" pitchFamily="34" charset="0"/>
+                <a:ea typeface="Calibri" panose="020F0502020204030204" pitchFamily="34" charset="0"/>
+                <a:cs typeface="Arial" panose="020B0604020202020204" pitchFamily="34" charset="0"/>
+              </a:rPr>
+              <a:t>reate instances of the DUT, the Reference model and of the testbench. </a:t>
+            </a:r>
+          </a:p>
+          <a:p>
+            <a:pPr>
+              <a:lnSpc>
+                <a:spcPct val="107000"/>
+              </a:lnSpc>
+              <a:spcBef>
+                <a:spcPts val="0"/>
+              </a:spcBef>
+              <a:spcAft>
+                <a:spcPts val="800"/>
+              </a:spcAft>
+            </a:pPr>
+            <a:r>
+              <a:rPr lang="en-US" sz="2000" dirty="0">
+                <a:effectLst/>
+                <a:latin typeface="Calibri" panose="020F0502020204030204" pitchFamily="34" charset="0"/>
+                <a:ea typeface="Calibri" panose="020F0502020204030204" pitchFamily="34" charset="0"/>
+                <a:cs typeface="Arial" panose="020B0604020202020204" pitchFamily="34" charset="0"/>
+              </a:rPr>
+              <a:t>Declare the virtual interface, which will act as a bridge between the Test component and the DUT/Reference Model.(The interface is a module that holds all the signals of the DUT. The monitor, the driver and the DUT are all going to be connected to this module.)</a:t>
+            </a:r>
+          </a:p>
+          <a:p>
+            <a:pPr>
+              <a:lnSpc>
+                <a:spcPct val="107000"/>
+              </a:lnSpc>
+              <a:spcBef>
+                <a:spcPts val="0"/>
+              </a:spcBef>
+              <a:spcAft>
+                <a:spcPts val="800"/>
+              </a:spcAft>
+            </a:pPr>
+            <a:r>
+              <a:rPr lang="en-US" sz="2000" dirty="0">
+                <a:latin typeface="Calibri" panose="020F0502020204030204" pitchFamily="34" charset="0"/>
+                <a:cs typeface="Arial" panose="020B0604020202020204" pitchFamily="34" charset="0"/>
+              </a:rPr>
+              <a:t>Connecting the DUT and Reference Model to the test class, using the interface defined before.</a:t>
+            </a:r>
+          </a:p>
+          <a:p>
+            <a:pPr>
+              <a:lnSpc>
+                <a:spcPct val="107000"/>
+              </a:lnSpc>
+              <a:spcBef>
+                <a:spcPts val="0"/>
+              </a:spcBef>
+            </a:pPr>
+            <a:r>
+              <a:rPr lang="en-US" sz="2000" dirty="0">
+                <a:latin typeface="Calibri" panose="020F0502020204030204" pitchFamily="34" charset="0"/>
+                <a:cs typeface="Arial" panose="020B0604020202020204" pitchFamily="34" charset="0"/>
+              </a:rPr>
+              <a:t>Generating the clock for the DUT.</a:t>
+            </a:r>
+          </a:p>
+          <a:p>
+            <a:pPr>
+              <a:lnSpc>
+                <a:spcPct val="107000"/>
+              </a:lnSpc>
+              <a:spcBef>
+                <a:spcPts val="0"/>
+              </a:spcBef>
+            </a:pPr>
+            <a:r>
+              <a:rPr lang="en-US" sz="2000" dirty="0">
+                <a:latin typeface="Calibri" panose="020F0502020204030204" pitchFamily="34" charset="0"/>
+                <a:cs typeface="Arial" panose="020B0604020202020204" pitchFamily="34" charset="0"/>
+              </a:rPr>
+              <a:t>Registering the interface in the UVM factory. (This is necessary in order to pass this interface to all other classes that will be instantiated in the testbench. )</a:t>
+            </a:r>
+          </a:p>
+          <a:p>
+            <a:pPr>
+              <a:lnSpc>
+                <a:spcPct val="107000"/>
+              </a:lnSpc>
+              <a:spcBef>
+                <a:spcPts val="0"/>
+              </a:spcBef>
+            </a:pPr>
+            <a:r>
+              <a:rPr lang="en-US" sz="2000" dirty="0">
+                <a:latin typeface="Calibri" panose="020F0502020204030204" pitchFamily="34" charset="0"/>
                 <a:cs typeface="Arial" panose="020B0604020202020204" pitchFamily="34" charset="0"/>
               </a:rPr>
               <a:t>Running the test.</a:t>
@@ -15055,11 +16090,13 @@
           </a:xfrm>
         </p:spPr>
         <p:txBody>
-          <a:bodyPr/>
+          <a:bodyPr>
+            <a:normAutofit/>
+          </a:bodyPr>
           <a:lstStyle/>
           <a:p>
             <a:r>
-              <a:rPr lang="en-US" sz="1800" dirty="0">
+              <a:rPr lang="en-US" sz="2000" dirty="0">
                 <a:effectLst/>
                 <a:latin typeface="Calibri" panose="020F0502020204030204" pitchFamily="34" charset="0"/>
                 <a:ea typeface="Calibri" panose="020F0502020204030204" pitchFamily="34" charset="0"/>
@@ -15068,7 +16105,7 @@
               <a:t>A transaction is a class object, usually extended from </a:t>
             </a:r>
             <a:r>
-              <a:rPr lang="en-US" sz="1800" dirty="0" err="1">
+              <a:rPr lang="en-US" sz="2000" dirty="0" err="1">
                 <a:effectLst/>
                 <a:latin typeface="Calibri" panose="020F0502020204030204" pitchFamily="34" charset="0"/>
                 <a:ea typeface="Calibri" panose="020F0502020204030204" pitchFamily="34" charset="0"/>
@@ -15077,7 +16114,7 @@
               <a:t>uvm_transaction</a:t>
             </a:r>
             <a:r>
-              <a:rPr lang="en-US" sz="1800" dirty="0">
+              <a:rPr lang="en-US" sz="2000" dirty="0">
                 <a:effectLst/>
                 <a:latin typeface="Calibri" panose="020F0502020204030204" pitchFamily="34" charset="0"/>
                 <a:ea typeface="Calibri" panose="020F0502020204030204" pitchFamily="34" charset="0"/>
@@ -15086,7 +16123,7 @@
               <a:t> or </a:t>
             </a:r>
             <a:r>
-              <a:rPr lang="en-US" sz="1800" dirty="0" err="1">
+              <a:rPr lang="en-US" sz="2000" dirty="0" err="1">
                 <a:effectLst/>
                 <a:latin typeface="Calibri" panose="020F0502020204030204" pitchFamily="34" charset="0"/>
                 <a:ea typeface="Calibri" panose="020F0502020204030204" pitchFamily="34" charset="0"/>
@@ -15095,7 +16132,7 @@
               <a:t>uvm_sequence_item</a:t>
             </a:r>
             <a:r>
-              <a:rPr lang="en-US" sz="1800" dirty="0">
+              <a:rPr lang="en-US" sz="2000" dirty="0">
                 <a:effectLst/>
                 <a:latin typeface="Calibri" panose="020F0502020204030204" pitchFamily="34" charset="0"/>
                 <a:ea typeface="Calibri" panose="020F0502020204030204" pitchFamily="34" charset="0"/>
@@ -15106,7 +16143,7 @@
           </a:p>
           <a:p>
             <a:r>
-              <a:rPr lang="en-US" sz="1800" dirty="0">
+              <a:rPr lang="en-US" sz="2000" dirty="0">
                 <a:effectLst/>
                 <a:latin typeface="Calibri" panose="020F0502020204030204" pitchFamily="34" charset="0"/>
                 <a:ea typeface="Calibri" panose="020F0502020204030204" pitchFamily="34" charset="0"/>
@@ -15117,7 +16154,7 @@
           </a:p>
           <a:p>
             <a:r>
-              <a:rPr lang="en-US" sz="1800" dirty="0">
+              <a:rPr lang="en-US" sz="2000" dirty="0">
                 <a:latin typeface="Calibri" panose="020F0502020204030204" pitchFamily="34" charset="0"/>
                 <a:ea typeface="Calibri" panose="020F0502020204030204" pitchFamily="34" charset="0"/>
                 <a:cs typeface="Arial" panose="020B0604020202020204" pitchFamily="34" charset="0"/>
@@ -15125,7 +16162,7 @@
               <a:t>T</a:t>
             </a:r>
             <a:r>
-              <a:rPr lang="en-US" sz="1800" dirty="0">
+              <a:rPr lang="en-US" sz="2000" dirty="0">
                 <a:effectLst/>
                 <a:latin typeface="Calibri" panose="020F0502020204030204" pitchFamily="34" charset="0"/>
                 <a:ea typeface="Calibri" panose="020F0502020204030204" pitchFamily="34" charset="0"/>
@@ -15134,7 +16171,7 @@
               <a:t>he sequencer</a:t>
             </a:r>
             <a:r>
-              <a:rPr lang="en-US" sz="1800" dirty="0">
+              <a:rPr lang="en-US" sz="2000" dirty="0">
                 <a:solidFill>
                   <a:srgbClr val="FF0000"/>
                 </a:solidFill>
@@ -15146,7 +16183,7 @@
               <a:t> </a:t>
             </a:r>
             <a:r>
-              <a:rPr lang="en-US" sz="1800" dirty="0">
+              <a:rPr lang="en-US" sz="2000" dirty="0">
                 <a:effectLst/>
                 <a:latin typeface="Calibri" panose="020F0502020204030204" pitchFamily="34" charset="0"/>
                 <a:ea typeface="Calibri" panose="020F0502020204030204" pitchFamily="34" charset="0"/>
@@ -15155,7 +16192,7 @@
               <a:t>transfers one transaction at the time from the sequence</a:t>
             </a:r>
             <a:r>
-              <a:rPr lang="en-US" sz="1800" dirty="0">
+              <a:rPr lang="en-US" sz="2000" dirty="0">
                 <a:solidFill>
                   <a:srgbClr val="FF0000"/>
                 </a:solidFill>
@@ -15167,7 +16204,7 @@
               <a:t> </a:t>
             </a:r>
             <a:r>
-              <a:rPr lang="en-US" sz="1800" dirty="0">
+              <a:rPr lang="en-US" sz="2000" dirty="0">
                 <a:effectLst/>
                 <a:latin typeface="Calibri" panose="020F0502020204030204" pitchFamily="34" charset="0"/>
                 <a:ea typeface="Calibri" panose="020F0502020204030204" pitchFamily="34" charset="0"/>
@@ -15175,7 +16212,7 @@
               </a:rPr>
               <a:t>to the driver</a:t>
             </a:r>
-            <a:endParaRPr lang="en-US" dirty="0"/>
+            <a:endParaRPr lang="en-US" sz="3200" dirty="0"/>
           </a:p>
         </p:txBody>
       </p:sp>
@@ -15298,13 +16335,24 @@
           <a:lstStyle/>
           <a:p>
             <a:r>
-              <a:rPr lang="en-US" sz="1800" dirty="0">
+              <a:rPr lang="en-US" sz="2400" dirty="0">
                 <a:effectLst/>
                 <a:latin typeface="Calibri" panose="020F0502020204030204" pitchFamily="34" charset="0"/>
                 <a:ea typeface="Calibri" panose="020F0502020204030204" pitchFamily="34" charset="0"/>
                 <a:cs typeface="Arial" panose="020B0604020202020204" pitchFamily="34" charset="0"/>
               </a:rPr>
-              <a:t>The driver is a block whose role is to interact with the DUT. The driver pulls transactions from the sequencer and sends them repetitively to the signal-level interface. This interaction will be observed and evaluated by another block, the monitor, and as a result, the driver’s functionality should only be limited to sending the necessary data to the DUT.</a:t>
+              <a:t>The driver is a block whose role is to interact with the DUT.</a:t>
+            </a:r>
+          </a:p>
+          <a:p>
+            <a:r>
+              <a:rPr lang="en-US" sz="2400" dirty="0">
+                <a:effectLst/>
+                <a:latin typeface="Calibri" panose="020F0502020204030204" pitchFamily="34" charset="0"/>
+                <a:ea typeface="Calibri" panose="020F0502020204030204" pitchFamily="34" charset="0"/>
+                <a:cs typeface="Arial" panose="020B0604020202020204" pitchFamily="34" charset="0"/>
+              </a:rPr>
+              <a:t> The driver pulls transactions from the sequencer and sends them repetitively to the signal-level interface. This interaction will be observed and evaluated by another block, the monitor, and as a result, the driver’s functionality should only be limited to sending the necessary data to the DUT.</a:t>
             </a:r>
           </a:p>
           <a:p>
@@ -15406,13 +16454,13 @@
               </a:spcAft>
             </a:pPr>
             <a:r>
-              <a:rPr lang="en-US" sz="1800" dirty="0">
+              <a:rPr lang="en-US" sz="2400" dirty="0">
                 <a:effectLst/>
                 <a:latin typeface="Calibri" panose="020F0502020204030204" pitchFamily="34" charset="0"/>
                 <a:ea typeface="Calibri" panose="020F0502020204030204" pitchFamily="34" charset="0"/>
                 <a:cs typeface="Arial" panose="020B0604020202020204" pitchFamily="34" charset="0"/>
               </a:rPr>
-              <a:t>The monitor is a self-contained model that observes the communication of the DUT with the testbench. At most, it should observe the outputs of the design and, in cases where the protocol’s rules are not respected, the monitor must return an error.</a:t>
+              <a:t>The monitor observes the communication of the DUT with the testbench. </a:t>
             </a:r>
           </a:p>
           <a:p>
@@ -15428,13 +16476,13 @@
               </a:spcAft>
             </a:pPr>
             <a:r>
-              <a:rPr lang="en-US" sz="1800" dirty="0">
+              <a:rPr lang="en-US" sz="2400" dirty="0">
                 <a:effectLst/>
                 <a:latin typeface="Calibri" panose="020F0502020204030204" pitchFamily="34" charset="0"/>
                 <a:ea typeface="Calibri" panose="020F0502020204030204" pitchFamily="34" charset="0"/>
                 <a:cs typeface="Arial" panose="020B0604020202020204" pitchFamily="34" charset="0"/>
               </a:rPr>
-              <a:t>The monitor is a passive component, it doesn’t drive any signals into the DUT, its purpose is to extract signal information and translate it into meaningful information to be evaluated by other components. A verification environment is not limited to just one monitor, it can have multiple monitors. In the case of this project, the environment will have two monitors: one for the DUT and one for the Reference Model.</a:t>
+              <a:t>The monitor is a passive component, it doesn’t drive any signals into the DUT, its purpose is to extract signal information and translate it into meaningful information to be evaluated by other components.</a:t>
             </a:r>
           </a:p>
           <a:p>
@@ -15450,7 +16498,29 @@
               </a:spcAft>
             </a:pPr>
             <a:r>
-              <a:rPr lang="en-US" sz="1800" dirty="0">
+              <a:rPr lang="en-US" sz="2400" dirty="0">
+                <a:effectLst/>
+                <a:latin typeface="Calibri" panose="020F0502020204030204" pitchFamily="34" charset="0"/>
+                <a:ea typeface="Calibri" panose="020F0502020204030204" pitchFamily="34" charset="0"/>
+                <a:cs typeface="Arial" panose="020B0604020202020204" pitchFamily="34" charset="0"/>
+              </a:rPr>
+              <a:t> A verification environment is not limited to just one monitor, it can have multiple monitors. In the case of this project, the environment will have two monitors: one for the DUT and one for the Reference Model.</a:t>
+            </a:r>
+          </a:p>
+          <a:p>
+            <a:pPr marL="0" marR="0">
+              <a:lnSpc>
+                <a:spcPct val="107000"/>
+              </a:lnSpc>
+              <a:spcBef>
+                <a:spcPts val="0"/>
+              </a:spcBef>
+              <a:spcAft>
+                <a:spcPts val="800"/>
+              </a:spcAft>
+            </a:pPr>
+            <a:r>
+              <a:rPr lang="en-US" sz="2400" dirty="0">
                 <a:effectLst/>
                 <a:latin typeface="Calibri" panose="020F0502020204030204" pitchFamily="34" charset="0"/>
                 <a:ea typeface="Calibri" panose="020F0502020204030204" pitchFamily="34" charset="0"/>
@@ -15773,4 +16843,299 @@
     </a:ext>
   </a:extLst>
 </a:theme>
+</file>
+
+<file path=ppt/theme/theme2.xml><?xml version="1.0" encoding="utf-8"?>
+<a:theme xmlns:a="http://schemas.openxmlformats.org/drawingml/2006/main" name="Office Theme">
+  <a:themeElements>
+    <a:clrScheme name="Office">
+      <a:dk1>
+        <a:sysClr val="windowText" lastClr="000000"/>
+      </a:dk1>
+      <a:lt1>
+        <a:sysClr val="window" lastClr="FFFFFF"/>
+      </a:lt1>
+      <a:dk2>
+        <a:srgbClr val="44546A"/>
+      </a:dk2>
+      <a:lt2>
+        <a:srgbClr val="E7E6E6"/>
+      </a:lt2>
+      <a:accent1>
+        <a:srgbClr val="4472C4"/>
+      </a:accent1>
+      <a:accent2>
+        <a:srgbClr val="ED7D31"/>
+      </a:accent2>
+      <a:accent3>
+        <a:srgbClr val="A5A5A5"/>
+      </a:accent3>
+      <a:accent4>
+        <a:srgbClr val="FFC000"/>
+      </a:accent4>
+      <a:accent5>
+        <a:srgbClr val="5B9BD5"/>
+      </a:accent5>
+      <a:accent6>
+        <a:srgbClr val="70AD47"/>
+      </a:accent6>
+      <a:hlink>
+        <a:srgbClr val="0563C1"/>
+      </a:hlink>
+      <a:folHlink>
+        <a:srgbClr val="954F72"/>
+      </a:folHlink>
+    </a:clrScheme>
+    <a:fontScheme name="Office">
+      <a:majorFont>
+        <a:latin typeface="Calibri Light" panose="020F0302020204030204"/>
+        <a:ea typeface=""/>
+        <a:cs typeface=""/>
+        <a:font script="Jpan" typeface="游ゴシック Light"/>
+        <a:font script="Hang" typeface="맑은 고딕"/>
+        <a:font script="Hans" typeface="等线 Light"/>
+        <a:font script="Hant" typeface="新細明體"/>
+        <a:font script="Arab" typeface="Times New Roman"/>
+        <a:font script="Hebr" typeface="Times New Roman"/>
+        <a:font script="Thai" typeface="Angsana New"/>
+        <a:font script="Ethi" typeface="Nyala"/>
+        <a:font script="Beng" typeface="Vrinda"/>
+        <a:font script="Gujr" typeface="Shruti"/>
+        <a:font script="Khmr" typeface="MoolBoran"/>
+        <a:font script="Knda" typeface="Tunga"/>
+        <a:font script="Guru" typeface="Raavi"/>
+        <a:font script="Cans" typeface="Euphemia"/>
+        <a:font script="Cher" typeface="Plantagenet Cherokee"/>
+        <a:font script="Yiii" typeface="Microsoft Yi Baiti"/>
+        <a:font script="Tibt" typeface="Microsoft Himalaya"/>
+        <a:font script="Thaa" typeface="MV Boli"/>
+        <a:font script="Deva" typeface="Mangal"/>
+        <a:font script="Telu" typeface="Gautami"/>
+        <a:font script="Taml" typeface="Latha"/>
+        <a:font script="Syrc" typeface="Estrangelo Edessa"/>
+        <a:font script="Orya" typeface="Kalinga"/>
+        <a:font script="Mlym" typeface="Kartika"/>
+        <a:font script="Laoo" typeface="DokChampa"/>
+        <a:font script="Sinh" typeface="Iskoola Pota"/>
+        <a:font script="Mong" typeface="Mongolian Baiti"/>
+        <a:font script="Viet" typeface="Times New Roman"/>
+        <a:font script="Uigh" typeface="Microsoft Uighur"/>
+        <a:font script="Geor" typeface="Sylfaen"/>
+        <a:font script="Armn" typeface="Arial"/>
+        <a:font script="Bugi" typeface="Leelawadee UI"/>
+        <a:font script="Bopo" typeface="Microsoft JhengHei"/>
+        <a:font script="Java" typeface="Javanese Text"/>
+        <a:font script="Lisu" typeface="Segoe UI"/>
+        <a:font script="Mymr" typeface="Myanmar Text"/>
+        <a:font script="Nkoo" typeface="Ebrima"/>
+        <a:font script="Olck" typeface="Nirmala UI"/>
+        <a:font script="Osma" typeface="Ebrima"/>
+        <a:font script="Phag" typeface="Phagspa"/>
+        <a:font script="Syrn" typeface="Estrangelo Edessa"/>
+        <a:font script="Syrj" typeface="Estrangelo Edessa"/>
+        <a:font script="Syre" typeface="Estrangelo Edessa"/>
+        <a:font script="Sora" typeface="Nirmala UI"/>
+        <a:font script="Tale" typeface="Microsoft Tai Le"/>
+        <a:font script="Talu" typeface="Microsoft New Tai Lue"/>
+        <a:font script="Tfng" typeface="Ebrima"/>
+      </a:majorFont>
+      <a:minorFont>
+        <a:latin typeface="Calibri" panose="020F0502020204030204"/>
+        <a:ea typeface=""/>
+        <a:cs typeface=""/>
+        <a:font script="Jpan" typeface="游ゴシック"/>
+        <a:font script="Hang" typeface="맑은 고딕"/>
+        <a:font script="Hans" typeface="等线"/>
+        <a:font script="Hant" typeface="新細明體"/>
+        <a:font script="Arab" typeface="Arial"/>
+        <a:font script="Hebr" typeface="Arial"/>
+        <a:font script="Thai" typeface="Cordia New"/>
+        <a:font script="Ethi" typeface="Nyala"/>
+        <a:font script="Beng" typeface="Vrinda"/>
+        <a:font script="Gujr" typeface="Shruti"/>
+        <a:font script="Khmr" typeface="DaunPenh"/>
+        <a:font script="Knda" typeface="Tunga"/>
+        <a:font script="Guru" typeface="Raavi"/>
+        <a:font script="Cans" typeface="Euphemia"/>
+        <a:font script="Cher" typeface="Plantagenet Cherokee"/>
+        <a:font script="Yiii" typeface="Microsoft Yi Baiti"/>
+        <a:font script="Tibt" typeface="Microsoft Himalaya"/>
+        <a:font script="Thaa" typeface="MV Boli"/>
+        <a:font script="Deva" typeface="Mangal"/>
+        <a:font script="Telu" typeface="Gautami"/>
+        <a:font script="Taml" typeface="Latha"/>
+        <a:font script="Syrc" typeface="Estrangelo Edessa"/>
+        <a:font script="Orya" typeface="Kalinga"/>
+        <a:font script="Mlym" typeface="Kartika"/>
+        <a:font script="Laoo" typeface="DokChampa"/>
+        <a:font script="Sinh" typeface="Iskoola Pota"/>
+        <a:font script="Mong" typeface="Mongolian Baiti"/>
+        <a:font script="Viet" typeface="Arial"/>
+        <a:font script="Uigh" typeface="Microsoft Uighur"/>
+        <a:font script="Geor" typeface="Sylfaen"/>
+        <a:font script="Armn" typeface="Arial"/>
+        <a:font script="Bugi" typeface="Leelawadee UI"/>
+        <a:font script="Bopo" typeface="Microsoft JhengHei"/>
+        <a:font script="Java" typeface="Javanese Text"/>
+        <a:font script="Lisu" typeface="Segoe UI"/>
+        <a:font script="Mymr" typeface="Myanmar Text"/>
+        <a:font script="Nkoo" typeface="Ebrima"/>
+        <a:font script="Olck" typeface="Nirmala UI"/>
+        <a:font script="Osma" typeface="Ebrima"/>
+        <a:font script="Phag" typeface="Phagspa"/>
+        <a:font script="Syrn" typeface="Estrangelo Edessa"/>
+        <a:font script="Syrj" typeface="Estrangelo Edessa"/>
+        <a:font script="Syre" typeface="Estrangelo Edessa"/>
+        <a:font script="Sora" typeface="Nirmala UI"/>
+        <a:font script="Tale" typeface="Microsoft Tai Le"/>
+        <a:font script="Talu" typeface="Microsoft New Tai Lue"/>
+        <a:font script="Tfng" typeface="Ebrima"/>
+      </a:minorFont>
+    </a:fontScheme>
+    <a:fmtScheme name="Office">
+      <a:fillStyleLst>
+        <a:solidFill>
+          <a:schemeClr val="phClr"/>
+        </a:solidFill>
+        <a:gradFill rotWithShape="1">
+          <a:gsLst>
+            <a:gs pos="0">
+              <a:schemeClr val="phClr">
+                <a:lumMod val="110000"/>
+                <a:satMod val="105000"/>
+                <a:tint val="67000"/>
+              </a:schemeClr>
+            </a:gs>
+            <a:gs pos="50000">
+              <a:schemeClr val="phClr">
+                <a:lumMod val="105000"/>
+                <a:satMod val="103000"/>
+                <a:tint val="73000"/>
+              </a:schemeClr>
+            </a:gs>
+            <a:gs pos="100000">
+              <a:schemeClr val="phClr">
+                <a:lumMod val="105000"/>
+                <a:satMod val="109000"/>
+                <a:tint val="81000"/>
+              </a:schemeClr>
+            </a:gs>
+          </a:gsLst>
+          <a:lin ang="5400000" scaled="0"/>
+        </a:gradFill>
+        <a:gradFill rotWithShape="1">
+          <a:gsLst>
+            <a:gs pos="0">
+              <a:schemeClr val="phClr">
+                <a:satMod val="103000"/>
+                <a:lumMod val="102000"/>
+                <a:tint val="94000"/>
+              </a:schemeClr>
+            </a:gs>
+            <a:gs pos="50000">
+              <a:schemeClr val="phClr">
+                <a:satMod val="110000"/>
+                <a:lumMod val="100000"/>
+                <a:shade val="100000"/>
+              </a:schemeClr>
+            </a:gs>
+            <a:gs pos="100000">
+              <a:schemeClr val="phClr">
+                <a:lumMod val="99000"/>
+                <a:satMod val="120000"/>
+                <a:shade val="78000"/>
+              </a:schemeClr>
+            </a:gs>
+          </a:gsLst>
+          <a:lin ang="5400000" scaled="0"/>
+        </a:gradFill>
+      </a:fillStyleLst>
+      <a:lnStyleLst>
+        <a:ln w="6350" cap="flat" cmpd="sng" algn="ctr">
+          <a:solidFill>
+            <a:schemeClr val="phClr"/>
+          </a:solidFill>
+          <a:prstDash val="solid"/>
+          <a:miter lim="800000"/>
+        </a:ln>
+        <a:ln w="12700" cap="flat" cmpd="sng" algn="ctr">
+          <a:solidFill>
+            <a:schemeClr val="phClr"/>
+          </a:solidFill>
+          <a:prstDash val="solid"/>
+          <a:miter lim="800000"/>
+        </a:ln>
+        <a:ln w="19050" cap="flat" cmpd="sng" algn="ctr">
+          <a:solidFill>
+            <a:schemeClr val="phClr"/>
+          </a:solidFill>
+          <a:prstDash val="solid"/>
+          <a:miter lim="800000"/>
+        </a:ln>
+      </a:lnStyleLst>
+      <a:effectStyleLst>
+        <a:effectStyle>
+          <a:effectLst/>
+        </a:effectStyle>
+        <a:effectStyle>
+          <a:effectLst/>
+        </a:effectStyle>
+        <a:effectStyle>
+          <a:effectLst>
+            <a:outerShdw blurRad="57150" dist="19050" dir="5400000" algn="ctr" rotWithShape="0">
+              <a:srgbClr val="000000">
+                <a:alpha val="63000"/>
+              </a:srgbClr>
+            </a:outerShdw>
+          </a:effectLst>
+        </a:effectStyle>
+      </a:effectStyleLst>
+      <a:bgFillStyleLst>
+        <a:solidFill>
+          <a:schemeClr val="phClr"/>
+        </a:solidFill>
+        <a:solidFill>
+          <a:schemeClr val="phClr">
+            <a:tint val="95000"/>
+            <a:satMod val="170000"/>
+          </a:schemeClr>
+        </a:solidFill>
+        <a:gradFill rotWithShape="1">
+          <a:gsLst>
+            <a:gs pos="0">
+              <a:schemeClr val="phClr">
+                <a:tint val="93000"/>
+                <a:satMod val="150000"/>
+                <a:shade val="98000"/>
+                <a:lumMod val="102000"/>
+              </a:schemeClr>
+            </a:gs>
+            <a:gs pos="50000">
+              <a:schemeClr val="phClr">
+                <a:tint val="98000"/>
+                <a:satMod val="130000"/>
+                <a:shade val="90000"/>
+                <a:lumMod val="103000"/>
+              </a:schemeClr>
+            </a:gs>
+            <a:gs pos="100000">
+              <a:schemeClr val="phClr">
+                <a:shade val="63000"/>
+                <a:satMod val="120000"/>
+              </a:schemeClr>
+            </a:gs>
+          </a:gsLst>
+          <a:lin ang="5400000" scaled="0"/>
+        </a:gradFill>
+      </a:bgFillStyleLst>
+    </a:fmtScheme>
+  </a:themeElements>
+  <a:objectDefaults/>
+  <a:extraClrSchemeLst/>
+  <a:extLst>
+    <a:ext uri="{05A4C25C-085E-4340-85A3-A5531E510DB2}">
+      <thm15:themeFamily xmlns:thm15="http://schemas.microsoft.com/office/thememl/2012/main" name="Office Theme" id="{62F939B6-93AF-4DB8-9C6B-D6C7DFDC589F}" vid="{4A3C46E8-61CC-4603-A589-7422A47A8E4A}"/>
+    </a:ext>
+  </a:extLst>
+</a:theme>
 </file>
</xml_diff>

<commit_message>
final ptt fixes done
</commit_message>
<xml_diff>
--- a/Final presentation.pptx
+++ b/Final presentation.pptx
@@ -240,7 +240,7 @@
           <a:p>
             <a:fld id="{B2E107C9-5FE0-4864-97C4-A8FF847E0675}" type="datetimeFigureOut">
               <a:rPr lang="en-US" smtClean="0"/>
-              <a:t>12/26/2020</a:t>
+              <a:t>12/27/2020</a:t>
             </a:fld>
             <a:endParaRPr lang="en-US"/>
           </a:p>
@@ -613,6 +613,565 @@
 </p:notes>
 </file>
 
+<file path=ppt/notesSlides/notesSlide10.xml><?xml version="1.0" encoding="utf-8"?>
+<p:notes xmlns:a="http://schemas.openxmlformats.org/drawingml/2006/main" xmlns:r="http://schemas.openxmlformats.org/officeDocument/2006/relationships" xmlns:p="http://schemas.openxmlformats.org/presentationml/2006/main">
+  <p:cSld>
+    <p:spTree>
+      <p:nvGrpSpPr>
+        <p:cNvPr id="1" name=""/>
+        <p:cNvGrpSpPr/>
+        <p:nvPr/>
+      </p:nvGrpSpPr>
+      <p:grpSpPr>
+        <a:xfrm>
+          <a:off x="0" y="0"/>
+          <a:ext cx="0" cy="0"/>
+          <a:chOff x="0" y="0"/>
+          <a:chExt cx="0" cy="0"/>
+        </a:xfrm>
+      </p:grpSpPr>
+      <p:sp>
+        <p:nvSpPr>
+          <p:cNvPr id="2" name="Slide Image Placeholder 1"/>
+          <p:cNvSpPr>
+            <a:spLocks noGrp="1" noRot="1" noChangeAspect="1"/>
+          </p:cNvSpPr>
+          <p:nvPr>
+            <p:ph type="sldImg"/>
+          </p:nvPr>
+        </p:nvSpPr>
+        <p:spPr/>
+      </p:sp>
+      <p:sp>
+        <p:nvSpPr>
+          <p:cNvPr id="3" name="Notes Placeholder 2"/>
+          <p:cNvSpPr>
+            <a:spLocks noGrp="1"/>
+          </p:cNvSpPr>
+          <p:nvPr>
+            <p:ph type="body" idx="1"/>
+          </p:nvPr>
+        </p:nvSpPr>
+        <p:spPr/>
+        <p:txBody>
+          <a:bodyPr/>
+          <a:lstStyle/>
+          <a:p>
+            <a:pPr marL="0" marR="0">
+              <a:lnSpc>
+                <a:spcPct val="107000"/>
+              </a:lnSpc>
+              <a:spcBef>
+                <a:spcPts val="0"/>
+              </a:spcBef>
+              <a:spcAft>
+                <a:spcPts val="800"/>
+              </a:spcAft>
+            </a:pPr>
+            <a:r>
+              <a:rPr lang="en-US" sz="1200" dirty="0">
+                <a:effectLst/>
+                <a:latin typeface="Calibri" panose="020F0502020204030204" pitchFamily="34" charset="0"/>
+                <a:ea typeface="Calibri" panose="020F0502020204030204" pitchFamily="34" charset="0"/>
+                <a:cs typeface="Arial" panose="020B0604020202020204" pitchFamily="34" charset="0"/>
+              </a:rPr>
+              <a:t>The controller has a signal for enabling the accumulators of the pipe3 of classification block. The signal is in charge of determining when to sample data point, which comes as input from the RAM to the classification block.</a:t>
+            </a:r>
+          </a:p>
+          <a:p>
+            <a:pPr marL="0" marR="0">
+              <a:lnSpc>
+                <a:spcPct val="107000"/>
+              </a:lnSpc>
+              <a:spcBef>
+                <a:spcPts val="0"/>
+              </a:spcBef>
+              <a:spcAft>
+                <a:spcPts val="800"/>
+              </a:spcAft>
+            </a:pPr>
+            <a:r>
+              <a:rPr lang="en-US" sz="1200" dirty="0">
+                <a:effectLst/>
+                <a:latin typeface="Calibri" panose="020F0502020204030204" pitchFamily="34" charset="0"/>
+                <a:ea typeface="Calibri" panose="020F0502020204030204" pitchFamily="34" charset="0"/>
+                <a:cs typeface="Arial" panose="020B0604020202020204" pitchFamily="34" charset="0"/>
+              </a:rPr>
+              <a:t>After the last data point reached the last pipe stage, no more data should be sample by the </a:t>
+            </a:r>
+            <a:r>
+              <a:rPr lang="en-US" sz="1200" dirty="0" err="1">
+                <a:effectLst/>
+                <a:latin typeface="Calibri" panose="020F0502020204030204" pitchFamily="34" charset="0"/>
+                <a:ea typeface="Calibri" panose="020F0502020204030204" pitchFamily="34" charset="0"/>
+                <a:cs typeface="Arial" panose="020B0604020202020204" pitchFamily="34" charset="0"/>
+              </a:rPr>
+              <a:t>ccumulators</a:t>
+            </a:r>
+            <a:r>
+              <a:rPr lang="en-US" sz="1200" dirty="0">
+                <a:effectLst/>
+                <a:latin typeface="Calibri" panose="020F0502020204030204" pitchFamily="34" charset="0"/>
+                <a:ea typeface="Calibri" panose="020F0502020204030204" pitchFamily="34" charset="0"/>
+                <a:cs typeface="Arial" panose="020B0604020202020204" pitchFamily="34" charset="0"/>
+              </a:rPr>
+              <a:t>(“garbage” data may be present in the pipe) . Therefore, there is a need to pull down the enable so at that in the next state, which is "calculate new means", there would be no sampling of any more data points.</a:t>
+            </a:r>
+          </a:p>
+          <a:p>
+            <a:pPr marL="0" marR="0">
+              <a:lnSpc>
+                <a:spcPct val="107000"/>
+              </a:lnSpc>
+              <a:spcBef>
+                <a:spcPts val="0"/>
+              </a:spcBef>
+              <a:spcAft>
+                <a:spcPts val="800"/>
+              </a:spcAft>
+            </a:pPr>
+            <a:r>
+              <a:rPr lang="en-US" sz="1200" dirty="0">
+                <a:effectLst/>
+                <a:latin typeface="Calibri" panose="020F0502020204030204" pitchFamily="34" charset="0"/>
+                <a:ea typeface="Calibri" panose="020F0502020204030204" pitchFamily="34" charset="0"/>
+                <a:cs typeface="Arial" panose="020B0604020202020204" pitchFamily="34" charset="0"/>
+              </a:rPr>
+              <a:t>There was a bug which we sampled one more data point since we pulled down the signal only at the "calculate new means" state. Pulling it down one state/cycle earlier, removed the bug.</a:t>
+            </a:r>
+          </a:p>
+          <a:p>
+            <a:endParaRPr lang="en-US" dirty="0"/>
+          </a:p>
+        </p:txBody>
+      </p:sp>
+      <p:sp>
+        <p:nvSpPr>
+          <p:cNvPr id="4" name="Slide Number Placeholder 3"/>
+          <p:cNvSpPr>
+            <a:spLocks noGrp="1"/>
+          </p:cNvSpPr>
+          <p:nvPr>
+            <p:ph type="sldNum" sz="quarter" idx="5"/>
+          </p:nvPr>
+        </p:nvSpPr>
+        <p:spPr/>
+        <p:txBody>
+          <a:bodyPr/>
+          <a:lstStyle/>
+          <a:p>
+            <a:fld id="{509FA207-E8FD-4363-95A6-907EB6A63BD8}" type="slidenum">
+              <a:rPr lang="en-US" smtClean="0"/>
+              <a:t>33</a:t>
+            </a:fld>
+            <a:endParaRPr lang="en-US"/>
+          </a:p>
+        </p:txBody>
+      </p:sp>
+    </p:spTree>
+    <p:extLst>
+      <p:ext uri="{BB962C8B-B14F-4D97-AF65-F5344CB8AC3E}">
+        <p14:creationId xmlns:p14="http://schemas.microsoft.com/office/powerpoint/2010/main" val="1425404410"/>
+      </p:ext>
+    </p:extLst>
+  </p:cSld>
+  <p:clrMapOvr>
+    <a:masterClrMapping/>
+  </p:clrMapOvr>
+</p:notes>
+</file>
+
+<file path=ppt/notesSlides/notesSlide11.xml><?xml version="1.0" encoding="utf-8"?>
+<p:notes xmlns:a="http://schemas.openxmlformats.org/drawingml/2006/main" xmlns:r="http://schemas.openxmlformats.org/officeDocument/2006/relationships" xmlns:p="http://schemas.openxmlformats.org/presentationml/2006/main">
+  <p:cSld>
+    <p:spTree>
+      <p:nvGrpSpPr>
+        <p:cNvPr id="1" name=""/>
+        <p:cNvGrpSpPr/>
+        <p:nvPr/>
+      </p:nvGrpSpPr>
+      <p:grpSpPr>
+        <a:xfrm>
+          <a:off x="0" y="0"/>
+          <a:ext cx="0" cy="0"/>
+          <a:chOff x="0" y="0"/>
+          <a:chExt cx="0" cy="0"/>
+        </a:xfrm>
+      </p:grpSpPr>
+      <p:sp>
+        <p:nvSpPr>
+          <p:cNvPr id="2" name="Slide Image Placeholder 1"/>
+          <p:cNvSpPr>
+            <a:spLocks noGrp="1" noRot="1" noChangeAspect="1"/>
+          </p:cNvSpPr>
+          <p:nvPr>
+            <p:ph type="sldImg"/>
+          </p:nvPr>
+        </p:nvSpPr>
+        <p:spPr/>
+      </p:sp>
+      <p:sp>
+        <p:nvSpPr>
+          <p:cNvPr id="3" name="Notes Placeholder 2"/>
+          <p:cNvSpPr>
+            <a:spLocks noGrp="1"/>
+          </p:cNvSpPr>
+          <p:nvPr>
+            <p:ph type="body" idx="1"/>
+          </p:nvPr>
+        </p:nvSpPr>
+        <p:spPr/>
+        <p:txBody>
+          <a:bodyPr/>
+          <a:lstStyle/>
+          <a:p>
+            <a:pPr>
+              <a:lnSpc>
+                <a:spcPct val="107000"/>
+              </a:lnSpc>
+              <a:spcBef>
+                <a:spcPts val="0"/>
+              </a:spcBef>
+              <a:spcAft>
+                <a:spcPts val="800"/>
+              </a:spcAft>
+            </a:pPr>
+            <a:r>
+              <a:rPr lang="en-US" dirty="0">
+                <a:effectLst/>
+                <a:latin typeface="Calibri" panose="020F0502020204030204" pitchFamily="34" charset="0"/>
+                <a:ea typeface="Calibri" panose="020F0502020204030204" pitchFamily="34" charset="0"/>
+                <a:cs typeface="Arial" panose="020B0604020202020204" pitchFamily="34" charset="0"/>
+              </a:rPr>
+              <a:t>In order to check the functional coverage of the test line, the following cover groups were defined:</a:t>
+            </a:r>
+          </a:p>
+          <a:p>
+            <a:pPr lvl="1">
+              <a:lnSpc>
+                <a:spcPct val="107000"/>
+              </a:lnSpc>
+              <a:spcBef>
+                <a:spcPts val="0"/>
+              </a:spcBef>
+            </a:pPr>
+            <a:r>
+              <a:rPr lang="en-US" sz="2000" dirty="0">
+                <a:effectLst/>
+                <a:latin typeface="Calibri" panose="020F0502020204030204" pitchFamily="34" charset="0"/>
+                <a:ea typeface="Calibri" panose="020F0502020204030204" pitchFamily="34" charset="0"/>
+                <a:cs typeface="Arial" panose="020B0604020202020204" pitchFamily="34" charset="0"/>
+              </a:rPr>
+              <a:t>NUM_POINTS - This cover group samples the number of data points randomly generated for each test, to verify that all values  of this variable are uniformly distributed between 8 and 512.</a:t>
+            </a:r>
+          </a:p>
+          <a:p>
+            <a:pPr lvl="1">
+              <a:lnSpc>
+                <a:spcPct val="107000"/>
+              </a:lnSpc>
+              <a:spcBef>
+                <a:spcPts val="0"/>
+              </a:spcBef>
+            </a:pPr>
+            <a:r>
+              <a:rPr lang="en-US" sz="2000" dirty="0">
+                <a:effectLst/>
+                <a:latin typeface="Calibri" panose="020F0502020204030204" pitchFamily="34" charset="0"/>
+                <a:ea typeface="Calibri" panose="020F0502020204030204" pitchFamily="34" charset="0"/>
+                <a:cs typeface="Arial" panose="020B0604020202020204" pitchFamily="34" charset="0"/>
+              </a:rPr>
+              <a:t>DATA_VALUE - This cover group samples the values of each one of the seven coordinates of all data points randomly generated for each test, to verify that all values  of this variable are uniformly distributed between all the possible values.</a:t>
+            </a:r>
+          </a:p>
+          <a:p>
+            <a:pPr lvl="1">
+              <a:lnSpc>
+                <a:spcPct val="107000"/>
+              </a:lnSpc>
+              <a:spcBef>
+                <a:spcPts val="0"/>
+              </a:spcBef>
+              <a:spcAft>
+                <a:spcPts val="800"/>
+              </a:spcAft>
+            </a:pPr>
+            <a:r>
+              <a:rPr lang="en-US" sz="2000" dirty="0">
+                <a:effectLst/>
+                <a:latin typeface="Calibri" panose="020F0502020204030204" pitchFamily="34" charset="0"/>
+                <a:ea typeface="Calibri" panose="020F0502020204030204" pitchFamily="34" charset="0"/>
+                <a:cs typeface="Arial" panose="020B0604020202020204" pitchFamily="34" charset="0"/>
+              </a:rPr>
+              <a:t>CENTX_VALUE - This cover group samples the value of each one of the seven coordinates of centroid X, randomly generated at each test, to verify that all values of this variable are uniformly distributed between all the possible values.</a:t>
+            </a:r>
+          </a:p>
+          <a:p>
+            <a:endParaRPr lang="en-US" dirty="0"/>
+          </a:p>
+        </p:txBody>
+      </p:sp>
+      <p:sp>
+        <p:nvSpPr>
+          <p:cNvPr id="4" name="Slide Number Placeholder 3"/>
+          <p:cNvSpPr>
+            <a:spLocks noGrp="1"/>
+          </p:cNvSpPr>
+          <p:nvPr>
+            <p:ph type="sldNum" sz="quarter" idx="5"/>
+          </p:nvPr>
+        </p:nvSpPr>
+        <p:spPr/>
+        <p:txBody>
+          <a:bodyPr/>
+          <a:lstStyle/>
+          <a:p>
+            <a:fld id="{509FA207-E8FD-4363-95A6-907EB6A63BD8}" type="slidenum">
+              <a:rPr lang="en-US" smtClean="0"/>
+              <a:t>36</a:t>
+            </a:fld>
+            <a:endParaRPr lang="en-US"/>
+          </a:p>
+        </p:txBody>
+      </p:sp>
+    </p:spTree>
+    <p:extLst>
+      <p:ext uri="{BB962C8B-B14F-4D97-AF65-F5344CB8AC3E}">
+        <p14:creationId xmlns:p14="http://schemas.microsoft.com/office/powerpoint/2010/main" val="2917502182"/>
+      </p:ext>
+    </p:extLst>
+  </p:cSld>
+  <p:clrMapOvr>
+    <a:masterClrMapping/>
+  </p:clrMapOvr>
+</p:notes>
+</file>
+
+<file path=ppt/notesSlides/notesSlide12.xml><?xml version="1.0" encoding="utf-8"?>
+<p:notes xmlns:a="http://schemas.openxmlformats.org/drawingml/2006/main" xmlns:r="http://schemas.openxmlformats.org/officeDocument/2006/relationships" xmlns:p="http://schemas.openxmlformats.org/presentationml/2006/main">
+  <p:cSld>
+    <p:spTree>
+      <p:nvGrpSpPr>
+        <p:cNvPr id="1" name=""/>
+        <p:cNvGrpSpPr/>
+        <p:nvPr/>
+      </p:nvGrpSpPr>
+      <p:grpSpPr>
+        <a:xfrm>
+          <a:off x="0" y="0"/>
+          <a:ext cx="0" cy="0"/>
+          <a:chOff x="0" y="0"/>
+          <a:chExt cx="0" cy="0"/>
+        </a:xfrm>
+      </p:grpSpPr>
+      <p:sp>
+        <p:nvSpPr>
+          <p:cNvPr id="2" name="Slide Image Placeholder 1"/>
+          <p:cNvSpPr>
+            <a:spLocks noGrp="1" noRot="1" noChangeAspect="1"/>
+          </p:cNvSpPr>
+          <p:nvPr>
+            <p:ph type="sldImg"/>
+          </p:nvPr>
+        </p:nvSpPr>
+        <p:spPr/>
+      </p:sp>
+      <p:sp>
+        <p:nvSpPr>
+          <p:cNvPr id="3" name="Notes Placeholder 2"/>
+          <p:cNvSpPr>
+            <a:spLocks noGrp="1"/>
+          </p:cNvSpPr>
+          <p:nvPr>
+            <p:ph type="body" idx="1"/>
+          </p:nvPr>
+        </p:nvSpPr>
+        <p:spPr/>
+        <p:txBody>
+          <a:bodyPr/>
+          <a:lstStyle/>
+          <a:p>
+            <a:pPr marL="342900" marR="0" lvl="0" indent="-342900" rtl="0">
+              <a:lnSpc>
+                <a:spcPct val="107000"/>
+              </a:lnSpc>
+              <a:spcBef>
+                <a:spcPts val="0"/>
+              </a:spcBef>
+              <a:spcAft>
+                <a:spcPts val="0"/>
+              </a:spcAft>
+              <a:buFont typeface="Symbol" panose="05050102010706020507" pitchFamily="18" charset="2"/>
+              <a:buChar char=""/>
+            </a:pPr>
+            <a:r>
+              <a:rPr lang="en-US" sz="1200" dirty="0">
+                <a:effectLst/>
+                <a:latin typeface="Calibri" panose="020F0502020204030204" pitchFamily="34" charset="0"/>
+                <a:ea typeface="Calibri" panose="020F0502020204030204" pitchFamily="34" charset="0"/>
+                <a:cs typeface="Arial" panose="020B0604020202020204" pitchFamily="34" charset="0"/>
+              </a:rPr>
+              <a:t>The tests results indicate that are still bugs in the DUT, which we were not able to find and fix. If the DUT was a commercial IP, we would advise the company to do a thorough debugging process.</a:t>
+            </a:r>
+          </a:p>
+          <a:p>
+            <a:pPr marL="342900" marR="0" lvl="0" indent="-342900">
+              <a:lnSpc>
+                <a:spcPct val="107000"/>
+              </a:lnSpc>
+              <a:spcBef>
+                <a:spcPts val="0"/>
+              </a:spcBef>
+              <a:spcAft>
+                <a:spcPts val="0"/>
+              </a:spcAft>
+              <a:buFont typeface="Symbol" panose="05050102010706020507" pitchFamily="18" charset="2"/>
+              <a:buChar char=""/>
+            </a:pPr>
+            <a:r>
+              <a:rPr lang="en-US" sz="1200" dirty="0">
+                <a:effectLst/>
+                <a:latin typeface="Calibri" panose="020F0502020204030204" pitchFamily="34" charset="0"/>
+                <a:ea typeface="Calibri" panose="020F0502020204030204" pitchFamily="34" charset="0"/>
+                <a:cs typeface="Arial" panose="020B0604020202020204" pitchFamily="34" charset="0"/>
+              </a:rPr>
+              <a:t>The high fail rate in test line 8 indicates that there is an overflow bug when trying to fill the RAMs.</a:t>
+            </a:r>
+          </a:p>
+          <a:p>
+            <a:pPr marL="342900" marR="0" lvl="0" indent="-342900">
+              <a:lnSpc>
+                <a:spcPct val="107000"/>
+              </a:lnSpc>
+              <a:spcBef>
+                <a:spcPts val="0"/>
+              </a:spcBef>
+              <a:spcAft>
+                <a:spcPts val="0"/>
+              </a:spcAft>
+              <a:buFont typeface="Symbol" panose="05050102010706020507" pitchFamily="18" charset="2"/>
+              <a:buChar char=""/>
+            </a:pPr>
+            <a:r>
+              <a:rPr lang="en-US" sz="1200" dirty="0">
+                <a:effectLst/>
+                <a:latin typeface="Calibri" panose="020F0502020204030204" pitchFamily="34" charset="0"/>
+                <a:ea typeface="Calibri" panose="020F0502020204030204" pitchFamily="34" charset="0"/>
+                <a:cs typeface="Arial" panose="020B0604020202020204" pitchFamily="34" charset="0"/>
+              </a:rPr>
+              <a:t>Test line 3 and 4 indicate that as the number of data points increases so does the number of fails.  This could be related to bugs such as overflow, wrong classification of close points, and/or wrong calculations.</a:t>
+            </a:r>
+          </a:p>
+          <a:p>
+            <a:pPr marL="342900" marR="0" lvl="0" indent="-342900">
+              <a:lnSpc>
+                <a:spcPct val="107000"/>
+              </a:lnSpc>
+              <a:spcBef>
+                <a:spcPts val="0"/>
+              </a:spcBef>
+              <a:spcAft>
+                <a:spcPts val="0"/>
+              </a:spcAft>
+              <a:buFont typeface="Symbol" panose="05050102010706020507" pitchFamily="18" charset="2"/>
+              <a:buChar char=""/>
+            </a:pPr>
+            <a:r>
+              <a:rPr lang="en-US" sz="1200" dirty="0">
+                <a:effectLst/>
+                <a:latin typeface="Calibri" panose="020F0502020204030204" pitchFamily="34" charset="0"/>
+                <a:ea typeface="Calibri" panose="020F0502020204030204" pitchFamily="34" charset="0"/>
+                <a:cs typeface="Arial" panose="020B0604020202020204" pitchFamily="34" charset="0"/>
+              </a:rPr>
+              <a:t>Even though many test benches were run on the DUT in its design phase, many tests have failed. This emphasizes the need for an efficient verification environment, as UVM, parallel to the design process.</a:t>
+            </a:r>
+          </a:p>
+          <a:p>
+            <a:pPr marL="342900" marR="0" lvl="0" indent="-342900">
+              <a:lnSpc>
+                <a:spcPct val="107000"/>
+              </a:lnSpc>
+              <a:spcBef>
+                <a:spcPts val="0"/>
+              </a:spcBef>
+              <a:spcAft>
+                <a:spcPts val="800"/>
+              </a:spcAft>
+              <a:buFont typeface="Symbol" panose="05050102010706020507" pitchFamily="18" charset="2"/>
+              <a:buChar char=""/>
+            </a:pPr>
+            <a:r>
+              <a:rPr lang="en-US" sz="1200" dirty="0">
+                <a:effectLst/>
+                <a:latin typeface="Calibri" panose="020F0502020204030204" pitchFamily="34" charset="0"/>
+                <a:ea typeface="Calibri" panose="020F0502020204030204" pitchFamily="34" charset="0"/>
+                <a:cs typeface="Arial" panose="020B0604020202020204" pitchFamily="34" charset="0"/>
+              </a:rPr>
+              <a:t>UVM is</a:t>
+            </a:r>
+            <a:r>
+              <a:rPr lang="en-US" sz="1200" dirty="0">
+                <a:solidFill>
+                  <a:srgbClr val="FF0000"/>
+                </a:solidFill>
+                <a:effectLst/>
+                <a:latin typeface="Calibri" panose="020F0502020204030204" pitchFamily="34" charset="0"/>
+                <a:ea typeface="Calibri" panose="020F0502020204030204" pitchFamily="34" charset="0"/>
+                <a:cs typeface="Arial" panose="020B0604020202020204" pitchFamily="34" charset="0"/>
+              </a:rPr>
+              <a:t> </a:t>
+            </a:r>
+            <a:r>
+              <a:rPr lang="en-US" sz="1200" dirty="0">
+                <a:effectLst/>
+                <a:latin typeface="Calibri" panose="020F0502020204030204" pitchFamily="34" charset="0"/>
+                <a:ea typeface="Calibri" panose="020F0502020204030204" pitchFamily="34" charset="0"/>
+                <a:cs typeface="Arial" panose="020B0604020202020204" pitchFamily="34" charset="0"/>
+              </a:rPr>
+              <a:t>an effective tool. It is intuitive, with high level coding and easy to reuse, making the verification process simpler and faster.</a:t>
+            </a:r>
+          </a:p>
+          <a:p>
+            <a:endParaRPr lang="en-US" dirty="0"/>
+          </a:p>
+        </p:txBody>
+      </p:sp>
+      <p:sp>
+        <p:nvSpPr>
+          <p:cNvPr id="4" name="Slide Number Placeholder 3"/>
+          <p:cNvSpPr>
+            <a:spLocks noGrp="1"/>
+          </p:cNvSpPr>
+          <p:nvPr>
+            <p:ph type="sldNum" sz="quarter" idx="5"/>
+          </p:nvPr>
+        </p:nvSpPr>
+        <p:spPr/>
+        <p:txBody>
+          <a:bodyPr/>
+          <a:lstStyle/>
+          <a:p>
+            <a:fld id="{509FA207-E8FD-4363-95A6-907EB6A63BD8}" type="slidenum">
+              <a:rPr lang="en-US" smtClean="0"/>
+              <a:t>43</a:t>
+            </a:fld>
+            <a:endParaRPr lang="en-US"/>
+          </a:p>
+        </p:txBody>
+      </p:sp>
+    </p:spTree>
+    <p:extLst>
+      <p:ext uri="{BB962C8B-B14F-4D97-AF65-F5344CB8AC3E}">
+        <p14:creationId xmlns:p14="http://schemas.microsoft.com/office/powerpoint/2010/main" val="1839181625"/>
+      </p:ext>
+    </p:extLst>
+  </p:cSld>
+  <p:clrMapOvr>
+    <a:masterClrMapping/>
+  </p:clrMapOvr>
+</p:notes>
+</file>
+
 <file path=ppt/notesSlides/notesSlide2.xml><?xml version="1.0" encoding="utf-8"?>
 <p:notes xmlns:a="http://schemas.openxmlformats.org/drawingml/2006/main" xmlns:r="http://schemas.openxmlformats.org/officeDocument/2006/relationships" xmlns:p="http://schemas.openxmlformats.org/presentationml/2006/main">
   <p:cSld>
@@ -1013,6 +1572,1246 @@
     <p:extLst>
       <p:ext uri="{BB962C8B-B14F-4D97-AF65-F5344CB8AC3E}">
         <p14:creationId xmlns:p14="http://schemas.microsoft.com/office/powerpoint/2010/main" val="882604135"/>
+      </p:ext>
+    </p:extLst>
+  </p:cSld>
+  <p:clrMapOvr>
+    <a:masterClrMapping/>
+  </p:clrMapOvr>
+</p:notes>
+</file>
+
+<file path=ppt/notesSlides/notesSlide4.xml><?xml version="1.0" encoding="utf-8"?>
+<p:notes xmlns:a="http://schemas.openxmlformats.org/drawingml/2006/main" xmlns:r="http://schemas.openxmlformats.org/officeDocument/2006/relationships" xmlns:p="http://schemas.openxmlformats.org/presentationml/2006/main">
+  <p:cSld>
+    <p:spTree>
+      <p:nvGrpSpPr>
+        <p:cNvPr id="1" name=""/>
+        <p:cNvGrpSpPr/>
+        <p:nvPr/>
+      </p:nvGrpSpPr>
+      <p:grpSpPr>
+        <a:xfrm>
+          <a:off x="0" y="0"/>
+          <a:ext cx="0" cy="0"/>
+          <a:chOff x="0" y="0"/>
+          <a:chExt cx="0" cy="0"/>
+        </a:xfrm>
+      </p:grpSpPr>
+      <p:sp>
+        <p:nvSpPr>
+          <p:cNvPr id="2" name="Slide Image Placeholder 1"/>
+          <p:cNvSpPr>
+            <a:spLocks noGrp="1" noRot="1" noChangeAspect="1"/>
+          </p:cNvSpPr>
+          <p:nvPr>
+            <p:ph type="sldImg"/>
+          </p:nvPr>
+        </p:nvSpPr>
+        <p:spPr/>
+      </p:sp>
+      <p:sp>
+        <p:nvSpPr>
+          <p:cNvPr id="3" name="Notes Placeholder 2"/>
+          <p:cNvSpPr>
+            <a:spLocks noGrp="1"/>
+          </p:cNvSpPr>
+          <p:nvPr>
+            <p:ph type="body" idx="1"/>
+          </p:nvPr>
+        </p:nvSpPr>
+        <p:spPr/>
+        <p:txBody>
+          <a:bodyPr/>
+          <a:lstStyle/>
+          <a:p>
+            <a:endParaRPr lang="en-US" dirty="0"/>
+          </a:p>
+        </p:txBody>
+      </p:sp>
+      <p:sp>
+        <p:nvSpPr>
+          <p:cNvPr id="4" name="Slide Number Placeholder 3"/>
+          <p:cNvSpPr>
+            <a:spLocks noGrp="1"/>
+          </p:cNvSpPr>
+          <p:nvPr>
+            <p:ph type="sldNum" sz="quarter" idx="5"/>
+          </p:nvPr>
+        </p:nvSpPr>
+        <p:spPr/>
+        <p:txBody>
+          <a:bodyPr/>
+          <a:lstStyle/>
+          <a:p>
+            <a:fld id="{509FA207-E8FD-4363-95A6-907EB6A63BD8}" type="slidenum">
+              <a:rPr lang="en-US" smtClean="0"/>
+              <a:t>15</a:t>
+            </a:fld>
+            <a:endParaRPr lang="en-US"/>
+          </a:p>
+        </p:txBody>
+      </p:sp>
+    </p:spTree>
+    <p:extLst>
+      <p:ext uri="{BB962C8B-B14F-4D97-AF65-F5344CB8AC3E}">
+        <p14:creationId xmlns:p14="http://schemas.microsoft.com/office/powerpoint/2010/main" val="2883006069"/>
+      </p:ext>
+    </p:extLst>
+  </p:cSld>
+  <p:clrMapOvr>
+    <a:masterClrMapping/>
+  </p:clrMapOvr>
+</p:notes>
+</file>
+
+<file path=ppt/notesSlides/notesSlide5.xml><?xml version="1.0" encoding="utf-8"?>
+<p:notes xmlns:a="http://schemas.openxmlformats.org/drawingml/2006/main" xmlns:r="http://schemas.openxmlformats.org/officeDocument/2006/relationships" xmlns:p="http://schemas.openxmlformats.org/presentationml/2006/main">
+  <p:cSld>
+    <p:spTree>
+      <p:nvGrpSpPr>
+        <p:cNvPr id="1" name=""/>
+        <p:cNvGrpSpPr/>
+        <p:nvPr/>
+      </p:nvGrpSpPr>
+      <p:grpSpPr>
+        <a:xfrm>
+          <a:off x="0" y="0"/>
+          <a:ext cx="0" cy="0"/>
+          <a:chOff x="0" y="0"/>
+          <a:chExt cx="0" cy="0"/>
+        </a:xfrm>
+      </p:grpSpPr>
+      <p:sp>
+        <p:nvSpPr>
+          <p:cNvPr id="2" name="Slide Image Placeholder 1"/>
+          <p:cNvSpPr>
+            <a:spLocks noGrp="1" noRot="1" noChangeAspect="1"/>
+          </p:cNvSpPr>
+          <p:nvPr>
+            <p:ph type="sldImg"/>
+          </p:nvPr>
+        </p:nvSpPr>
+        <p:spPr/>
+      </p:sp>
+      <p:sp>
+        <p:nvSpPr>
+          <p:cNvPr id="3" name="Notes Placeholder 2"/>
+          <p:cNvSpPr>
+            <a:spLocks noGrp="1"/>
+          </p:cNvSpPr>
+          <p:nvPr>
+            <p:ph type="body" idx="1"/>
+          </p:nvPr>
+        </p:nvSpPr>
+        <p:spPr/>
+        <p:txBody>
+          <a:bodyPr/>
+          <a:lstStyle/>
+          <a:p>
+            <a:r>
+              <a:rPr lang="en-US" sz="1800" dirty="0">
+                <a:effectLst/>
+                <a:latin typeface="Calibri" panose="020F0502020204030204" pitchFamily="34" charset="0"/>
+                <a:ea typeface="Calibri" panose="020F0502020204030204" pitchFamily="34" charset="0"/>
+                <a:cs typeface="Arial" panose="020B0604020202020204" pitchFamily="34" charset="0"/>
+              </a:rPr>
+              <a:t>Before setting the “Go” register to 1, at least 8 data points need to be written to the IP’s RAM. The maximum Ram capacity is 512 data points, therefore, insertion of more than 512 data points may cause unexpected behavior. </a:t>
+            </a:r>
+          </a:p>
+          <a:p>
+            <a:pPr marL="0" marR="0">
+              <a:lnSpc>
+                <a:spcPct val="107000"/>
+              </a:lnSpc>
+              <a:spcBef>
+                <a:spcPts val="0"/>
+              </a:spcBef>
+              <a:spcAft>
+                <a:spcPts val="800"/>
+              </a:spcAft>
+            </a:pPr>
+            <a:r>
+              <a:rPr lang="en-US" sz="1800" dirty="0">
+                <a:effectLst/>
+                <a:latin typeface="Calibri" panose="020F0502020204030204" pitchFamily="34" charset="0"/>
+                <a:ea typeface="Calibri" panose="020F0502020204030204" pitchFamily="34" charset="0"/>
+                <a:cs typeface="Arial" panose="020B0604020202020204" pitchFamily="34" charset="0"/>
+              </a:rPr>
+              <a:t>Before setting the “Go” register to 1, the following registers need to be configured (not necessarily in this order):</a:t>
+            </a:r>
+          </a:p>
+          <a:p>
+            <a:pPr marL="800100" lvl="1" indent="-342900">
+              <a:lnSpc>
+                <a:spcPct val="107000"/>
+              </a:lnSpc>
+              <a:spcBef>
+                <a:spcPts val="0"/>
+              </a:spcBef>
+              <a:buFont typeface="Calibri" panose="020F0502020204030204" pitchFamily="34" charset="0"/>
+              <a:buChar char="-"/>
+            </a:pPr>
+            <a:r>
+              <a:rPr lang="en-US" sz="1400" dirty="0">
+                <a:effectLst/>
+                <a:latin typeface="Calibri" panose="020F0502020204030204" pitchFamily="34" charset="0"/>
+                <a:ea typeface="Calibri" panose="020F0502020204030204" pitchFamily="34" charset="0"/>
+                <a:cs typeface="Arial" panose="020B0604020202020204" pitchFamily="34" charset="0"/>
+              </a:rPr>
+              <a:t>First ram </a:t>
+            </a:r>
+            <a:r>
+              <a:rPr lang="en-US" sz="1400" dirty="0" err="1">
+                <a:effectLst/>
+                <a:latin typeface="Calibri" panose="020F0502020204030204" pitchFamily="34" charset="0"/>
+                <a:ea typeface="Calibri" panose="020F0502020204030204" pitchFamily="34" charset="0"/>
+                <a:cs typeface="Arial" panose="020B0604020202020204" pitchFamily="34" charset="0"/>
+              </a:rPr>
+              <a:t>addr</a:t>
+            </a:r>
+            <a:r>
+              <a:rPr lang="en-US" sz="1400" dirty="0">
+                <a:effectLst/>
+                <a:latin typeface="Calibri" panose="020F0502020204030204" pitchFamily="34" charset="0"/>
+                <a:ea typeface="Calibri" panose="020F0502020204030204" pitchFamily="34" charset="0"/>
+                <a:cs typeface="Arial" panose="020B0604020202020204" pitchFamily="34" charset="0"/>
+              </a:rPr>
+              <a:t> – this register must be configured to the first ram address in which the user wrote data.</a:t>
+            </a:r>
+          </a:p>
+          <a:p>
+            <a:pPr marL="800100" lvl="1" indent="-342900">
+              <a:lnSpc>
+                <a:spcPct val="107000"/>
+              </a:lnSpc>
+              <a:spcBef>
+                <a:spcPts val="0"/>
+              </a:spcBef>
+              <a:spcAft>
+                <a:spcPts val="800"/>
+              </a:spcAft>
+              <a:buFont typeface="Calibri" panose="020F0502020204030204" pitchFamily="34" charset="0"/>
+              <a:buChar char="-"/>
+            </a:pPr>
+            <a:r>
+              <a:rPr lang="en-US" sz="1400" dirty="0">
+                <a:effectLst/>
+                <a:latin typeface="Calibri" panose="020F0502020204030204" pitchFamily="34" charset="0"/>
+                <a:ea typeface="Calibri" panose="020F0502020204030204" pitchFamily="34" charset="0"/>
+                <a:cs typeface="Arial" panose="020B0604020202020204" pitchFamily="34" charset="0"/>
+              </a:rPr>
+              <a:t>Last ram </a:t>
+            </a:r>
+            <a:r>
+              <a:rPr lang="en-US" sz="1400" dirty="0" err="1">
+                <a:effectLst/>
+                <a:latin typeface="Calibri" panose="020F0502020204030204" pitchFamily="34" charset="0"/>
+                <a:ea typeface="Calibri" panose="020F0502020204030204" pitchFamily="34" charset="0"/>
+                <a:cs typeface="Arial" panose="020B0604020202020204" pitchFamily="34" charset="0"/>
+              </a:rPr>
+              <a:t>addr</a:t>
+            </a:r>
+            <a:r>
+              <a:rPr lang="en-US" sz="1400" dirty="0">
+                <a:effectLst/>
+                <a:latin typeface="Calibri" panose="020F0502020204030204" pitchFamily="34" charset="0"/>
+                <a:ea typeface="Calibri" panose="020F0502020204030204" pitchFamily="34" charset="0"/>
+                <a:cs typeface="Arial" panose="020B0604020202020204" pitchFamily="34" charset="0"/>
+              </a:rPr>
+              <a:t> - this register must be configured to the last ram address in which the user wrote data.</a:t>
+            </a:r>
+          </a:p>
+          <a:p>
+            <a:pPr marL="0" marR="0" indent="0">
+              <a:lnSpc>
+                <a:spcPct val="107000"/>
+              </a:lnSpc>
+              <a:spcBef>
+                <a:spcPts val="0"/>
+              </a:spcBef>
+              <a:spcAft>
+                <a:spcPts val="800"/>
+              </a:spcAft>
+              <a:buNone/>
+            </a:pPr>
+            <a:r>
+              <a:rPr lang="en-US" sz="1800" dirty="0">
+                <a:latin typeface="Calibri" panose="020F0502020204030204" pitchFamily="34" charset="0"/>
+                <a:ea typeface="Calibri" panose="020F0502020204030204" pitchFamily="34" charset="0"/>
+                <a:cs typeface="Arial" panose="020B0604020202020204" pitchFamily="34" charset="0"/>
+              </a:rPr>
+              <a:t>	T</a:t>
+            </a:r>
+            <a:r>
+              <a:rPr lang="en-US" sz="1800" dirty="0">
+                <a:effectLst/>
+                <a:latin typeface="Calibri" panose="020F0502020204030204" pitchFamily="34" charset="0"/>
+                <a:ea typeface="Calibri" panose="020F0502020204030204" pitchFamily="34" charset="0"/>
+                <a:cs typeface="Arial" panose="020B0604020202020204" pitchFamily="34" charset="0"/>
+              </a:rPr>
+              <a:t>he maximum Ram capacity is of 512 data points, therefore the parameter “First ram </a:t>
+            </a:r>
+            <a:r>
+              <a:rPr lang="en-US" sz="1800" dirty="0" err="1">
+                <a:effectLst/>
+                <a:latin typeface="Calibri" panose="020F0502020204030204" pitchFamily="34" charset="0"/>
+                <a:ea typeface="Calibri" panose="020F0502020204030204" pitchFamily="34" charset="0"/>
+                <a:cs typeface="Arial" panose="020B0604020202020204" pitchFamily="34" charset="0"/>
+              </a:rPr>
+              <a:t>addr</a:t>
+            </a:r>
+            <a:r>
+              <a:rPr lang="en-US" sz="1800" dirty="0">
+                <a:effectLst/>
+                <a:latin typeface="Calibri" panose="020F0502020204030204" pitchFamily="34" charset="0"/>
+                <a:ea typeface="Calibri" panose="020F0502020204030204" pitchFamily="34" charset="0"/>
+                <a:cs typeface="Arial" panose="020B0604020202020204" pitchFamily="34" charset="0"/>
+              </a:rPr>
+              <a:t>” should be between 1 and 512. The parameters “Last ram </a:t>
+            </a:r>
+            <a:r>
+              <a:rPr lang="en-US" sz="1800" dirty="0" err="1">
+                <a:effectLst/>
+                <a:latin typeface="Calibri" panose="020F0502020204030204" pitchFamily="34" charset="0"/>
+                <a:ea typeface="Calibri" panose="020F0502020204030204" pitchFamily="34" charset="0"/>
+                <a:cs typeface="Arial" panose="020B0604020202020204" pitchFamily="34" charset="0"/>
+              </a:rPr>
+              <a:t>addr</a:t>
+            </a:r>
+            <a:r>
+              <a:rPr lang="en-US" sz="1800" dirty="0">
+                <a:effectLst/>
+                <a:latin typeface="Calibri" panose="020F0502020204030204" pitchFamily="34" charset="0"/>
+                <a:ea typeface="Calibri" panose="020F0502020204030204" pitchFamily="34" charset="0"/>
+                <a:cs typeface="Arial" panose="020B0604020202020204" pitchFamily="34" charset="0"/>
+              </a:rPr>
+              <a:t>” shall therefore be set to the sum of the parameter “First ram </a:t>
+            </a:r>
+            <a:r>
+              <a:rPr lang="en-US" sz="1800" dirty="0" err="1">
+                <a:effectLst/>
+                <a:latin typeface="Calibri" panose="020F0502020204030204" pitchFamily="34" charset="0"/>
+                <a:ea typeface="Calibri" panose="020F0502020204030204" pitchFamily="34" charset="0"/>
+                <a:cs typeface="Arial" panose="020B0604020202020204" pitchFamily="34" charset="0"/>
+              </a:rPr>
+              <a:t>addr</a:t>
+            </a:r>
+            <a:r>
+              <a:rPr lang="en-US" sz="1800" dirty="0">
+                <a:effectLst/>
+                <a:latin typeface="Calibri" panose="020F0502020204030204" pitchFamily="34" charset="0"/>
+                <a:ea typeface="Calibri" panose="020F0502020204030204" pitchFamily="34" charset="0"/>
+                <a:cs typeface="Arial" panose="020B0604020202020204" pitchFamily="34" charset="0"/>
+              </a:rPr>
+              <a:t>” and the number of points chosen by the user.</a:t>
+            </a:r>
+          </a:p>
+          <a:p>
+            <a:pPr>
+              <a:lnSpc>
+                <a:spcPct val="107000"/>
+              </a:lnSpc>
+              <a:spcBef>
+                <a:spcPts val="0"/>
+              </a:spcBef>
+              <a:spcAft>
+                <a:spcPts val="800"/>
+              </a:spcAft>
+            </a:pPr>
+            <a:r>
+              <a:rPr lang="en-US" sz="1800" dirty="0">
+                <a:effectLst/>
+                <a:latin typeface="Calibri" panose="020F0502020204030204" pitchFamily="34" charset="0"/>
+                <a:ea typeface="Calibri" panose="020F0502020204030204" pitchFamily="34" charset="0"/>
+                <a:cs typeface="Arial" panose="020B0604020202020204" pitchFamily="34" charset="0"/>
+              </a:rPr>
+              <a:t>After performing the configurations described above, in order to instruct the DUT to start its function, the user must write the value ‘1’ to register named “</a:t>
+            </a:r>
+            <a:r>
+              <a:rPr lang="en-US" sz="1800" dirty="0" err="1">
+                <a:effectLst/>
+                <a:latin typeface="Calibri" panose="020F0502020204030204" pitchFamily="34" charset="0"/>
+                <a:ea typeface="Calibri" panose="020F0502020204030204" pitchFamily="34" charset="0"/>
+                <a:cs typeface="Arial" panose="020B0604020202020204" pitchFamily="34" charset="0"/>
+              </a:rPr>
+              <a:t>Go_reg</a:t>
+            </a:r>
+            <a:r>
+              <a:rPr lang="en-US" sz="1800" dirty="0">
+                <a:effectLst/>
+                <a:latin typeface="Calibri" panose="020F0502020204030204" pitchFamily="34" charset="0"/>
+                <a:ea typeface="Calibri" panose="020F0502020204030204" pitchFamily="34" charset="0"/>
+                <a:cs typeface="Arial" panose="020B0604020202020204" pitchFamily="34" charset="0"/>
+              </a:rPr>
+              <a:t>”.</a:t>
+            </a:r>
+          </a:p>
+          <a:p>
+            <a:pPr>
+              <a:lnSpc>
+                <a:spcPct val="107000"/>
+              </a:lnSpc>
+              <a:spcBef>
+                <a:spcPts val="0"/>
+              </a:spcBef>
+              <a:spcAft>
+                <a:spcPts val="800"/>
+              </a:spcAft>
+            </a:pPr>
+            <a:r>
+              <a:rPr lang="en-US" sz="1800" dirty="0">
+                <a:effectLst/>
+                <a:latin typeface="Calibri" panose="020F0502020204030204" pitchFamily="34" charset="0"/>
+                <a:ea typeface="Calibri" panose="020F0502020204030204" pitchFamily="34" charset="0"/>
+                <a:cs typeface="Arial" panose="020B0604020202020204" pitchFamily="34" charset="0"/>
+              </a:rPr>
+              <a:t>The centroid initial values can be configured by writing these values to registers “</a:t>
+            </a:r>
+            <a:r>
+              <a:rPr lang="en-US" sz="1800" dirty="0" err="1">
+                <a:effectLst/>
+                <a:latin typeface="Calibri" panose="020F0502020204030204" pitchFamily="34" charset="0"/>
+                <a:ea typeface="Calibri" panose="020F0502020204030204" pitchFamily="34" charset="0"/>
+                <a:cs typeface="Arial" panose="020B0604020202020204" pitchFamily="34" charset="0"/>
+              </a:rPr>
+              <a:t>Cent_X_reg</a:t>
+            </a:r>
+            <a:r>
+              <a:rPr lang="en-US" sz="1800" dirty="0">
+                <a:effectLst/>
+                <a:latin typeface="Calibri" panose="020F0502020204030204" pitchFamily="34" charset="0"/>
+                <a:ea typeface="Calibri" panose="020F0502020204030204" pitchFamily="34" charset="0"/>
+                <a:cs typeface="Arial" panose="020B0604020202020204" pitchFamily="34" charset="0"/>
+              </a:rPr>
+              <a:t>”(X is an integer between 1 and 8),before the “</a:t>
+            </a:r>
+            <a:r>
+              <a:rPr lang="en-US" sz="1800" dirty="0" err="1">
+                <a:effectLst/>
+                <a:latin typeface="Calibri" panose="020F0502020204030204" pitchFamily="34" charset="0"/>
+                <a:ea typeface="Calibri" panose="020F0502020204030204" pitchFamily="34" charset="0"/>
+                <a:cs typeface="Arial" panose="020B0604020202020204" pitchFamily="34" charset="0"/>
+              </a:rPr>
+              <a:t>Go_reg</a:t>
+            </a:r>
+            <a:r>
+              <a:rPr lang="en-US" sz="1800" dirty="0">
+                <a:effectLst/>
+                <a:latin typeface="Calibri" panose="020F0502020204030204" pitchFamily="34" charset="0"/>
+                <a:ea typeface="Calibri" panose="020F0502020204030204" pitchFamily="34" charset="0"/>
+                <a:cs typeface="Arial" panose="020B0604020202020204" pitchFamily="34" charset="0"/>
+              </a:rPr>
+              <a:t>” is configured to ‘1’. In case these registers are not configured, all centroid initial values will be set to zero.</a:t>
+            </a:r>
+          </a:p>
+          <a:p>
+            <a:pPr>
+              <a:lnSpc>
+                <a:spcPct val="107000"/>
+              </a:lnSpc>
+              <a:spcBef>
+                <a:spcPts val="0"/>
+              </a:spcBef>
+              <a:spcAft>
+                <a:spcPts val="800"/>
+              </a:spcAft>
+            </a:pPr>
+            <a:r>
+              <a:rPr lang="en-US" sz="1800" dirty="0">
+                <a:effectLst/>
+                <a:latin typeface="Calibri" panose="020F0502020204030204" pitchFamily="34" charset="0"/>
+                <a:ea typeface="Calibri" panose="020F0502020204030204" pitchFamily="34" charset="0"/>
+                <a:cs typeface="Arial" panose="020B0604020202020204" pitchFamily="34" charset="0"/>
+              </a:rPr>
+              <a:t>The threshold value used for convergence check of the algorithm may be configured by user. It can be configured by writing the desired threshold value to register “Thresh hold”. In case this register is not configured, the threshold value will be set to zero.</a:t>
+            </a:r>
+          </a:p>
+          <a:p>
+            <a:endParaRPr lang="en-US" dirty="0"/>
+          </a:p>
+        </p:txBody>
+      </p:sp>
+      <p:sp>
+        <p:nvSpPr>
+          <p:cNvPr id="4" name="Slide Number Placeholder 3"/>
+          <p:cNvSpPr>
+            <a:spLocks noGrp="1"/>
+          </p:cNvSpPr>
+          <p:nvPr>
+            <p:ph type="sldNum" sz="quarter" idx="5"/>
+          </p:nvPr>
+        </p:nvSpPr>
+        <p:spPr/>
+        <p:txBody>
+          <a:bodyPr/>
+          <a:lstStyle/>
+          <a:p>
+            <a:fld id="{509FA207-E8FD-4363-95A6-907EB6A63BD8}" type="slidenum">
+              <a:rPr lang="en-US" smtClean="0"/>
+              <a:t>17</a:t>
+            </a:fld>
+            <a:endParaRPr lang="en-US"/>
+          </a:p>
+        </p:txBody>
+      </p:sp>
+    </p:spTree>
+    <p:extLst>
+      <p:ext uri="{BB962C8B-B14F-4D97-AF65-F5344CB8AC3E}">
+        <p14:creationId xmlns:p14="http://schemas.microsoft.com/office/powerpoint/2010/main" val="638841097"/>
+      </p:ext>
+    </p:extLst>
+  </p:cSld>
+  <p:clrMapOvr>
+    <a:masterClrMapping/>
+  </p:clrMapOvr>
+</p:notes>
+</file>
+
+<file path=ppt/notesSlides/notesSlide6.xml><?xml version="1.0" encoding="utf-8"?>
+<p:notes xmlns:a="http://schemas.openxmlformats.org/drawingml/2006/main" xmlns:r="http://schemas.openxmlformats.org/officeDocument/2006/relationships" xmlns:p="http://schemas.openxmlformats.org/presentationml/2006/main">
+  <p:cSld>
+    <p:spTree>
+      <p:nvGrpSpPr>
+        <p:cNvPr id="1" name=""/>
+        <p:cNvGrpSpPr/>
+        <p:nvPr/>
+      </p:nvGrpSpPr>
+      <p:grpSpPr>
+        <a:xfrm>
+          <a:off x="0" y="0"/>
+          <a:ext cx="0" cy="0"/>
+          <a:chOff x="0" y="0"/>
+          <a:chExt cx="0" cy="0"/>
+        </a:xfrm>
+      </p:grpSpPr>
+      <p:sp>
+        <p:nvSpPr>
+          <p:cNvPr id="2" name="Slide Image Placeholder 1"/>
+          <p:cNvSpPr>
+            <a:spLocks noGrp="1" noRot="1" noChangeAspect="1"/>
+          </p:cNvSpPr>
+          <p:nvPr>
+            <p:ph type="sldImg"/>
+          </p:nvPr>
+        </p:nvSpPr>
+        <p:spPr/>
+      </p:sp>
+      <p:sp>
+        <p:nvSpPr>
+          <p:cNvPr id="3" name="Notes Placeholder 2"/>
+          <p:cNvSpPr>
+            <a:spLocks noGrp="1"/>
+          </p:cNvSpPr>
+          <p:nvPr>
+            <p:ph type="body" idx="1"/>
+          </p:nvPr>
+        </p:nvSpPr>
+        <p:spPr/>
+        <p:txBody>
+          <a:bodyPr/>
+          <a:lstStyle/>
+          <a:p>
+            <a:r>
+              <a:rPr lang="en-US" dirty="0"/>
+              <a:t>The Scoreboard implemented class contains:</a:t>
+            </a:r>
+          </a:p>
+          <a:p>
+            <a:pPr lvl="1"/>
+            <a:r>
+              <a:rPr lang="en-US" dirty="0"/>
+              <a:t>Two </a:t>
+            </a:r>
+            <a:r>
+              <a:rPr lang="en-US" dirty="0" err="1"/>
+              <a:t>uvm_analysis_export</a:t>
+            </a:r>
+            <a:r>
+              <a:rPr lang="en-US" dirty="0"/>
+              <a:t> (one for the DUT centroids and one for the Ref Model centroids)</a:t>
+            </a:r>
+          </a:p>
+          <a:p>
+            <a:pPr lvl="1"/>
+            <a:r>
+              <a:rPr lang="en-US" dirty="0"/>
+              <a:t>Two </a:t>
+            </a:r>
+            <a:r>
+              <a:rPr lang="en-US" dirty="0" err="1"/>
+              <a:t>uvm_tlm_analysis_fifo</a:t>
+            </a:r>
+            <a:r>
+              <a:rPr lang="en-US" dirty="0"/>
+              <a:t> (one for the DUT centroids and one for the Ref Model centroids)</a:t>
+            </a:r>
+          </a:p>
+          <a:p>
+            <a:pPr lvl="1"/>
+            <a:r>
+              <a:rPr lang="en-US" dirty="0"/>
+              <a:t>Virtual functional named compare centroids</a:t>
+            </a:r>
+          </a:p>
+          <a:p>
+            <a:r>
+              <a:rPr lang="en-US" dirty="0"/>
+              <a:t>This class uses the </a:t>
+            </a:r>
+            <a:r>
+              <a:rPr lang="en-US" dirty="0" err="1"/>
+              <a:t>uvm_tlm_analysis_fifo</a:t>
+            </a:r>
+            <a:r>
+              <a:rPr lang="en-US" dirty="0"/>
+              <a:t> and </a:t>
+            </a:r>
+            <a:r>
+              <a:rPr lang="en-US" dirty="0" err="1"/>
+              <a:t>uvm_analysis_export</a:t>
+            </a:r>
+            <a:r>
+              <a:rPr lang="en-US" dirty="0"/>
+              <a:t> in order to get the results from the DUT and Ref Model (the eight centroids of each of them). </a:t>
+            </a:r>
+          </a:p>
+          <a:p>
+            <a:r>
+              <a:rPr lang="en-US" dirty="0"/>
+              <a:t>In is Run task, the Scoreboard class calls the function </a:t>
+            </a:r>
+            <a:r>
+              <a:rPr lang="en-US" dirty="0" err="1"/>
+              <a:t>compare_centroids</a:t>
+            </a:r>
+            <a:r>
+              <a:rPr lang="en-US" dirty="0"/>
+              <a:t> in order to determine if a test run failed or passed. </a:t>
+            </a:r>
+          </a:p>
+          <a:p>
+            <a:r>
+              <a:rPr lang="en-US" dirty="0"/>
+              <a:t>This function determines the result by comparing the centroids od the DUT and the Ref Model, if the overall difference between all coordinates off all centroids is smaller than 16 times the value of the threshold. The pass/fail condition was derived from the functionality of the DUT and Ref Model, which consider a centroid converged if the  absolute value of the distance between it and the last iteration centroid is smaller than the threshold value. </a:t>
+            </a:r>
+          </a:p>
+          <a:p>
+            <a:endParaRPr lang="en-US" dirty="0"/>
+          </a:p>
+        </p:txBody>
+      </p:sp>
+      <p:sp>
+        <p:nvSpPr>
+          <p:cNvPr id="4" name="Slide Number Placeholder 3"/>
+          <p:cNvSpPr>
+            <a:spLocks noGrp="1"/>
+          </p:cNvSpPr>
+          <p:nvPr>
+            <p:ph type="sldNum" sz="quarter" idx="5"/>
+          </p:nvPr>
+        </p:nvSpPr>
+        <p:spPr/>
+        <p:txBody>
+          <a:bodyPr/>
+          <a:lstStyle/>
+          <a:p>
+            <a:fld id="{509FA207-E8FD-4363-95A6-907EB6A63BD8}" type="slidenum">
+              <a:rPr lang="en-US" smtClean="0"/>
+              <a:t>21</a:t>
+            </a:fld>
+            <a:endParaRPr lang="en-US"/>
+          </a:p>
+        </p:txBody>
+      </p:sp>
+    </p:spTree>
+    <p:extLst>
+      <p:ext uri="{BB962C8B-B14F-4D97-AF65-F5344CB8AC3E}">
+        <p14:creationId xmlns:p14="http://schemas.microsoft.com/office/powerpoint/2010/main" val="2293919143"/>
+      </p:ext>
+    </p:extLst>
+  </p:cSld>
+  <p:clrMapOvr>
+    <a:masterClrMapping/>
+  </p:clrMapOvr>
+</p:notes>
+</file>
+
+<file path=ppt/notesSlides/notesSlide7.xml><?xml version="1.0" encoding="utf-8"?>
+<p:notes xmlns:a="http://schemas.openxmlformats.org/drawingml/2006/main" xmlns:r="http://schemas.openxmlformats.org/officeDocument/2006/relationships" xmlns:p="http://schemas.openxmlformats.org/presentationml/2006/main">
+  <p:cSld>
+    <p:spTree>
+      <p:nvGrpSpPr>
+        <p:cNvPr id="1" name=""/>
+        <p:cNvGrpSpPr/>
+        <p:nvPr/>
+      </p:nvGrpSpPr>
+      <p:grpSpPr>
+        <a:xfrm>
+          <a:off x="0" y="0"/>
+          <a:ext cx="0" cy="0"/>
+          <a:chOff x="0" y="0"/>
+          <a:chExt cx="0" cy="0"/>
+        </a:xfrm>
+      </p:grpSpPr>
+      <p:sp>
+        <p:nvSpPr>
+          <p:cNvPr id="2" name="Slide Image Placeholder 1"/>
+          <p:cNvSpPr>
+            <a:spLocks noGrp="1" noRot="1" noChangeAspect="1"/>
+          </p:cNvSpPr>
+          <p:nvPr>
+            <p:ph type="sldImg"/>
+          </p:nvPr>
+        </p:nvSpPr>
+        <p:spPr/>
+      </p:sp>
+      <p:sp>
+        <p:nvSpPr>
+          <p:cNvPr id="3" name="Notes Placeholder 2"/>
+          <p:cNvSpPr>
+            <a:spLocks noGrp="1"/>
+          </p:cNvSpPr>
+          <p:nvPr>
+            <p:ph type="body" idx="1"/>
+          </p:nvPr>
+        </p:nvSpPr>
+        <p:spPr/>
+        <p:txBody>
+          <a:bodyPr/>
+          <a:lstStyle/>
+          <a:p>
+            <a:r>
+              <a:rPr lang="en-US" dirty="0"/>
+              <a:t>The Reference Model used to check the DUT results was written using </a:t>
+            </a:r>
+            <a:r>
+              <a:rPr lang="en-US" dirty="0" err="1"/>
+              <a:t>Matlab</a:t>
+            </a:r>
+            <a:r>
+              <a:rPr lang="en-US" dirty="0"/>
+              <a:t>. It is </a:t>
+            </a:r>
+            <a:r>
+              <a:rPr lang="en-US" dirty="0" err="1"/>
+              <a:t>Matlab</a:t>
+            </a:r>
+            <a:r>
+              <a:rPr lang="en-US" dirty="0"/>
+              <a:t> function named </a:t>
+            </a:r>
+            <a:r>
+              <a:rPr lang="en-US" dirty="0" err="1"/>
+              <a:t>RefModel.m</a:t>
+            </a:r>
+            <a:r>
+              <a:rPr lang="en-US" dirty="0"/>
+              <a:t>. This functions implements the K Means algorithm in software. </a:t>
+            </a:r>
+          </a:p>
+          <a:p>
+            <a:pPr>
+              <a:lnSpc>
+                <a:spcPct val="107000"/>
+              </a:lnSpc>
+              <a:spcBef>
+                <a:spcPts val="0"/>
+              </a:spcBef>
+              <a:spcAft>
+                <a:spcPts val="800"/>
+              </a:spcAft>
+            </a:pPr>
+            <a:r>
+              <a:rPr lang="en-US" dirty="0"/>
+              <a:t>The </a:t>
+            </a:r>
+            <a:r>
+              <a:rPr lang="en-US" dirty="0" err="1"/>
+              <a:t>RefModel.m</a:t>
+            </a:r>
+            <a:r>
+              <a:rPr lang="en-US" dirty="0"/>
+              <a:t> function receives five input parameters:</a:t>
+            </a:r>
+          </a:p>
+          <a:p>
+            <a:pPr lvl="1">
+              <a:lnSpc>
+                <a:spcPct val="107000"/>
+              </a:lnSpc>
+              <a:spcBef>
+                <a:spcPts val="0"/>
+              </a:spcBef>
+            </a:pPr>
+            <a:r>
+              <a:rPr lang="en-US" sz="1600" dirty="0">
+                <a:effectLst/>
+                <a:latin typeface="Calibri" panose="020F0502020204030204" pitchFamily="34" charset="0"/>
+                <a:ea typeface="Calibri" panose="020F0502020204030204" pitchFamily="34" charset="0"/>
+                <a:cs typeface="Arial" panose="020B0604020202020204" pitchFamily="34" charset="0"/>
+              </a:rPr>
+              <a:t>Point input matrix with 512 rows and 7 columns, where each row represent a point in the DUT numeric representation model, i.e. each row is a point with 7 dimensions, each dimension is a fixed point number with 13 bits(MSB is the sign bit, the following two bits represent the integer value and the</a:t>
+            </a:r>
+            <a:r>
+              <a:rPr lang="en-US" sz="1600" dirty="0">
+                <a:solidFill>
+                  <a:srgbClr val="FF0000"/>
+                </a:solidFill>
+                <a:effectLst/>
+                <a:latin typeface="Calibri" panose="020F0502020204030204" pitchFamily="34" charset="0"/>
+                <a:ea typeface="Calibri" panose="020F0502020204030204" pitchFamily="34" charset="0"/>
+                <a:cs typeface="Arial" panose="020B0604020202020204" pitchFamily="34" charset="0"/>
+              </a:rPr>
+              <a:t> </a:t>
+            </a:r>
+            <a:r>
+              <a:rPr lang="en-US" sz="1600" dirty="0">
+                <a:effectLst/>
+                <a:latin typeface="Calibri" panose="020F0502020204030204" pitchFamily="34" charset="0"/>
+                <a:ea typeface="Calibri" panose="020F0502020204030204" pitchFamily="34" charset="0"/>
+                <a:cs typeface="Arial" panose="020B0604020202020204" pitchFamily="34" charset="0"/>
+              </a:rPr>
+              <a:t>remaining ten bits represent the fractional part)</a:t>
+            </a:r>
+          </a:p>
+          <a:p>
+            <a:pPr lvl="1">
+              <a:lnSpc>
+                <a:spcPct val="107000"/>
+              </a:lnSpc>
+              <a:spcBef>
+                <a:spcPts val="0"/>
+              </a:spcBef>
+            </a:pPr>
+            <a:r>
+              <a:rPr lang="en-US" sz="1600" dirty="0">
+                <a:effectLst/>
+                <a:latin typeface="Calibri" panose="020F0502020204030204" pitchFamily="34" charset="0"/>
+                <a:ea typeface="Calibri" panose="020F0502020204030204" pitchFamily="34" charset="0"/>
+                <a:cs typeface="Arial" panose="020B0604020202020204" pitchFamily="34" charset="0"/>
+              </a:rPr>
+              <a:t>Initial centroid matrix with 8 rows and 7 columns, where each row represents an initial centroid value in the DUT numeric representation model.</a:t>
+            </a:r>
+          </a:p>
+          <a:p>
+            <a:pPr lvl="1">
+              <a:lnSpc>
+                <a:spcPct val="107000"/>
+              </a:lnSpc>
+              <a:spcBef>
+                <a:spcPts val="0"/>
+              </a:spcBef>
+            </a:pPr>
+            <a:r>
+              <a:rPr lang="en-US" sz="1600" dirty="0">
+                <a:effectLst/>
+                <a:latin typeface="Calibri" panose="020F0502020204030204" pitchFamily="34" charset="0"/>
+                <a:ea typeface="Calibri" panose="020F0502020204030204" pitchFamily="34" charset="0"/>
+                <a:cs typeface="Arial" panose="020B0604020202020204" pitchFamily="34" charset="0"/>
+              </a:rPr>
+              <a:t>Input threshold value in the DUT numeric representation model</a:t>
+            </a:r>
+          </a:p>
+          <a:p>
+            <a:pPr lvl="1">
+              <a:lnSpc>
+                <a:spcPct val="107000"/>
+              </a:lnSpc>
+              <a:spcBef>
+                <a:spcPts val="0"/>
+              </a:spcBef>
+            </a:pPr>
+            <a:r>
+              <a:rPr lang="en-US" sz="1600" dirty="0">
+                <a:effectLst/>
+                <a:latin typeface="Calibri" panose="020F0502020204030204" pitchFamily="34" charset="0"/>
+                <a:ea typeface="Calibri" panose="020F0502020204030204" pitchFamily="34" charset="0"/>
+                <a:cs typeface="Arial" panose="020B0604020202020204" pitchFamily="34" charset="0"/>
+              </a:rPr>
+              <a:t>First point index</a:t>
+            </a:r>
+          </a:p>
+          <a:p>
+            <a:pPr lvl="1">
+              <a:lnSpc>
+                <a:spcPct val="107000"/>
+              </a:lnSpc>
+              <a:spcBef>
+                <a:spcPts val="0"/>
+              </a:spcBef>
+              <a:spcAft>
+                <a:spcPts val="800"/>
+              </a:spcAft>
+            </a:pPr>
+            <a:r>
+              <a:rPr lang="en-US" sz="1600" dirty="0">
+                <a:effectLst/>
+                <a:latin typeface="Calibri" panose="020F0502020204030204" pitchFamily="34" charset="0"/>
+                <a:ea typeface="Calibri" panose="020F0502020204030204" pitchFamily="34" charset="0"/>
+                <a:cs typeface="Arial" panose="020B0604020202020204" pitchFamily="34" charset="0"/>
+              </a:rPr>
+              <a:t>Last point index</a:t>
+            </a:r>
+          </a:p>
+          <a:p>
+            <a:endParaRPr lang="en-US" dirty="0"/>
+          </a:p>
+        </p:txBody>
+      </p:sp>
+      <p:sp>
+        <p:nvSpPr>
+          <p:cNvPr id="4" name="Slide Number Placeholder 3"/>
+          <p:cNvSpPr>
+            <a:spLocks noGrp="1"/>
+          </p:cNvSpPr>
+          <p:nvPr>
+            <p:ph type="sldNum" sz="quarter" idx="5"/>
+          </p:nvPr>
+        </p:nvSpPr>
+        <p:spPr/>
+        <p:txBody>
+          <a:bodyPr/>
+          <a:lstStyle/>
+          <a:p>
+            <a:fld id="{509FA207-E8FD-4363-95A6-907EB6A63BD8}" type="slidenum">
+              <a:rPr lang="en-US" smtClean="0"/>
+              <a:t>22</a:t>
+            </a:fld>
+            <a:endParaRPr lang="en-US"/>
+          </a:p>
+        </p:txBody>
+      </p:sp>
+    </p:spTree>
+    <p:extLst>
+      <p:ext uri="{BB962C8B-B14F-4D97-AF65-F5344CB8AC3E}">
+        <p14:creationId xmlns:p14="http://schemas.microsoft.com/office/powerpoint/2010/main" val="3832311264"/>
+      </p:ext>
+    </p:extLst>
+  </p:cSld>
+  <p:clrMapOvr>
+    <a:masterClrMapping/>
+  </p:clrMapOvr>
+</p:notes>
+</file>
+
+<file path=ppt/notesSlides/notesSlide8.xml><?xml version="1.0" encoding="utf-8"?>
+<p:notes xmlns:a="http://schemas.openxmlformats.org/drawingml/2006/main" xmlns:r="http://schemas.openxmlformats.org/officeDocument/2006/relationships" xmlns:p="http://schemas.openxmlformats.org/presentationml/2006/main">
+  <p:cSld>
+    <p:spTree>
+      <p:nvGrpSpPr>
+        <p:cNvPr id="1" name=""/>
+        <p:cNvGrpSpPr/>
+        <p:nvPr/>
+      </p:nvGrpSpPr>
+      <p:grpSpPr>
+        <a:xfrm>
+          <a:off x="0" y="0"/>
+          <a:ext cx="0" cy="0"/>
+          <a:chOff x="0" y="0"/>
+          <a:chExt cx="0" cy="0"/>
+        </a:xfrm>
+      </p:grpSpPr>
+      <p:sp>
+        <p:nvSpPr>
+          <p:cNvPr id="2" name="Slide Image Placeholder 1"/>
+          <p:cNvSpPr>
+            <a:spLocks noGrp="1" noRot="1" noChangeAspect="1"/>
+          </p:cNvSpPr>
+          <p:nvPr>
+            <p:ph type="sldImg"/>
+          </p:nvPr>
+        </p:nvSpPr>
+        <p:spPr/>
+      </p:sp>
+      <p:sp>
+        <p:nvSpPr>
+          <p:cNvPr id="3" name="Notes Placeholder 2"/>
+          <p:cNvSpPr>
+            <a:spLocks noGrp="1"/>
+          </p:cNvSpPr>
+          <p:nvPr>
+            <p:ph type="body" idx="1"/>
+          </p:nvPr>
+        </p:nvSpPr>
+        <p:spPr/>
+        <p:txBody>
+          <a:bodyPr/>
+          <a:lstStyle/>
+          <a:p>
+            <a:pPr marL="0" marR="0">
+              <a:lnSpc>
+                <a:spcPct val="107000"/>
+              </a:lnSpc>
+              <a:spcBef>
+                <a:spcPts val="0"/>
+              </a:spcBef>
+              <a:spcAft>
+                <a:spcPts val="800"/>
+              </a:spcAft>
+            </a:pPr>
+            <a:r>
+              <a:rPr lang="en-US" sz="1200" dirty="0">
+                <a:effectLst/>
+                <a:latin typeface="Calibri" panose="020F0502020204030204" pitchFamily="34" charset="0"/>
+                <a:ea typeface="Calibri" panose="020F0502020204030204" pitchFamily="34" charset="0"/>
+                <a:cs typeface="Arial" panose="020B0604020202020204" pitchFamily="34" charset="0"/>
+              </a:rPr>
+              <a:t>These parameters are used in the following way: the Reference model function uses the Point input matrix as the DUT uses its RAM, it read the points values from the “First point index” till the “Last point index” into another matrix, named point matrix , which will be used to run the algorithm. </a:t>
+            </a:r>
+          </a:p>
+          <a:p>
+            <a:pPr marL="0" marR="0">
+              <a:lnSpc>
+                <a:spcPct val="107000"/>
+              </a:lnSpc>
+              <a:spcBef>
+                <a:spcPts val="0"/>
+              </a:spcBef>
+              <a:spcAft>
+                <a:spcPts val="800"/>
+              </a:spcAft>
+            </a:pPr>
+            <a:r>
+              <a:rPr lang="en-US" sz="1200" dirty="0">
+                <a:effectLst/>
+                <a:latin typeface="Calibri" panose="020F0502020204030204" pitchFamily="34" charset="0"/>
+                <a:ea typeface="Calibri" panose="020F0502020204030204" pitchFamily="34" charset="0"/>
+                <a:cs typeface="Arial" panose="020B0604020202020204" pitchFamily="34" charset="0"/>
+              </a:rPr>
+              <a:t>Then the function interactively executes the algorithm</a:t>
+            </a:r>
+            <a:r>
+              <a:rPr lang="en-US" sz="1200" dirty="0">
+                <a:solidFill>
+                  <a:srgbClr val="FF0000"/>
+                </a:solidFill>
+                <a:effectLst/>
+                <a:latin typeface="Calibri" panose="020F0502020204030204" pitchFamily="34" charset="0"/>
+                <a:ea typeface="Calibri" panose="020F0502020204030204" pitchFamily="34" charset="0"/>
+                <a:cs typeface="Arial" panose="020B0604020202020204" pitchFamily="34" charset="0"/>
+              </a:rPr>
+              <a:t> </a:t>
+            </a:r>
+            <a:r>
+              <a:rPr lang="en-US" sz="1200" dirty="0">
+                <a:effectLst/>
+                <a:latin typeface="Calibri" panose="020F0502020204030204" pitchFamily="34" charset="0"/>
+                <a:ea typeface="Calibri" panose="020F0502020204030204" pitchFamily="34" charset="0"/>
+                <a:cs typeface="Arial" panose="020B0604020202020204" pitchFamily="34" charset="0"/>
+              </a:rPr>
+              <a:t>using the point matrix, the “input centroid matrix” and the “input threshold”. </a:t>
+            </a:r>
+          </a:p>
+          <a:p>
+            <a:pPr marL="0">
+              <a:lnSpc>
+                <a:spcPct val="107000"/>
+              </a:lnSpc>
+              <a:spcBef>
+                <a:spcPts val="0"/>
+              </a:spcBef>
+              <a:spcAft>
+                <a:spcPts val="800"/>
+              </a:spcAft>
+            </a:pPr>
+            <a:r>
+              <a:rPr lang="en-US" sz="1200" dirty="0">
+                <a:effectLst/>
+                <a:latin typeface="Calibri" panose="020F0502020204030204" pitchFamily="34" charset="0"/>
+                <a:ea typeface="Calibri" panose="020F0502020204030204" pitchFamily="34" charset="0"/>
+                <a:cs typeface="Arial" panose="020B0604020202020204" pitchFamily="34" charset="0"/>
+              </a:rPr>
+              <a:t>The following figure summarizes the Reference Model in a flow chart:</a:t>
+            </a:r>
+          </a:p>
+          <a:p>
+            <a:endParaRPr lang="en-US" dirty="0"/>
+          </a:p>
+        </p:txBody>
+      </p:sp>
+      <p:sp>
+        <p:nvSpPr>
+          <p:cNvPr id="4" name="Slide Number Placeholder 3"/>
+          <p:cNvSpPr>
+            <a:spLocks noGrp="1"/>
+          </p:cNvSpPr>
+          <p:nvPr>
+            <p:ph type="sldNum" sz="quarter" idx="5"/>
+          </p:nvPr>
+        </p:nvSpPr>
+        <p:spPr/>
+        <p:txBody>
+          <a:bodyPr/>
+          <a:lstStyle/>
+          <a:p>
+            <a:fld id="{509FA207-E8FD-4363-95A6-907EB6A63BD8}" type="slidenum">
+              <a:rPr lang="en-US" smtClean="0"/>
+              <a:t>23</a:t>
+            </a:fld>
+            <a:endParaRPr lang="en-US"/>
+          </a:p>
+        </p:txBody>
+      </p:sp>
+    </p:spTree>
+    <p:extLst>
+      <p:ext uri="{BB962C8B-B14F-4D97-AF65-F5344CB8AC3E}">
+        <p14:creationId xmlns:p14="http://schemas.microsoft.com/office/powerpoint/2010/main" val="114273283"/>
+      </p:ext>
+    </p:extLst>
+  </p:cSld>
+  <p:clrMapOvr>
+    <a:masterClrMapping/>
+  </p:clrMapOvr>
+</p:notes>
+</file>
+
+<file path=ppt/notesSlides/notesSlide9.xml><?xml version="1.0" encoding="utf-8"?>
+<p:notes xmlns:a="http://schemas.openxmlformats.org/drawingml/2006/main" xmlns:r="http://schemas.openxmlformats.org/officeDocument/2006/relationships" xmlns:p="http://schemas.openxmlformats.org/presentationml/2006/main">
+  <p:cSld>
+    <p:spTree>
+      <p:nvGrpSpPr>
+        <p:cNvPr id="1" name=""/>
+        <p:cNvGrpSpPr/>
+        <p:nvPr/>
+      </p:nvGrpSpPr>
+      <p:grpSpPr>
+        <a:xfrm>
+          <a:off x="0" y="0"/>
+          <a:ext cx="0" cy="0"/>
+          <a:chOff x="0" y="0"/>
+          <a:chExt cx="0" cy="0"/>
+        </a:xfrm>
+      </p:grpSpPr>
+      <p:sp>
+        <p:nvSpPr>
+          <p:cNvPr id="2" name="Slide Image Placeholder 1"/>
+          <p:cNvSpPr>
+            <a:spLocks noGrp="1" noRot="1" noChangeAspect="1"/>
+          </p:cNvSpPr>
+          <p:nvPr>
+            <p:ph type="sldImg"/>
+          </p:nvPr>
+        </p:nvSpPr>
+        <p:spPr/>
+      </p:sp>
+      <p:sp>
+        <p:nvSpPr>
+          <p:cNvPr id="3" name="Notes Placeholder 2"/>
+          <p:cNvSpPr>
+            <a:spLocks noGrp="1"/>
+          </p:cNvSpPr>
+          <p:nvPr>
+            <p:ph type="body" idx="1"/>
+          </p:nvPr>
+        </p:nvSpPr>
+        <p:spPr/>
+        <p:txBody>
+          <a:bodyPr/>
+          <a:lstStyle/>
+          <a:p>
+            <a:r>
+              <a:rPr lang="en-US" dirty="0"/>
+              <a:t>In </a:t>
+            </a:r>
+            <a:r>
+              <a:rPr lang="en-US" dirty="0" err="1"/>
+              <a:t>convergence_check_block</a:t>
+            </a:r>
+            <a:r>
+              <a:rPr lang="en-US" dirty="0"/>
+              <a:t>, the new calculated centroids of each iteration are checked for convergence by comparing them to the last iteration’s centroids values(one by one). In the case where convergence was not reached, the new centroids are used in the next iteration as the algorithm centroids.</a:t>
+            </a:r>
+          </a:p>
+          <a:p>
+            <a:r>
+              <a:rPr lang="en-US" dirty="0"/>
+              <a:t>In the convergence check module, there is a sensitivity list used to take one old centroid from the 8 and compare it to the correspondingly new centroid which come as input from prior module (new means calculation block).</a:t>
+            </a:r>
+          </a:p>
+          <a:p>
+            <a:pPr marL="0" marR="0">
+              <a:lnSpc>
+                <a:spcPct val="107000"/>
+              </a:lnSpc>
+              <a:spcBef>
+                <a:spcPts val="0"/>
+              </a:spcBef>
+              <a:spcAft>
+                <a:spcPts val="800"/>
+              </a:spcAft>
+            </a:pPr>
+            <a:r>
+              <a:rPr lang="en-US" dirty="0"/>
+              <a:t> This sensitivity list did not cover the change in values of the relevant inputs for this supposedly combinatorial representation of always, the following fix was done to solve the problem:</a:t>
+            </a:r>
+          </a:p>
+          <a:p>
+            <a:pPr marL="457200" lvl="1">
+              <a:lnSpc>
+                <a:spcPct val="107000"/>
+              </a:lnSpc>
+              <a:spcBef>
+                <a:spcPts val="0"/>
+              </a:spcBef>
+              <a:spcAft>
+                <a:spcPts val="800"/>
+              </a:spcAft>
+            </a:pPr>
+            <a:r>
+              <a:rPr lang="en-US" dirty="0"/>
+              <a:t>Before: "always @(cent_num) begin".</a:t>
+            </a:r>
+          </a:p>
+          <a:p>
+            <a:pPr marL="457200" lvl="1">
+              <a:lnSpc>
+                <a:spcPct val="107000"/>
+              </a:lnSpc>
+              <a:spcBef>
+                <a:spcPts val="0"/>
+              </a:spcBef>
+              <a:spcAft>
+                <a:spcPts val="800"/>
+              </a:spcAft>
+            </a:pPr>
+            <a:r>
+              <a:rPr lang="en-US" dirty="0"/>
+              <a:t>After: "always @* begin".</a:t>
+            </a:r>
+          </a:p>
+          <a:p>
+            <a:endParaRPr lang="en-US" dirty="0"/>
+          </a:p>
+        </p:txBody>
+      </p:sp>
+      <p:sp>
+        <p:nvSpPr>
+          <p:cNvPr id="4" name="Slide Number Placeholder 3"/>
+          <p:cNvSpPr>
+            <a:spLocks noGrp="1"/>
+          </p:cNvSpPr>
+          <p:nvPr>
+            <p:ph type="sldNum" sz="quarter" idx="5"/>
+          </p:nvPr>
+        </p:nvSpPr>
+        <p:spPr/>
+        <p:txBody>
+          <a:bodyPr/>
+          <a:lstStyle/>
+          <a:p>
+            <a:fld id="{509FA207-E8FD-4363-95A6-907EB6A63BD8}" type="slidenum">
+              <a:rPr lang="en-US" smtClean="0"/>
+              <a:t>32</a:t>
+            </a:fld>
+            <a:endParaRPr lang="en-US"/>
+          </a:p>
+        </p:txBody>
+      </p:sp>
+    </p:spTree>
+    <p:extLst>
+      <p:ext uri="{BB962C8B-B14F-4D97-AF65-F5344CB8AC3E}">
+        <p14:creationId xmlns:p14="http://schemas.microsoft.com/office/powerpoint/2010/main" val="3067401951"/>
       </p:ext>
     </p:extLst>
   </p:cSld>
@@ -1169,7 +2968,7 @@
           <a:p>
             <a:fld id="{CD2AB640-041E-414A-8FDF-E33E6A90A0DD}" type="datetimeFigureOut">
               <a:rPr lang="en-US" smtClean="0"/>
-              <a:t>12/26/2020</a:t>
+              <a:t>12/27/2020</a:t>
             </a:fld>
             <a:endParaRPr lang="en-US"/>
           </a:p>
@@ -1367,7 +3166,7 @@
           <a:p>
             <a:fld id="{CD2AB640-041E-414A-8FDF-E33E6A90A0DD}" type="datetimeFigureOut">
               <a:rPr lang="en-US" smtClean="0"/>
-              <a:t>12/26/2020</a:t>
+              <a:t>12/27/2020</a:t>
             </a:fld>
             <a:endParaRPr lang="en-US"/>
           </a:p>
@@ -1575,7 +3374,7 @@
           <a:p>
             <a:fld id="{CD2AB640-041E-414A-8FDF-E33E6A90A0DD}" type="datetimeFigureOut">
               <a:rPr lang="en-US" smtClean="0"/>
-              <a:t>12/26/2020</a:t>
+              <a:t>12/27/2020</a:t>
             </a:fld>
             <a:endParaRPr lang="en-US"/>
           </a:p>
@@ -1773,7 +3572,7 @@
           <a:p>
             <a:fld id="{CD2AB640-041E-414A-8FDF-E33E6A90A0DD}" type="datetimeFigureOut">
               <a:rPr lang="en-US" smtClean="0"/>
-              <a:t>12/26/2020</a:t>
+              <a:t>12/27/2020</a:t>
             </a:fld>
             <a:endParaRPr lang="en-US"/>
           </a:p>
@@ -2048,7 +3847,7 @@
           <a:p>
             <a:fld id="{CD2AB640-041E-414A-8FDF-E33E6A90A0DD}" type="datetimeFigureOut">
               <a:rPr lang="en-US" smtClean="0"/>
-              <a:t>12/26/2020</a:t>
+              <a:t>12/27/2020</a:t>
             </a:fld>
             <a:endParaRPr lang="en-US"/>
           </a:p>
@@ -2313,7 +4112,7 @@
           <a:p>
             <a:fld id="{CD2AB640-041E-414A-8FDF-E33E6A90A0DD}" type="datetimeFigureOut">
               <a:rPr lang="en-US" smtClean="0"/>
-              <a:t>12/26/2020</a:t>
+              <a:t>12/27/2020</a:t>
             </a:fld>
             <a:endParaRPr lang="en-US"/>
           </a:p>
@@ -2725,7 +4524,7 @@
           <a:p>
             <a:fld id="{CD2AB640-041E-414A-8FDF-E33E6A90A0DD}" type="datetimeFigureOut">
               <a:rPr lang="en-US" smtClean="0"/>
-              <a:t>12/26/2020</a:t>
+              <a:t>12/27/2020</a:t>
             </a:fld>
             <a:endParaRPr lang="en-US"/>
           </a:p>
@@ -2866,7 +4665,7 @@
           <a:p>
             <a:fld id="{CD2AB640-041E-414A-8FDF-E33E6A90A0DD}" type="datetimeFigureOut">
               <a:rPr lang="en-US" smtClean="0"/>
-              <a:t>12/26/2020</a:t>
+              <a:t>12/27/2020</a:t>
             </a:fld>
             <a:endParaRPr lang="en-US"/>
           </a:p>
@@ -2979,7 +4778,7 @@
           <a:p>
             <a:fld id="{CD2AB640-041E-414A-8FDF-E33E6A90A0DD}" type="datetimeFigureOut">
               <a:rPr lang="en-US" smtClean="0"/>
-              <a:t>12/26/2020</a:t>
+              <a:t>12/27/2020</a:t>
             </a:fld>
             <a:endParaRPr lang="en-US"/>
           </a:p>
@@ -3290,7 +5089,7 @@
           <a:p>
             <a:fld id="{CD2AB640-041E-414A-8FDF-E33E6A90A0DD}" type="datetimeFigureOut">
               <a:rPr lang="en-US" smtClean="0"/>
-              <a:t>12/26/2020</a:t>
+              <a:t>12/27/2020</a:t>
             </a:fld>
             <a:endParaRPr lang="en-US"/>
           </a:p>
@@ -3578,7 +5377,7 @@
           <a:p>
             <a:fld id="{CD2AB640-041E-414A-8FDF-E33E6A90A0DD}" type="datetimeFigureOut">
               <a:rPr lang="en-US" smtClean="0"/>
-              <a:t>12/26/2020</a:t>
+              <a:t>12/27/2020</a:t>
             </a:fld>
             <a:endParaRPr lang="en-US"/>
           </a:p>
@@ -3819,7 +5618,7 @@
           <a:p>
             <a:fld id="{CD2AB640-041E-414A-8FDF-E33E6A90A0DD}" type="datetimeFigureOut">
               <a:rPr lang="en-US" smtClean="0"/>
-              <a:t>12/26/2020</a:t>
+              <a:t>12/27/2020</a:t>
             </a:fld>
             <a:endParaRPr lang="en-US"/>
           </a:p>
@@ -4644,13 +6443,13 @@
               </a:spcAft>
             </a:pPr>
             <a:r>
-              <a:rPr lang="en-US" sz="1800" dirty="0">
+              <a:rPr lang="en-US" sz="2000" dirty="0">
                 <a:effectLst/>
                 <a:latin typeface="Calibri" panose="020F0502020204030204" pitchFamily="34" charset="0"/>
                 <a:ea typeface="Calibri" panose="020F0502020204030204" pitchFamily="34" charset="0"/>
                 <a:cs typeface="Arial" panose="020B0604020202020204" pitchFamily="34" charset="0"/>
               </a:rPr>
-              <a:t>The scoreboard is a crucial element in a self-checking environment, it verifies the proper operation of a design at a functional level. In this project, the same inputs are driven into the DUT and into the Reference Model, and their outputs are monitored by the monitors. The scoreboard then receives these outputs and compares them. </a:t>
+              <a:t>The scoreboard verifies the proper operation of a design at a functional level. </a:t>
             </a:r>
           </a:p>
           <a:p>
@@ -4666,13 +6465,13 @@
               </a:spcAft>
             </a:pPr>
             <a:r>
-              <a:rPr lang="en-US" sz="1800" dirty="0">
+              <a:rPr lang="en-US" sz="2000" dirty="0">
                 <a:effectLst/>
                 <a:latin typeface="Calibri" panose="020F0502020204030204" pitchFamily="34" charset="0"/>
                 <a:ea typeface="Calibri" panose="020F0502020204030204" pitchFamily="34" charset="0"/>
                 <a:cs typeface="Arial" panose="020B0604020202020204" pitchFamily="34" charset="0"/>
               </a:rPr>
-              <a:t>There are designers who prefer to leave the prediction to the scoreboard. So, the functionality of the scoreboard is very subjective.</a:t>
+              <a:t>In this project, the same inputs are driven into the DUT and into the Reference Model, and their outputs are monitored by the monitors. The scoreboard then receives these outputs and compares them. </a:t>
             </a:r>
           </a:p>
           <a:p>
@@ -4688,16 +6487,38 @@
               </a:spcAft>
             </a:pPr>
             <a:r>
-              <a:rPr lang="en-US" sz="1800" dirty="0">
+              <a:rPr lang="en-US" sz="2000" dirty="0">
                 <a:effectLst/>
                 <a:latin typeface="Calibri" panose="020F0502020204030204" pitchFamily="34" charset="0"/>
                 <a:ea typeface="Calibri" panose="020F0502020204030204" pitchFamily="34" charset="0"/>
                 <a:cs typeface="Arial" panose="020B0604020202020204" pitchFamily="34" charset="0"/>
               </a:rPr>
+              <a:t>There are designers who prefer to leave the prediction to the scoreboard. So, the functionality of the scoreboard is very subjective.</a:t>
+            </a:r>
+          </a:p>
+          <a:p>
+            <a:pPr marL="0" marR="0">
+              <a:lnSpc>
+                <a:spcPct val="107000"/>
+              </a:lnSpc>
+              <a:spcBef>
+                <a:spcPts val="0"/>
+              </a:spcBef>
+              <a:spcAft>
+                <a:spcPts val="800"/>
+              </a:spcAft>
+            </a:pPr>
+            <a:r>
+              <a:rPr lang="en-US" sz="2000" dirty="0">
+                <a:effectLst/>
+                <a:latin typeface="Calibri" panose="020F0502020204030204" pitchFamily="34" charset="0"/>
+                <a:ea typeface="Calibri" panose="020F0502020204030204" pitchFamily="34" charset="0"/>
+                <a:cs typeface="Arial" panose="020B0604020202020204" pitchFamily="34" charset="0"/>
+              </a:rPr>
               <a:t>In the agent, two monitors were created, as a result, two analysis exports had to be created in the scoreboard, which are</a:t>
             </a:r>
             <a:r>
-              <a:rPr lang="en-US" sz="1800" dirty="0">
+              <a:rPr lang="en-US" sz="2000" dirty="0">
                 <a:solidFill>
                   <a:srgbClr val="FF0000"/>
                 </a:solidFill>
@@ -4709,16 +6530,43 @@
               <a:t> </a:t>
             </a:r>
             <a:r>
-              <a:rPr lang="en-US" sz="1800" dirty="0">
+              <a:rPr lang="en-US" sz="2000" dirty="0">
                 <a:effectLst/>
                 <a:latin typeface="Calibri" panose="020F0502020204030204" pitchFamily="34" charset="0"/>
                 <a:ea typeface="Calibri" panose="020F0502020204030204" pitchFamily="34" charset="0"/>
                 <a:cs typeface="Arial" panose="020B0604020202020204" pitchFamily="34" charset="0"/>
               </a:rPr>
-              <a:t>used to retrieve transactions from both monitors. Next, a method compare() is</a:t>
-            </a:r>
-            <a:r>
-              <a:rPr lang="en-US" sz="1800" dirty="0">
+              <a:t>used to retrieve transactions from both monitors. </a:t>
+            </a:r>
+            <a:endParaRPr lang="en-US" sz="2000" dirty="0">
+              <a:latin typeface="Calibri" panose="020F0502020204030204" pitchFamily="34" charset="0"/>
+              <a:ea typeface="Calibri" panose="020F0502020204030204" pitchFamily="34" charset="0"/>
+              <a:cs typeface="Arial" panose="020B0604020202020204" pitchFamily="34" charset="0"/>
+            </a:endParaRPr>
+          </a:p>
+          <a:p>
+            <a:pPr marL="0" marR="0">
+              <a:lnSpc>
+                <a:spcPct val="107000"/>
+              </a:lnSpc>
+              <a:spcBef>
+                <a:spcPts val="0"/>
+              </a:spcBef>
+              <a:spcAft>
+                <a:spcPts val="800"/>
+              </a:spcAft>
+            </a:pPr>
+            <a:r>
+              <a:rPr lang="en-US" sz="2000" dirty="0">
+                <a:effectLst/>
+                <a:latin typeface="Calibri" panose="020F0502020204030204" pitchFamily="34" charset="0"/>
+                <a:ea typeface="Calibri" panose="020F0502020204030204" pitchFamily="34" charset="0"/>
+                <a:cs typeface="Arial" panose="020B0604020202020204" pitchFamily="34" charset="0"/>
+              </a:rPr>
+              <a:t>A method compare() is</a:t>
+            </a:r>
+            <a:r>
+              <a:rPr lang="en-US" sz="2000" dirty="0">
                 <a:solidFill>
                   <a:srgbClr val="FF0000"/>
                 </a:solidFill>
@@ -4730,7 +6578,7 @@
               <a:t> </a:t>
             </a:r>
             <a:r>
-              <a:rPr lang="en-US" sz="1800" dirty="0">
+              <a:rPr lang="en-US" sz="2000" dirty="0">
                 <a:effectLst/>
                 <a:latin typeface="Calibri" panose="020F0502020204030204" pitchFamily="34" charset="0"/>
                 <a:ea typeface="Calibri" panose="020F0502020204030204" pitchFamily="34" charset="0"/>
@@ -4827,7 +6675,7 @@
           <a:lstStyle/>
           <a:p>
             <a:r>
-              <a:rPr lang="en-US" sz="1800" dirty="0">
+              <a:rPr lang="en-US" sz="2400" dirty="0">
                 <a:effectLst/>
                 <a:latin typeface="Calibri" panose="020F0502020204030204" pitchFamily="34" charset="0"/>
                 <a:ea typeface="Calibri" panose="020F0502020204030204" pitchFamily="34" charset="0"/>
@@ -4920,7 +6768,9 @@
         </p:nvSpPr>
         <p:spPr/>
         <p:txBody>
-          <a:bodyPr/>
+          <a:bodyPr>
+            <a:normAutofit/>
+          </a:bodyPr>
           <a:lstStyle/>
           <a:p>
             <a:pPr>
@@ -4935,7 +6785,7 @@
               </a:spcAft>
             </a:pPr>
             <a:r>
-              <a:rPr lang="en-US" sz="1800" dirty="0">
+              <a:rPr lang="en-US" sz="2400" dirty="0">
                 <a:effectLst/>
                 <a:latin typeface="Calibri" panose="020F0502020204030204" pitchFamily="34" charset="0"/>
                 <a:ea typeface="Calibri" panose="020F0502020204030204" pitchFamily="34" charset="0"/>
@@ -4944,7 +6794,7 @@
               <a:t>This block</a:t>
             </a:r>
             <a:r>
-              <a:rPr lang="en-US" sz="1800" dirty="0">
+              <a:rPr lang="en-US" sz="2400" dirty="0">
                 <a:solidFill>
                   <a:srgbClr val="FF0000"/>
                 </a:solidFill>
@@ -4956,7 +6806,7 @@
               <a:t> </a:t>
             </a:r>
             <a:r>
-              <a:rPr lang="en-US" sz="1800" dirty="0">
+              <a:rPr lang="en-US" sz="2400" dirty="0">
                 <a:effectLst/>
                 <a:latin typeface="Calibri" panose="020F0502020204030204" pitchFamily="34" charset="0"/>
                 <a:ea typeface="Calibri" panose="020F0502020204030204" pitchFamily="34" charset="0"/>
@@ -4965,7 +6815,7 @@
               <a:t>is derived from the </a:t>
             </a:r>
             <a:r>
-              <a:rPr lang="en-US" sz="1800" dirty="0" err="1">
+              <a:rPr lang="en-US" sz="2400" dirty="0" err="1">
                 <a:effectLst/>
                 <a:latin typeface="Calibri" panose="020F0502020204030204" pitchFamily="34" charset="0"/>
                 <a:ea typeface="Calibri" panose="020F0502020204030204" pitchFamily="34" charset="0"/>
@@ -4974,7 +6824,7 @@
               <a:t>uvm_test</a:t>
             </a:r>
             <a:r>
-              <a:rPr lang="en-US" sz="1800" dirty="0">
+              <a:rPr lang="en-US" sz="2400" dirty="0">
                 <a:effectLst/>
                 <a:latin typeface="Calibri" panose="020F0502020204030204" pitchFamily="34" charset="0"/>
                 <a:ea typeface="Calibri" panose="020F0502020204030204" pitchFamily="34" charset="0"/>
@@ -4993,7 +6843,7 @@
               </a:spcBef>
             </a:pPr>
             <a:r>
-              <a:rPr lang="en-US" sz="1400" dirty="0">
+              <a:rPr lang="en-US" sz="2000" dirty="0">
                 <a:effectLst/>
                 <a:latin typeface="Calibri" panose="020F0502020204030204" pitchFamily="34" charset="0"/>
                 <a:ea typeface="Calibri" panose="020F0502020204030204" pitchFamily="34" charset="0"/>
@@ -5015,7 +6865,7 @@
               </a:spcAft>
             </a:pPr>
             <a:r>
-              <a:rPr lang="en-US" sz="1400" dirty="0">
+              <a:rPr lang="en-US" sz="2000" dirty="0">
                 <a:effectLst/>
                 <a:latin typeface="Calibri" panose="020F0502020204030204" pitchFamily="34" charset="0"/>
                 <a:ea typeface="Calibri" panose="020F0502020204030204" pitchFamily="34" charset="0"/>
@@ -5037,16 +6887,41 @@
               </a:spcAft>
             </a:pPr>
             <a:r>
-              <a:rPr lang="en-US" sz="1800" dirty="0">
+              <a:rPr lang="en-US" sz="2400" dirty="0">
+                <a:latin typeface="Calibri" panose="020F0502020204030204" pitchFamily="34" charset="0"/>
+                <a:ea typeface="Calibri" panose="020F0502020204030204" pitchFamily="34" charset="0"/>
+                <a:cs typeface="Arial" panose="020B0604020202020204" pitchFamily="34" charset="0"/>
+              </a:rPr>
+              <a:t>T</a:t>
+            </a:r>
+            <a:r>
+              <a:rPr lang="en-US" sz="2400" dirty="0">
                 <a:effectLst/>
                 <a:latin typeface="Calibri" panose="020F0502020204030204" pitchFamily="34" charset="0"/>
                 <a:ea typeface="Calibri" panose="020F0502020204030204" pitchFamily="34" charset="0"/>
                 <a:cs typeface="Arial" panose="020B0604020202020204" pitchFamily="34" charset="0"/>
               </a:rPr>
-              <a:t>The fact that the sequencer and the sequence are connected in this block, instead of the agent block or the sequence block, is because by specifying in the test class which sequence</a:t>
-            </a:r>
-            <a:r>
-              <a:rPr lang="en-US" sz="1800" dirty="0">
+              <a:t>he sequencer and the sequence are connected in this block, instead of the agent block or the sequence block</a:t>
+            </a:r>
+            <a:r>
+              <a:rPr lang="en-US" sz="2400" dirty="0">
+                <a:latin typeface="Calibri" panose="020F0502020204030204" pitchFamily="34" charset="0"/>
+                <a:ea typeface="Calibri" panose="020F0502020204030204" pitchFamily="34" charset="0"/>
+                <a:cs typeface="Arial" panose="020B0604020202020204" pitchFamily="34" charset="0"/>
+              </a:rPr>
+              <a:t> </a:t>
+            </a:r>
+            <a:r>
+              <a:rPr lang="en-US" sz="2400" dirty="0">
+                <a:effectLst/>
+                <a:latin typeface="Calibri" panose="020F0502020204030204" pitchFamily="34" charset="0"/>
+                <a:ea typeface="Calibri" panose="020F0502020204030204" pitchFamily="34" charset="0"/>
+                <a:cs typeface="Arial" panose="020B0604020202020204" pitchFamily="34" charset="0"/>
+              </a:rPr>
+              <a:t>because by specifying in the test class which sequence</a:t>
+            </a:r>
+            <a:r>
+              <a:rPr lang="en-US" sz="2400" dirty="0">
                 <a:solidFill>
                   <a:srgbClr val="FF0000"/>
                 </a:solidFill>
@@ -5058,7 +6933,7 @@
               <a:t> </a:t>
             </a:r>
             <a:r>
-              <a:rPr lang="en-US" sz="1800" dirty="0">
+              <a:rPr lang="en-US" sz="2400" dirty="0">
                 <a:effectLst/>
                 <a:latin typeface="Calibri" panose="020F0502020204030204" pitchFamily="34" charset="0"/>
                 <a:ea typeface="Calibri" panose="020F0502020204030204" pitchFamily="34" charset="0"/>
@@ -5068,7 +6943,7 @@
             </a:r>
           </a:p>
           <a:p>
-            <a:endParaRPr lang="en-US" dirty="0"/>
+            <a:endParaRPr lang="en-US" sz="3600" dirty="0"/>
           </a:p>
         </p:txBody>
       </p:sp>
@@ -5422,7 +7297,7 @@
           <p:nvPr/>
         </p:nvPicPr>
         <p:blipFill>
-          <a:blip r:embed="rId2"/>
+          <a:blip r:embed="rId3"/>
           <a:stretch>
             <a:fillRect/>
           </a:stretch>
@@ -5495,8 +7370,8 @@
           </a:p>
         </p:txBody>
       </p:sp>
-      <mc:AlternateContent xmlns:mc="http://schemas.openxmlformats.org/markup-compatibility/2006" xmlns:a14="http://schemas.microsoft.com/office/drawing/2010/main">
-        <mc:Choice Requires="a14">
+      <mc:AlternateContent xmlns:mc="http://schemas.openxmlformats.org/markup-compatibility/2006">
+        <mc:Choice xmlns:a14="http://schemas.microsoft.com/office/drawing/2010/main" Requires="a14">
           <p:sp>
             <p:nvSpPr>
               <p:cNvPr id="3" name="Content Placeholder 2">
@@ -5515,7 +7390,9 @@
             </p:nvSpPr>
             <p:spPr/>
             <p:txBody>
-              <a:bodyPr/>
+              <a:bodyPr>
+                <a:normAutofit lnSpcReduction="10000"/>
+              </a:bodyPr>
               <a:lstStyle/>
               <a:p>
                 <a:pPr marL="0" marR="0">
@@ -5530,34 +7407,13 @@
                   </a:spcAft>
                 </a:pPr>
                 <a:r>
-                  <a:rPr lang="en-US" sz="1800" dirty="0">
+                  <a:rPr lang="en-US" sz="2000" dirty="0">
                     <a:effectLst/>
                     <a:latin typeface="Calibri" panose="020F0502020204030204" pitchFamily="34" charset="0"/>
                     <a:ea typeface="Calibri" panose="020F0502020204030204" pitchFamily="34" charset="0"/>
                     <a:cs typeface="Arial" panose="020B0604020202020204" pitchFamily="34" charset="0"/>
                   </a:rPr>
-                  <a:t>Every data in the DUT is a seven-dimensional point. Every data point coordinate or centroid coordinate in the DUT is represented by fixed point representation with 13 bits: 1(the MSB) to</a:t>
-                </a:r>
-                <a:r>
-                  <a:rPr lang="en-US" sz="1800" dirty="0">
-                    <a:solidFill>
-                      <a:srgbClr val="FF0000"/>
-                    </a:solidFill>
-                    <a:effectLst/>
-                    <a:latin typeface="Calibri" panose="020F0502020204030204" pitchFamily="34" charset="0"/>
-                    <a:ea typeface="Calibri" panose="020F0502020204030204" pitchFamily="34" charset="0"/>
-                    <a:cs typeface="Arial" panose="020B0604020202020204" pitchFamily="34" charset="0"/>
-                  </a:rPr>
-                  <a:t> </a:t>
-                </a:r>
-                <a:r>
-                  <a:rPr lang="en-US" sz="1800" dirty="0">
-                    <a:effectLst/>
-                    <a:latin typeface="Calibri" panose="020F0502020204030204" pitchFamily="34" charset="0"/>
-                    <a:ea typeface="Calibri" panose="020F0502020204030204" pitchFamily="34" charset="0"/>
-                    <a:cs typeface="Arial" panose="020B0604020202020204" pitchFamily="34" charset="0"/>
-                  </a:rPr>
-                  <a:t>represent the sign of the number(in two’s complement convention),2 for the integral part of the number and 10 for the fractional part of the number. Therefore, every data coordinate a dynamic range of [-3.999,3.999]</a:t>
+                  <a:t>Every data in the DUT is a seven-dimensional point.</a:t>
                 </a:r>
               </a:p>
               <a:p>
@@ -5573,13 +7429,79 @@
                   </a:spcAft>
                 </a:pPr>
                 <a:r>
-                  <a:rPr lang="en-US" sz="1800" dirty="0">
+                  <a:rPr lang="en-US" sz="2000" dirty="0">
                     <a:effectLst/>
                     <a:latin typeface="Calibri" panose="020F0502020204030204" pitchFamily="34" charset="0"/>
                     <a:ea typeface="Calibri" panose="020F0502020204030204" pitchFamily="34" charset="0"/>
                     <a:cs typeface="Arial" panose="020B0604020202020204" pitchFamily="34" charset="0"/>
                   </a:rPr>
-                  <a:t>The data points are stored in the DUT as matrix of 512X7, i.e.  it has maximum 512 points with 7 coordinates each, so in order to represent the accumulator’s results, in the worst case where all data points enter the same accumulator, the accumulator maximum value per coordinate will be as high as:</a:t>
+                  <a:t> Every data point coordinate or centroid coordinate in the DUT is represented by fixed point representation with 13 bits: 1(the MSB is the sign bit),2 for the integral part of the number and 10 for the fractional part of the number. </a:t>
+                </a:r>
+              </a:p>
+              <a:p>
+                <a:pPr marL="0" marR="0">
+                  <a:lnSpc>
+                    <a:spcPct val="107000"/>
+                  </a:lnSpc>
+                  <a:spcBef>
+                    <a:spcPts val="0"/>
+                  </a:spcBef>
+                  <a:spcAft>
+                    <a:spcPts val="800"/>
+                  </a:spcAft>
+                </a:pPr>
+                <a:r>
+                  <a:rPr lang="en-US" sz="2000" dirty="0">
+                    <a:effectLst/>
+                    <a:latin typeface="Calibri" panose="020F0502020204030204" pitchFamily="34" charset="0"/>
+                    <a:ea typeface="Calibri" panose="020F0502020204030204" pitchFamily="34" charset="0"/>
+                    <a:cs typeface="Arial" panose="020B0604020202020204" pitchFamily="34" charset="0"/>
+                  </a:rPr>
+                  <a:t>Therefore, every data coordinate a dynamic range of [-3.999,3.999]</a:t>
+                </a:r>
+              </a:p>
+              <a:p>
+                <a:pPr marL="0" marR="0">
+                  <a:lnSpc>
+                    <a:spcPct val="107000"/>
+                  </a:lnSpc>
+                  <a:spcBef>
+                    <a:spcPts val="0"/>
+                  </a:spcBef>
+                  <a:spcAft>
+                    <a:spcPts val="800"/>
+                  </a:spcAft>
+                </a:pPr>
+                <a:r>
+                  <a:rPr lang="en-US" sz="2000" dirty="0">
+                    <a:effectLst/>
+                    <a:latin typeface="Calibri" panose="020F0502020204030204" pitchFamily="34" charset="0"/>
+                    <a:ea typeface="Calibri" panose="020F0502020204030204" pitchFamily="34" charset="0"/>
+                    <a:cs typeface="Arial" panose="020B0604020202020204" pitchFamily="34" charset="0"/>
+                  </a:rPr>
+                  <a:t>The data points are stored in the DUT as matrix of 512X7</a:t>
+                </a:r>
+              </a:p>
+              <a:p>
+                <a:pPr marL="0" marR="0">
+                  <a:lnSpc>
+                    <a:spcPct val="107000"/>
+                  </a:lnSpc>
+                  <a:spcBef>
+                    <a:spcPts val="0"/>
+                  </a:spcBef>
+                  <a:spcAft>
+                    <a:spcPts val="800"/>
+                  </a:spcAft>
+                </a:pPr>
+                <a:r>
+                  <a:rPr lang="en-US" sz="2000" dirty="0">
+                    <a:effectLst/>
+                    <a:latin typeface="Calibri" panose="020F0502020204030204" pitchFamily="34" charset="0"/>
+                    <a:ea typeface="Calibri" panose="020F0502020204030204" pitchFamily="34" charset="0"/>
+                    <a:cs typeface="Arial" panose="020B0604020202020204" pitchFamily="34" charset="0"/>
+                  </a:rPr>
+                  <a:t>In the worst case where all data points enter the same accumulator, the accumulator maximum value per coordinate will be as high as:</a:t>
                 </a:r>
               </a:p>
               <a:p>
@@ -5598,7 +7520,7 @@
                 <a14:m>
                   <m:oMath xmlns:m="http://schemas.openxmlformats.org/officeDocument/2006/math">
                     <m:r>
-                      <a:rPr lang="en-US" sz="1800" i="1">
+                      <a:rPr lang="en-US" sz="2000" i="1">
                         <a:effectLst/>
                         <a:latin typeface="Cambria Math" panose="02040503050406030204" pitchFamily="18" charset="0"/>
                         <a:ea typeface="Calibri" panose="020F0502020204030204" pitchFamily="34" charset="0"/>
@@ -5607,7 +7529,7 @@
                       <m:t>3</m:t>
                     </m:r>
                     <m:r>
-                      <a:rPr lang="en-US" sz="1800" i="1">
+                      <a:rPr lang="en-US" sz="2000" i="1">
                         <a:effectLst/>
                         <a:latin typeface="Cambria Math" panose="02040503050406030204" pitchFamily="18" charset="0"/>
                         <a:ea typeface="Calibri" panose="020F0502020204030204" pitchFamily="34" charset="0"/>
@@ -5616,7 +7538,7 @@
                       <m:t>.</m:t>
                     </m:r>
                     <m:r>
-                      <a:rPr lang="en-US" sz="1800" i="1">
+                      <a:rPr lang="en-US" sz="2000" i="1">
                         <a:effectLst/>
                         <a:latin typeface="Cambria Math" panose="02040503050406030204" pitchFamily="18" charset="0"/>
                         <a:ea typeface="Calibri" panose="020F0502020204030204" pitchFamily="34" charset="0"/>
@@ -5625,7 +7547,7 @@
                       <m:t>999</m:t>
                     </m:r>
                     <m:r>
-                      <a:rPr lang="en-US" sz="1800" i="1">
+                      <a:rPr lang="en-US" sz="2000" i="1">
                         <a:effectLst/>
                         <a:latin typeface="Cambria Math" panose="02040503050406030204" pitchFamily="18" charset="0"/>
                         <a:ea typeface="Calibri" panose="020F0502020204030204" pitchFamily="34" charset="0"/>
@@ -5634,7 +7556,7 @@
                       <m:t>∗</m:t>
                     </m:r>
                     <m:r>
-                      <a:rPr lang="en-US" sz="1800" i="1">
+                      <a:rPr lang="en-US" sz="2000" i="1">
                         <a:effectLst/>
                         <a:latin typeface="Cambria Math" panose="02040503050406030204" pitchFamily="18" charset="0"/>
                         <a:ea typeface="Calibri" panose="020F0502020204030204" pitchFamily="34" charset="0"/>
@@ -5643,7 +7565,7 @@
                       <m:t>512</m:t>
                     </m:r>
                     <m:r>
-                      <a:rPr lang="en-US" sz="1800" i="1">
+                      <a:rPr lang="en-US" sz="2000" i="1">
                         <a:effectLst/>
                         <a:latin typeface="Cambria Math" panose="02040503050406030204" pitchFamily="18" charset="0"/>
                         <a:ea typeface="Calibri" panose="020F0502020204030204" pitchFamily="34" charset="0"/>
@@ -5652,7 +7574,7 @@
                       <m:t>=</m:t>
                     </m:r>
                     <m:r>
-                      <a:rPr lang="en-US" sz="1800" i="1">
+                      <a:rPr lang="en-US" sz="2000" i="1">
                         <a:effectLst/>
                         <a:latin typeface="Cambria Math" panose="02040503050406030204" pitchFamily="18" charset="0"/>
                         <a:ea typeface="Calibri" panose="020F0502020204030204" pitchFamily="34" charset="0"/>
@@ -5661,7 +7583,7 @@
                       <m:t>2047</m:t>
                     </m:r>
                     <m:r>
-                      <a:rPr lang="en-US" sz="1800" i="1">
+                      <a:rPr lang="en-US" sz="2000" i="1">
                         <a:effectLst/>
                         <a:latin typeface="Cambria Math" panose="02040503050406030204" pitchFamily="18" charset="0"/>
                         <a:ea typeface="Calibri" panose="020F0502020204030204" pitchFamily="34" charset="0"/>
@@ -5670,7 +7592,7 @@
                       <m:t>.</m:t>
                     </m:r>
                     <m:r>
-                      <a:rPr lang="en-US" sz="1800" i="1">
+                      <a:rPr lang="en-US" sz="2000" i="1">
                         <a:effectLst/>
                         <a:latin typeface="Cambria Math" panose="02040503050406030204" pitchFamily="18" charset="0"/>
                         <a:ea typeface="Calibri" panose="020F0502020204030204" pitchFamily="34" charset="0"/>
@@ -5681,7 +7603,7 @@
                   </m:oMath>
                 </a14:m>
                 <a:r>
-                  <a:rPr lang="en-US" sz="1800" dirty="0">
+                  <a:rPr lang="en-US" sz="2000" dirty="0">
                     <a:effectLst/>
                     <a:latin typeface="Calibri" panose="020F0502020204030204" pitchFamily="34" charset="0"/>
                     <a:ea typeface="Times New Roman" panose="02020603050405020304" pitchFamily="18" charset="0"/>
@@ -5690,7 +7612,7 @@
                   <a:t> </a:t>
                 </a:r>
                 <a:r>
-                  <a:rPr lang="en-US" sz="1800" dirty="0">
+                  <a:rPr lang="en-US" sz="2000" dirty="0">
                     <a:solidFill>
                       <a:srgbClr val="FF0000"/>
                     </a:solidFill>
@@ -5701,7 +7623,7 @@
                   </a:rPr>
                   <a:t> </a:t>
                 </a:r>
-                <a:endParaRPr lang="en-US" sz="1800" dirty="0">
+                <a:endParaRPr lang="en-US" sz="2000" dirty="0">
                   <a:effectLst/>
                   <a:latin typeface="Calibri" panose="020F0502020204030204" pitchFamily="34" charset="0"/>
                   <a:ea typeface="Calibri" panose="020F0502020204030204" pitchFamily="34" charset="0"/>
@@ -5721,25 +7643,25 @@
                   </a:spcAft>
                 </a:pPr>
                 <a:r>
-                  <a:rPr lang="en-US" sz="1800" dirty="0">
+                  <a:rPr lang="en-US" sz="2000" dirty="0">
                     <a:effectLst/>
                     <a:latin typeface="Calibri" panose="020F0502020204030204" pitchFamily="34" charset="0"/>
                     <a:ea typeface="Calibri" panose="020F0502020204030204" pitchFamily="34" charset="0"/>
                     <a:cs typeface="Arial" panose="020B0604020202020204" pitchFamily="34" charset="0"/>
                   </a:rPr>
-                  <a:t>In order to represent this value, 22 bits will be needed: 1(the MSB) to determine the sign of the number, 11 for integer part of the number and 10 for the fractional part of the number. </a:t>
+                  <a:t>In order to represent this value, 22 bits will be needed: 1(the MSB is a sign bit), 11 for integer part of the number and 10 for the fractional part of the number. </a:t>
                 </a:r>
               </a:p>
               <a:p>
                 <a:pPr marL="0" indent="0">
                   <a:buNone/>
                 </a:pPr>
-                <a:endParaRPr lang="en-US" dirty="0"/>
+                <a:endParaRPr lang="en-US" sz="3200" dirty="0"/>
               </a:p>
             </p:txBody>
           </p:sp>
         </mc:Choice>
-        <mc:Fallback xmlns="">
+        <mc:Fallback>
           <p:sp>
             <p:nvSpPr>
               <p:cNvPr id="3" name="Content Placeholder 2">
@@ -5760,7 +7682,7 @@
               <a:blipFill>
                 <a:blip r:embed="rId2"/>
                 <a:stretch>
-                  <a:fillRect l="-522" t="-560" r="-928"/>
+                  <a:fillRect l="-638" t="-840" r="-870"/>
                 </a:stretch>
               </a:blipFill>
             </p:spPr>
@@ -5861,37 +7783,24 @@
         </p:spPr>
         <p:txBody>
           <a:bodyPr>
-            <a:normAutofit fontScale="92500" lnSpcReduction="10000"/>
+            <a:normAutofit/>
           </a:bodyPr>
           <a:lstStyle/>
           <a:p>
             <a:r>
-              <a:rPr lang="en-US" sz="1800" dirty="0">
+              <a:rPr lang="en-US" sz="2000" dirty="0">
                 <a:effectLst/>
                 <a:latin typeface="Calibri" panose="020F0502020204030204" pitchFamily="34" charset="0"/>
                 <a:ea typeface="Calibri" panose="020F0502020204030204" pitchFamily="34" charset="0"/>
                 <a:cs typeface="Arial" panose="020B0604020202020204" pitchFamily="34" charset="0"/>
               </a:rPr>
-              <a:t>Before setting the “Go” register to 1, at least 8 data points need to be written to the IP’s RAM. The maximum Ram capacity is 512 data points, therefore, insertion of more than 512 data points may cause unexpected behavior. </a:t>
-            </a:r>
-          </a:p>
-          <a:p>
-            <a:pPr marL="0" marR="0">
-              <a:lnSpc>
-                <a:spcPct val="107000"/>
-              </a:lnSpc>
-              <a:spcBef>
-                <a:spcPts val="0"/>
-              </a:spcBef>
-              <a:spcAft>
-                <a:spcPts val="800"/>
-              </a:spcAft>
-            </a:pPr>
-            <a:r>
-              <a:rPr lang="en-US" sz="1800" dirty="0">
-                <a:effectLst/>
-                <a:latin typeface="Calibri" panose="020F0502020204030204" pitchFamily="34" charset="0"/>
-                <a:ea typeface="Calibri" panose="020F0502020204030204" pitchFamily="34" charset="0"/>
+              <a:t>Before setting the “Go” register to 1, at least 8 data points need to be written to the IP’s RAM. </a:t>
+            </a:r>
+          </a:p>
+          <a:p>
+            <a:r>
+              <a:rPr lang="en-US" sz="2000" dirty="0">
+                <a:latin typeface="Calibri" panose="020F0502020204030204" pitchFamily="34" charset="0"/>
                 <a:cs typeface="Arial" panose="020B0604020202020204" pitchFamily="34" charset="0"/>
               </a:rPr>
               <a:t>Before setting the “Go” register to 1, the following registers need to be configured (not necessarily in this order):</a:t>
@@ -5909,31 +7818,25 @@
               <a:buChar char="-"/>
             </a:pPr>
             <a:r>
-              <a:rPr lang="en-US" sz="1400" dirty="0">
-                <a:effectLst/>
-                <a:latin typeface="Calibri" panose="020F0502020204030204" pitchFamily="34" charset="0"/>
-                <a:ea typeface="Calibri" panose="020F0502020204030204" pitchFamily="34" charset="0"/>
+              <a:rPr lang="en-US" sz="2000" dirty="0">
+                <a:latin typeface="Calibri" panose="020F0502020204030204" pitchFamily="34" charset="0"/>
                 <a:cs typeface="Arial" panose="020B0604020202020204" pitchFamily="34" charset="0"/>
               </a:rPr>
               <a:t>First ram </a:t>
             </a:r>
             <a:r>
-              <a:rPr lang="en-US" sz="1400" dirty="0" err="1">
-                <a:effectLst/>
-                <a:latin typeface="Calibri" panose="020F0502020204030204" pitchFamily="34" charset="0"/>
-                <a:ea typeface="Calibri" panose="020F0502020204030204" pitchFamily="34" charset="0"/>
+              <a:rPr lang="en-US" sz="2000" dirty="0" err="1">
+                <a:latin typeface="Calibri" panose="020F0502020204030204" pitchFamily="34" charset="0"/>
                 <a:cs typeface="Arial" panose="020B0604020202020204" pitchFamily="34" charset="0"/>
               </a:rPr>
               <a:t>addr</a:t>
             </a:r>
             <a:r>
-              <a:rPr lang="en-US" sz="1400" dirty="0">
-                <a:effectLst/>
-                <a:latin typeface="Calibri" panose="020F0502020204030204" pitchFamily="34" charset="0"/>
-                <a:ea typeface="Calibri" panose="020F0502020204030204" pitchFamily="34" charset="0"/>
-                <a:cs typeface="Arial" panose="020B0604020202020204" pitchFamily="34" charset="0"/>
-              </a:rPr>
-              <a:t> – this register must be configured to the first ram address in which the user wrote data.</a:t>
+              <a:rPr lang="en-US" sz="2000" dirty="0">
+                <a:latin typeface="Calibri" panose="020F0502020204030204" pitchFamily="34" charset="0"/>
+                <a:cs typeface="Arial" panose="020B0604020202020204" pitchFamily="34" charset="0"/>
+              </a:rPr>
+              <a:t> </a:t>
             </a:r>
           </a:p>
           <a:p>
@@ -5951,117 +7854,23 @@
               <a:buChar char="-"/>
             </a:pPr>
             <a:r>
-              <a:rPr lang="en-US" sz="1400" dirty="0">
-                <a:effectLst/>
-                <a:latin typeface="Calibri" panose="020F0502020204030204" pitchFamily="34" charset="0"/>
-                <a:ea typeface="Calibri" panose="020F0502020204030204" pitchFamily="34" charset="0"/>
+              <a:rPr lang="en-US" sz="2000" dirty="0">
+                <a:latin typeface="Calibri" panose="020F0502020204030204" pitchFamily="34" charset="0"/>
                 <a:cs typeface="Arial" panose="020B0604020202020204" pitchFamily="34" charset="0"/>
               </a:rPr>
               <a:t>Last ram </a:t>
             </a:r>
             <a:r>
-              <a:rPr lang="en-US" sz="1400" dirty="0" err="1">
-                <a:effectLst/>
-                <a:latin typeface="Calibri" panose="020F0502020204030204" pitchFamily="34" charset="0"/>
-                <a:ea typeface="Calibri" panose="020F0502020204030204" pitchFamily="34" charset="0"/>
+              <a:rPr lang="en-US" sz="2000" dirty="0" err="1">
+                <a:latin typeface="Calibri" panose="020F0502020204030204" pitchFamily="34" charset="0"/>
                 <a:cs typeface="Arial" panose="020B0604020202020204" pitchFamily="34" charset="0"/>
               </a:rPr>
               <a:t>addr</a:t>
             </a:r>
-            <a:r>
-              <a:rPr lang="en-US" sz="1400" dirty="0">
-                <a:effectLst/>
-                <a:latin typeface="Calibri" panose="020F0502020204030204" pitchFamily="34" charset="0"/>
-                <a:ea typeface="Calibri" panose="020F0502020204030204" pitchFamily="34" charset="0"/>
-                <a:cs typeface="Arial" panose="020B0604020202020204" pitchFamily="34" charset="0"/>
-              </a:rPr>
-              <a:t> - this register must be configured to the last ram address in which the user wrote data.</a:t>
-            </a:r>
-          </a:p>
-          <a:p>
-            <a:pPr marL="0" marR="0" indent="0">
-              <a:lnSpc>
-                <a:spcPct val="107000"/>
-              </a:lnSpc>
-              <a:spcBef>
-                <a:spcPts val="0"/>
-              </a:spcBef>
-              <a:spcAft>
-                <a:spcPts val="800"/>
-              </a:spcAft>
-              <a:buNone/>
-            </a:pPr>
-            <a:r>
-              <a:rPr lang="en-US" sz="1800" dirty="0">
-                <a:latin typeface="Calibri" panose="020F0502020204030204" pitchFamily="34" charset="0"/>
-                <a:ea typeface="Calibri" panose="020F0502020204030204" pitchFamily="34" charset="0"/>
-                <a:cs typeface="Arial" panose="020B0604020202020204" pitchFamily="34" charset="0"/>
-              </a:rPr>
-              <a:t>	T</a:t>
-            </a:r>
-            <a:r>
-              <a:rPr lang="en-US" sz="1800" dirty="0">
-                <a:effectLst/>
-                <a:latin typeface="Calibri" panose="020F0502020204030204" pitchFamily="34" charset="0"/>
-                <a:ea typeface="Calibri" panose="020F0502020204030204" pitchFamily="34" charset="0"/>
-                <a:cs typeface="Arial" panose="020B0604020202020204" pitchFamily="34" charset="0"/>
-              </a:rPr>
-              <a:t>he maximum Ram capacity is of 512 data points, therefore the parameter “First ram </a:t>
-            </a:r>
-            <a:r>
-              <a:rPr lang="en-US" sz="1800" dirty="0" err="1">
-                <a:effectLst/>
-                <a:latin typeface="Calibri" panose="020F0502020204030204" pitchFamily="34" charset="0"/>
-                <a:ea typeface="Calibri" panose="020F0502020204030204" pitchFamily="34" charset="0"/>
-                <a:cs typeface="Arial" panose="020B0604020202020204" pitchFamily="34" charset="0"/>
-              </a:rPr>
-              <a:t>addr</a:t>
-            </a:r>
-            <a:r>
-              <a:rPr lang="en-US" sz="1800" dirty="0">
-                <a:effectLst/>
-                <a:latin typeface="Calibri" panose="020F0502020204030204" pitchFamily="34" charset="0"/>
-                <a:ea typeface="Calibri" panose="020F0502020204030204" pitchFamily="34" charset="0"/>
-                <a:cs typeface="Arial" panose="020B0604020202020204" pitchFamily="34" charset="0"/>
-              </a:rPr>
-              <a:t>” should be between 1 and 512. The parameters “Last ram </a:t>
-            </a:r>
-            <a:r>
-              <a:rPr lang="en-US" sz="1800" dirty="0" err="1">
-                <a:effectLst/>
-                <a:latin typeface="Calibri" panose="020F0502020204030204" pitchFamily="34" charset="0"/>
-                <a:ea typeface="Calibri" panose="020F0502020204030204" pitchFamily="34" charset="0"/>
-                <a:cs typeface="Arial" panose="020B0604020202020204" pitchFamily="34" charset="0"/>
-              </a:rPr>
-              <a:t>addr</a:t>
-            </a:r>
-            <a:r>
-              <a:rPr lang="en-US" sz="1800" dirty="0">
-                <a:effectLst/>
-                <a:latin typeface="Calibri" panose="020F0502020204030204" pitchFamily="34" charset="0"/>
-                <a:ea typeface="Calibri" panose="020F0502020204030204" pitchFamily="34" charset="0"/>
-                <a:cs typeface="Arial" panose="020B0604020202020204" pitchFamily="34" charset="0"/>
-              </a:rPr>
-              <a:t>” shall therefore be set to the sum of the parameter “First ram </a:t>
-            </a:r>
-            <a:r>
-              <a:rPr lang="en-US" sz="1800" dirty="0" err="1">
-                <a:effectLst/>
-                <a:latin typeface="Calibri" panose="020F0502020204030204" pitchFamily="34" charset="0"/>
-                <a:ea typeface="Calibri" panose="020F0502020204030204" pitchFamily="34" charset="0"/>
-                <a:cs typeface="Arial" panose="020B0604020202020204" pitchFamily="34" charset="0"/>
-              </a:rPr>
-              <a:t>addr</a:t>
-            </a:r>
-            <a:r>
-              <a:rPr lang="en-US" sz="1800" dirty="0">
-                <a:effectLst/>
-                <a:latin typeface="Calibri" panose="020F0502020204030204" pitchFamily="34" charset="0"/>
-                <a:ea typeface="Calibri" panose="020F0502020204030204" pitchFamily="34" charset="0"/>
-                <a:cs typeface="Arial" panose="020B0604020202020204" pitchFamily="34" charset="0"/>
-              </a:rPr>
-              <a:t>” and the number of points chosen by the user.</a:t>
-            </a:r>
+            <a:endParaRPr lang="en-US" sz="2000" dirty="0">
+              <a:latin typeface="Calibri" panose="020F0502020204030204" pitchFamily="34" charset="0"/>
+              <a:cs typeface="Arial" panose="020B0604020202020204" pitchFamily="34" charset="0"/>
+            </a:endParaRPr>
           </a:p>
           <a:p>
             <a:pPr>
@@ -6076,28 +7885,22 @@
               </a:spcAft>
             </a:pPr>
             <a:r>
-              <a:rPr lang="en-US" sz="1800" dirty="0">
-                <a:effectLst/>
-                <a:latin typeface="Calibri" panose="020F0502020204030204" pitchFamily="34" charset="0"/>
-                <a:ea typeface="Calibri" panose="020F0502020204030204" pitchFamily="34" charset="0"/>
-                <a:cs typeface="Arial" panose="020B0604020202020204" pitchFamily="34" charset="0"/>
-              </a:rPr>
-              <a:t>After performing the configurations described above, in order to instruct the DUT to start its function, the user must write the value ‘1’ to register named “</a:t>
-            </a:r>
-            <a:r>
-              <a:rPr lang="en-US" sz="1800" dirty="0" err="1">
-                <a:effectLst/>
-                <a:latin typeface="Calibri" panose="020F0502020204030204" pitchFamily="34" charset="0"/>
-                <a:ea typeface="Calibri" panose="020F0502020204030204" pitchFamily="34" charset="0"/>
+              <a:rPr lang="en-US" sz="2000" dirty="0">
+                <a:latin typeface="Calibri" panose="020F0502020204030204" pitchFamily="34" charset="0"/>
+                <a:cs typeface="Arial" panose="020B0604020202020204" pitchFamily="34" charset="0"/>
+              </a:rPr>
+              <a:t>After performing these configurations, in order to instruct the DUT to start its function, the user must write the value ‘1’ to register named “</a:t>
+            </a:r>
+            <a:r>
+              <a:rPr lang="en-US" sz="2000" dirty="0" err="1">
+                <a:latin typeface="Calibri" panose="020F0502020204030204" pitchFamily="34" charset="0"/>
                 <a:cs typeface="Arial" panose="020B0604020202020204" pitchFamily="34" charset="0"/>
               </a:rPr>
               <a:t>Go_reg</a:t>
             </a:r>
             <a:r>
-              <a:rPr lang="en-US" sz="1800" dirty="0">
-                <a:effectLst/>
-                <a:latin typeface="Calibri" panose="020F0502020204030204" pitchFamily="34" charset="0"/>
-                <a:ea typeface="Calibri" panose="020F0502020204030204" pitchFamily="34" charset="0"/>
+              <a:rPr lang="en-US" sz="2000" dirty="0">
+                <a:latin typeface="Calibri" panose="020F0502020204030204" pitchFamily="34" charset="0"/>
                 <a:cs typeface="Arial" panose="020B0604020202020204" pitchFamily="34" charset="0"/>
               </a:rPr>
               <a:t>”.</a:t>
@@ -6116,49 +7919,39 @@
               </a:spcAft>
             </a:pPr>
             <a:r>
-              <a:rPr lang="en-US" sz="1800" dirty="0">
-                <a:effectLst/>
-                <a:latin typeface="Calibri" panose="020F0502020204030204" pitchFamily="34" charset="0"/>
-                <a:ea typeface="Calibri" panose="020F0502020204030204" pitchFamily="34" charset="0"/>
-                <a:cs typeface="Arial" panose="020B0604020202020204" pitchFamily="34" charset="0"/>
-              </a:rPr>
-              <a:t>The centroid initial values can be configured by writing these values to registers “</a:t>
-            </a:r>
-            <a:r>
-              <a:rPr lang="en-US" sz="1800" dirty="0" err="1">
-                <a:effectLst/>
-                <a:latin typeface="Calibri" panose="020F0502020204030204" pitchFamily="34" charset="0"/>
-                <a:ea typeface="Calibri" panose="020F0502020204030204" pitchFamily="34" charset="0"/>
+              <a:rPr lang="en-US" sz="2000" dirty="0">
+                <a:latin typeface="Calibri" panose="020F0502020204030204" pitchFamily="34" charset="0"/>
+                <a:cs typeface="Arial" panose="020B0604020202020204" pitchFamily="34" charset="0"/>
+              </a:rPr>
+              <a:t>The default value for all centroid initial is </a:t>
+            </a:r>
+            <a:r>
+              <a:rPr lang="en-US" sz="2000" dirty="0" err="1">
+                <a:latin typeface="Calibri" panose="020F0502020204030204" pitchFamily="34" charset="0"/>
+                <a:cs typeface="Arial" panose="020B0604020202020204" pitchFamily="34" charset="0"/>
+              </a:rPr>
+              <a:t>zero.The</a:t>
+            </a:r>
+            <a:r>
+              <a:rPr lang="en-US" sz="2000" dirty="0">
+                <a:latin typeface="Calibri" panose="020F0502020204030204" pitchFamily="34" charset="0"/>
+                <a:cs typeface="Arial" panose="020B0604020202020204" pitchFamily="34" charset="0"/>
+              </a:rPr>
+              <a:t> centroid initial values can be configured by writing these values to registers “</a:t>
+            </a:r>
+            <a:r>
+              <a:rPr lang="en-US" sz="2000" dirty="0" err="1">
+                <a:latin typeface="Calibri" panose="020F0502020204030204" pitchFamily="34" charset="0"/>
                 <a:cs typeface="Arial" panose="020B0604020202020204" pitchFamily="34" charset="0"/>
               </a:rPr>
               <a:t>Cent_X_reg</a:t>
             </a:r>
             <a:r>
-              <a:rPr lang="en-US" sz="1800" dirty="0">
-                <a:effectLst/>
-                <a:latin typeface="Calibri" panose="020F0502020204030204" pitchFamily="34" charset="0"/>
-                <a:ea typeface="Calibri" panose="020F0502020204030204" pitchFamily="34" charset="0"/>
-                <a:cs typeface="Arial" panose="020B0604020202020204" pitchFamily="34" charset="0"/>
-              </a:rPr>
-              <a:t>”(X is an integer between 1 and 8),before the “</a:t>
-            </a:r>
-            <a:r>
-              <a:rPr lang="en-US" sz="1800" dirty="0" err="1">
-                <a:effectLst/>
-                <a:latin typeface="Calibri" panose="020F0502020204030204" pitchFamily="34" charset="0"/>
-                <a:ea typeface="Calibri" panose="020F0502020204030204" pitchFamily="34" charset="0"/>
-                <a:cs typeface="Arial" panose="020B0604020202020204" pitchFamily="34" charset="0"/>
-              </a:rPr>
-              <a:t>Go_reg</a:t>
-            </a:r>
-            <a:r>
-              <a:rPr lang="en-US" sz="1800" dirty="0">
-                <a:effectLst/>
-                <a:latin typeface="Calibri" panose="020F0502020204030204" pitchFamily="34" charset="0"/>
-                <a:ea typeface="Calibri" panose="020F0502020204030204" pitchFamily="34" charset="0"/>
-                <a:cs typeface="Arial" panose="020B0604020202020204" pitchFamily="34" charset="0"/>
-              </a:rPr>
-              <a:t>” is configured to ‘1’. In case these registers are not configured, all centroid initial values will be set to zero.</a:t>
+              <a:rPr lang="en-US" sz="2000" dirty="0">
+                <a:latin typeface="Calibri" panose="020F0502020204030204" pitchFamily="34" charset="0"/>
+                <a:cs typeface="Arial" panose="020B0604020202020204" pitchFamily="34" charset="0"/>
+              </a:rPr>
+              <a:t>”(X is an integer between 1 and 8).</a:t>
             </a:r>
           </a:p>
           <a:p>
@@ -6174,14 +7967,18 @@
               </a:spcAft>
             </a:pPr>
             <a:r>
-              <a:rPr lang="en-US" sz="1800" dirty="0">
-                <a:effectLst/>
-                <a:latin typeface="Calibri" panose="020F0502020204030204" pitchFamily="34" charset="0"/>
-                <a:ea typeface="Calibri" panose="020F0502020204030204" pitchFamily="34" charset="0"/>
-                <a:cs typeface="Arial" panose="020B0604020202020204" pitchFamily="34" charset="0"/>
-              </a:rPr>
-              <a:t>The threshold value used for convergence check of the algorithm may be configured by user. It can be configured by writing the desired threshold value to register “Thresh hold”. In case this register is not configured, the threshold value will be set to zero.</a:t>
-            </a:r>
+              <a:rPr lang="en-US" sz="2000" dirty="0">
+                <a:latin typeface="Calibri" panose="020F0502020204030204" pitchFamily="34" charset="0"/>
+                <a:cs typeface="Arial" panose="020B0604020202020204" pitchFamily="34" charset="0"/>
+              </a:rPr>
+              <a:t>The threshold value used for convergence check of the algorithm may be configured by user. It can be configured by writing the desired threshold value to register “Thresh hold”. The default value for threshold is zero.</a:t>
+            </a:r>
+            <a:endParaRPr lang="en-US" sz="2000" dirty="0">
+              <a:effectLst/>
+              <a:latin typeface="Calibri" panose="020F0502020204030204" pitchFamily="34" charset="0"/>
+              <a:ea typeface="Calibri" panose="020F0502020204030204" pitchFamily="34" charset="0"/>
+              <a:cs typeface="Arial" panose="020B0604020202020204" pitchFamily="34" charset="0"/>
+            </a:endParaRPr>
           </a:p>
           <a:p>
             <a:pPr>
@@ -6195,7 +7992,7 @@
                 <a:spcPts val="800"/>
               </a:spcAft>
             </a:pPr>
-            <a:endParaRPr lang="en-US" sz="1800" dirty="0">
+            <a:endParaRPr lang="en-US" sz="2000" dirty="0">
               <a:effectLst/>
               <a:latin typeface="Calibri" panose="020F0502020204030204" pitchFamily="34" charset="0"/>
               <a:ea typeface="Calibri" panose="020F0502020204030204" pitchFamily="34" charset="0"/>
@@ -6203,26 +8000,7 @@
             </a:endParaRPr>
           </a:p>
           <a:p>
-            <a:pPr>
-              <a:lnSpc>
-                <a:spcPct val="107000"/>
-              </a:lnSpc>
-              <a:spcBef>
-                <a:spcPts val="0"/>
-              </a:spcBef>
-              <a:spcAft>
-                <a:spcPts val="800"/>
-              </a:spcAft>
-            </a:pPr>
-            <a:endParaRPr lang="en-US" sz="1800" dirty="0">
-              <a:effectLst/>
-              <a:latin typeface="Calibri" panose="020F0502020204030204" pitchFamily="34" charset="0"/>
-              <a:ea typeface="Calibri" panose="020F0502020204030204" pitchFamily="34" charset="0"/>
-              <a:cs typeface="Arial" panose="020B0604020202020204" pitchFamily="34" charset="0"/>
-            </a:endParaRPr>
-          </a:p>
-          <a:p>
-            <a:endParaRPr lang="en-US" dirty="0"/>
+            <a:endParaRPr lang="en-US" sz="3200" dirty="0"/>
           </a:p>
         </p:txBody>
       </p:sp>
@@ -6302,13 +8080,13 @@
         </p:nvSpPr>
         <p:spPr>
           <a:xfrm>
-            <a:off x="838200" y="1825625"/>
-            <a:ext cx="3607191" cy="4351338"/>
+            <a:off x="838201" y="1825625"/>
+            <a:ext cx="2891118" cy="4351338"/>
           </a:xfrm>
         </p:spPr>
         <p:txBody>
           <a:bodyPr>
-            <a:normAutofit lnSpcReduction="10000"/>
+            <a:normAutofit fontScale="92500" lnSpcReduction="20000"/>
           </a:bodyPr>
           <a:lstStyle/>
           <a:p>
@@ -6345,14 +8123,14 @@
           <p:nvPr>
             <p:extLst>
               <p:ext uri="{D42A27DB-BD31-4B8C-83A1-F6EECF244321}">
-                <p14:modId xmlns:p14="http://schemas.microsoft.com/office/powerpoint/2010/main" val="2769711633"/>
+                <p14:modId xmlns:p14="http://schemas.microsoft.com/office/powerpoint/2010/main" val="597712246"/>
               </p:ext>
             </p:extLst>
           </p:nvPr>
         </p:nvGraphicFramePr>
         <p:xfrm>
-          <a:off x="5190978" y="1825626"/>
-          <a:ext cx="6079261" cy="4667251"/>
+          <a:off x="4034119" y="1502896"/>
+          <a:ext cx="7319682" cy="4854976"/>
         </p:xfrm>
         <a:graphic>
           <a:graphicData uri="http://schemas.openxmlformats.org/drawingml/2006/table">
@@ -6361,28 +8139,28 @@
                 <a:tableStyleId>{5C22544A-7EE6-4342-B048-85BDC9FD1C3A}</a:tableStyleId>
               </a:tblPr>
               <a:tblGrid>
-                <a:gridCol w="1233463">
+                <a:gridCol w="1485141">
                   <a:extLst>
                     <a:ext uri="{9D8B030D-6E8A-4147-A177-3AD203B41FA5}">
                       <a16:colId xmlns:a16="http://schemas.microsoft.com/office/drawing/2014/main" val="1817440064"/>
                     </a:ext>
                   </a:extLst>
                 </a:gridCol>
-                <a:gridCol w="1287000">
+                <a:gridCol w="1549601">
                   <a:extLst>
                     <a:ext uri="{9D8B030D-6E8A-4147-A177-3AD203B41FA5}">
                       <a16:colId xmlns:a16="http://schemas.microsoft.com/office/drawing/2014/main" val="3257503677"/>
                     </a:ext>
                   </a:extLst>
                 </a:gridCol>
-                <a:gridCol w="1737838">
+                <a:gridCol w="2092429">
                   <a:extLst>
                     <a:ext uri="{9D8B030D-6E8A-4147-A177-3AD203B41FA5}">
                       <a16:colId xmlns:a16="http://schemas.microsoft.com/office/drawing/2014/main" val="1196645758"/>
                     </a:ext>
                   </a:extLst>
                 </a:gridCol>
-                <a:gridCol w="1820960">
+                <a:gridCol w="2192511">
                   <a:extLst>
                     <a:ext uri="{9D8B030D-6E8A-4147-A177-3AD203B41FA5}">
                       <a16:colId xmlns:a16="http://schemas.microsoft.com/office/drawing/2014/main" val="1244982531"/>
@@ -6408,12 +8186,12 @@
                         </a:spcAft>
                       </a:pPr>
                       <a:r>
-                        <a:rPr lang="en-US" sz="1000">
+                        <a:rPr lang="en-US" sz="1400">
                           <a:effectLst/>
                         </a:rPr>
                         <a:t>Variable name</a:t>
                       </a:r>
-                      <a:endParaRPr lang="en-US" sz="1000">
+                      <a:endParaRPr lang="en-US" sz="1400">
                         <a:effectLst/>
                         <a:latin typeface="Calibri" panose="020F0502020204030204" pitchFamily="34" charset="0"/>
                         <a:ea typeface="Calibri" panose="020F0502020204030204" pitchFamily="34" charset="0"/>
@@ -6440,12 +8218,12 @@
                         </a:spcAft>
                       </a:pPr>
                       <a:r>
-                        <a:rPr lang="en-US" sz="1000">
+                        <a:rPr lang="en-US" sz="1400">
                           <a:effectLst/>
                         </a:rPr>
                         <a:t>Type</a:t>
                       </a:r>
-                      <a:endParaRPr lang="en-US" sz="1000">
+                      <a:endParaRPr lang="en-US" sz="1400">
                         <a:effectLst/>
                         <a:latin typeface="Calibri" panose="020F0502020204030204" pitchFamily="34" charset="0"/>
                         <a:ea typeface="Calibri" panose="020F0502020204030204" pitchFamily="34" charset="0"/>
@@ -6472,12 +8250,12 @@
                         </a:spcAft>
                       </a:pPr>
                       <a:r>
-                        <a:rPr lang="en-US" sz="1000">
+                        <a:rPr lang="en-US" sz="1400">
                           <a:effectLst/>
                         </a:rPr>
                         <a:t>Constrain</a:t>
                       </a:r>
-                      <a:endParaRPr lang="en-US" sz="1000">
+                      <a:endParaRPr lang="en-US" sz="1400">
                         <a:effectLst/>
                         <a:latin typeface="Calibri" panose="020F0502020204030204" pitchFamily="34" charset="0"/>
                         <a:ea typeface="Calibri" panose="020F0502020204030204" pitchFamily="34" charset="0"/>
@@ -6504,12 +8282,12 @@
                         </a:spcAft>
                       </a:pPr>
                       <a:r>
-                        <a:rPr lang="en-US" sz="1000">
+                        <a:rPr lang="en-US" sz="1400">
                           <a:effectLst/>
                         </a:rPr>
                         <a:t>Purpose</a:t>
                       </a:r>
-                      <a:endParaRPr lang="en-US" sz="1000">
+                      <a:endParaRPr lang="en-US" sz="1400">
                         <a:effectLst/>
                         <a:latin typeface="Calibri" panose="020F0502020204030204" pitchFamily="34" charset="0"/>
                         <a:ea typeface="Calibri" panose="020F0502020204030204" pitchFamily="34" charset="0"/>
@@ -6543,12 +8321,12 @@
                         </a:spcAft>
                       </a:pPr>
                       <a:r>
-                        <a:rPr lang="en-US" sz="1000">
+                        <a:rPr lang="en-US" sz="1400">
                           <a:effectLst/>
                         </a:rPr>
                         <a:t>Centroids</a:t>
                       </a:r>
-                      <a:endParaRPr lang="en-US" sz="1000">
+                      <a:endParaRPr lang="en-US" sz="1400">
                         <a:effectLst/>
                         <a:latin typeface="Calibri" panose="020F0502020204030204" pitchFamily="34" charset="0"/>
                         <a:ea typeface="Calibri" panose="020F0502020204030204" pitchFamily="34" charset="0"/>
@@ -6575,12 +8353,12 @@
                         </a:spcAft>
                       </a:pPr>
                       <a:r>
-                        <a:rPr lang="en-US" sz="1000">
+                        <a:rPr lang="en-US" sz="1400">
                           <a:effectLst/>
                         </a:rPr>
                         <a:t>Rand logic [8][91]</a:t>
                       </a:r>
-                      <a:endParaRPr lang="en-US" sz="1000">
+                      <a:endParaRPr lang="en-US" sz="1400">
                         <a:effectLst/>
                         <a:latin typeface="Calibri" panose="020F0502020204030204" pitchFamily="34" charset="0"/>
                         <a:ea typeface="Calibri" panose="020F0502020204030204" pitchFamily="34" charset="0"/>
@@ -6607,12 +8385,12 @@
                         </a:spcAft>
                       </a:pPr>
                       <a:r>
-                        <a:rPr lang="en-US" sz="1000">
+                        <a:rPr lang="en-US" sz="1400">
                           <a:effectLst/>
                         </a:rPr>
                         <a:t> </a:t>
                       </a:r>
-                      <a:endParaRPr lang="en-US" sz="1000">
+                      <a:endParaRPr lang="en-US" sz="1400">
                         <a:effectLst/>
                         <a:latin typeface="Calibri" panose="020F0502020204030204" pitchFamily="34" charset="0"/>
                         <a:ea typeface="Calibri" panose="020F0502020204030204" pitchFamily="34" charset="0"/>
@@ -6639,12 +8417,12 @@
                         </a:spcAft>
                       </a:pPr>
                       <a:r>
-                        <a:rPr lang="en-US" sz="1000">
+                        <a:rPr lang="en-US" sz="1400">
                           <a:effectLst/>
                         </a:rPr>
                         <a:t>Used to randomly generate initial centroid values for DUT and ref model</a:t>
                       </a:r>
-                      <a:endParaRPr lang="en-US" sz="1000">
+                      <a:endParaRPr lang="en-US" sz="1400">
                         <a:effectLst/>
                         <a:latin typeface="Calibri" panose="020F0502020204030204" pitchFamily="34" charset="0"/>
                         <a:ea typeface="Calibri" panose="020F0502020204030204" pitchFamily="34" charset="0"/>
@@ -6678,12 +8456,12 @@
                         </a:spcAft>
                       </a:pPr>
                       <a:r>
-                        <a:rPr lang="en-US" sz="1000">
+                        <a:rPr lang="en-US" sz="1400">
                           <a:effectLst/>
                         </a:rPr>
                         <a:t>Num_points</a:t>
                       </a:r>
-                      <a:endParaRPr lang="en-US" sz="1000">
+                      <a:endParaRPr lang="en-US" sz="1400">
                         <a:effectLst/>
                         <a:latin typeface="Calibri" panose="020F0502020204030204" pitchFamily="34" charset="0"/>
                         <a:ea typeface="Calibri" panose="020F0502020204030204" pitchFamily="34" charset="0"/>
@@ -6710,12 +8488,12 @@
                         </a:spcAft>
                       </a:pPr>
                       <a:r>
-                        <a:rPr lang="en-US" sz="1000">
+                        <a:rPr lang="en-US" sz="1400">
                           <a:effectLst/>
                         </a:rPr>
                         <a:t>Rand int</a:t>
                       </a:r>
-                      <a:endParaRPr lang="en-US" sz="1000">
+                      <a:endParaRPr lang="en-US" sz="1400">
                         <a:effectLst/>
                         <a:latin typeface="Calibri" panose="020F0502020204030204" pitchFamily="34" charset="0"/>
                         <a:ea typeface="Calibri" panose="020F0502020204030204" pitchFamily="34" charset="0"/>
@@ -6742,12 +8520,12 @@
                         </a:spcAft>
                       </a:pPr>
                       <a:r>
-                        <a:rPr lang="en-US" sz="1000">
+                        <a:rPr lang="en-US" sz="1400">
                           <a:effectLst/>
                         </a:rPr>
                         <a:t>8&lt;num_points&lt;512</a:t>
                       </a:r>
-                      <a:endParaRPr lang="en-US" sz="1000">
+                      <a:endParaRPr lang="en-US" sz="1400">
                         <a:effectLst/>
                         <a:latin typeface="Calibri" panose="020F0502020204030204" pitchFamily="34" charset="0"/>
                         <a:ea typeface="Calibri" panose="020F0502020204030204" pitchFamily="34" charset="0"/>
@@ -6774,12 +8552,12 @@
                         </a:spcAft>
                       </a:pPr>
                       <a:r>
-                        <a:rPr lang="en-US" sz="1000">
+                        <a:rPr lang="en-US" sz="1400" dirty="0">
                           <a:effectLst/>
                         </a:rPr>
                         <a:t>Used to randomly generate the number of points used as input points on the DUT and on the ref Model</a:t>
                       </a:r>
-                      <a:endParaRPr lang="en-US" sz="1000">
+                      <a:endParaRPr lang="en-US" sz="1400" dirty="0">
                         <a:effectLst/>
                         <a:latin typeface="Calibri" panose="020F0502020204030204" pitchFamily="34" charset="0"/>
                         <a:ea typeface="Calibri" panose="020F0502020204030204" pitchFamily="34" charset="0"/>
@@ -6813,12 +8591,12 @@
                         </a:spcAft>
                       </a:pPr>
                       <a:r>
-                        <a:rPr lang="en-US" sz="1000">
+                        <a:rPr lang="en-US" sz="1400" dirty="0">
                           <a:effectLst/>
                         </a:rPr>
                         <a:t>Data_points</a:t>
                       </a:r>
-                      <a:endParaRPr lang="en-US" sz="1000">
+                      <a:endParaRPr lang="en-US" sz="1400" dirty="0">
                         <a:effectLst/>
                         <a:latin typeface="Calibri" panose="020F0502020204030204" pitchFamily="34" charset="0"/>
                         <a:ea typeface="Calibri" panose="020F0502020204030204" pitchFamily="34" charset="0"/>
@@ -6845,12 +8623,12 @@
                         </a:spcAft>
                       </a:pPr>
                       <a:r>
-                        <a:rPr lang="en-US" sz="1000">
+                        <a:rPr lang="en-US" sz="1400" dirty="0">
                           <a:effectLst/>
                         </a:rPr>
                         <a:t>rand logic [512][91]</a:t>
                       </a:r>
-                      <a:endParaRPr lang="en-US" sz="1000">
+                      <a:endParaRPr lang="en-US" sz="1400" dirty="0">
                         <a:effectLst/>
                         <a:latin typeface="Calibri" panose="020F0502020204030204" pitchFamily="34" charset="0"/>
                         <a:ea typeface="Calibri" panose="020F0502020204030204" pitchFamily="34" charset="0"/>
@@ -6877,12 +8655,12 @@
                         </a:spcAft>
                       </a:pPr>
                       <a:r>
-                        <a:rPr lang="en-US" sz="1000" dirty="0">
+                        <a:rPr lang="en-US" sz="1400" dirty="0">
                           <a:effectLst/>
                         </a:rPr>
                         <a:t> </a:t>
                       </a:r>
-                      <a:endParaRPr lang="en-US" sz="1000" dirty="0">
+                      <a:endParaRPr lang="en-US" sz="1400" dirty="0">
                         <a:effectLst/>
                         <a:latin typeface="Calibri" panose="020F0502020204030204" pitchFamily="34" charset="0"/>
                         <a:ea typeface="Calibri" panose="020F0502020204030204" pitchFamily="34" charset="0"/>
@@ -6909,12 +8687,12 @@
                         </a:spcAft>
                       </a:pPr>
                       <a:r>
-                        <a:rPr lang="en-US" sz="1000">
+                        <a:rPr lang="en-US" sz="1400">
                           <a:effectLst/>
                         </a:rPr>
                         <a:t>Used to randomly generate data points values for DUT and ref model</a:t>
                       </a:r>
-                      <a:endParaRPr lang="en-US" sz="1000">
+                      <a:endParaRPr lang="en-US" sz="1400">
                         <a:effectLst/>
                         <a:latin typeface="Calibri" panose="020F0502020204030204" pitchFamily="34" charset="0"/>
                         <a:ea typeface="Calibri" panose="020F0502020204030204" pitchFamily="34" charset="0"/>
@@ -6948,12 +8726,12 @@
                         </a:spcAft>
                       </a:pPr>
                       <a:r>
-                        <a:rPr lang="en-US" sz="1000">
+                        <a:rPr lang="en-US" sz="1400">
                           <a:effectLst/>
                         </a:rPr>
                         <a:t>Threshold</a:t>
                       </a:r>
-                      <a:endParaRPr lang="en-US" sz="1000">
+                      <a:endParaRPr lang="en-US" sz="1400">
                         <a:effectLst/>
                         <a:latin typeface="Calibri" panose="020F0502020204030204" pitchFamily="34" charset="0"/>
                         <a:ea typeface="Calibri" panose="020F0502020204030204" pitchFamily="34" charset="0"/>
@@ -6980,12 +8758,12 @@
                         </a:spcAft>
                       </a:pPr>
                       <a:r>
-                        <a:rPr lang="en-US" sz="1000">
+                        <a:rPr lang="en-US" sz="1400">
                           <a:effectLst/>
                         </a:rPr>
                         <a:t>rand logic [12:0]</a:t>
                       </a:r>
-                      <a:endParaRPr lang="en-US" sz="1000">
+                      <a:endParaRPr lang="en-US" sz="1400">
                         <a:effectLst/>
                         <a:latin typeface="Calibri" panose="020F0502020204030204" pitchFamily="34" charset="0"/>
                         <a:ea typeface="Calibri" panose="020F0502020204030204" pitchFamily="34" charset="0"/>
@@ -7012,7 +8790,7 @@
                         </a:spcAft>
                       </a:pPr>
                       <a:r>
-                        <a:rPr lang="en-US" sz="1000">
+                        <a:rPr lang="en-US" sz="1400">
                           <a:effectLst/>
                         </a:rPr>
                         <a:t>threshold[12:8] == 5'd0</a:t>
@@ -7031,12 +8809,12 @@
                         </a:spcAft>
                       </a:pPr>
                       <a:r>
-                        <a:rPr lang="en-US" sz="1000">
+                        <a:rPr lang="en-US" sz="1400">
                           <a:effectLst/>
                         </a:rPr>
                         <a:t>(so the threshold is small)</a:t>
                       </a:r>
-                      <a:endParaRPr lang="en-US" sz="1000">
+                      <a:endParaRPr lang="en-US" sz="1400">
                         <a:effectLst/>
                         <a:latin typeface="Calibri" panose="020F0502020204030204" pitchFamily="34" charset="0"/>
                         <a:ea typeface="Calibri" panose="020F0502020204030204" pitchFamily="34" charset="0"/>
@@ -7063,12 +8841,12 @@
                         </a:spcAft>
                       </a:pPr>
                       <a:r>
-                        <a:rPr lang="en-US" sz="1000">
+                        <a:rPr lang="en-US" sz="1400">
                           <a:effectLst/>
                         </a:rPr>
                         <a:t>Used to randomly generate threshold value for DUT and ref model</a:t>
                       </a:r>
-                      <a:endParaRPr lang="en-US" sz="1000">
+                      <a:endParaRPr lang="en-US" sz="1400">
                         <a:effectLst/>
                         <a:latin typeface="Calibri" panose="020F0502020204030204" pitchFamily="34" charset="0"/>
                         <a:ea typeface="Calibri" panose="020F0502020204030204" pitchFamily="34" charset="0"/>
@@ -7102,12 +8880,12 @@
                         </a:spcAft>
                       </a:pPr>
                       <a:r>
-                        <a:rPr lang="en-US" sz="1000">
+                        <a:rPr lang="en-US" sz="1400">
                           <a:effectLst/>
                         </a:rPr>
                         <a:t>first_point_index</a:t>
                       </a:r>
-                      <a:endParaRPr lang="en-US" sz="1000">
+                      <a:endParaRPr lang="en-US" sz="1400">
                         <a:effectLst/>
                         <a:latin typeface="Calibri" panose="020F0502020204030204" pitchFamily="34" charset="0"/>
                         <a:ea typeface="Calibri" panose="020F0502020204030204" pitchFamily="34" charset="0"/>
@@ -7134,12 +8912,12 @@
                         </a:spcAft>
                       </a:pPr>
                       <a:r>
-                        <a:rPr lang="en-US" sz="1000">
+                        <a:rPr lang="en-US" sz="1400">
                           <a:effectLst/>
                         </a:rPr>
                         <a:t>rand logic [13]</a:t>
                       </a:r>
-                      <a:endParaRPr lang="en-US" sz="1000">
+                      <a:endParaRPr lang="en-US" sz="1400">
                         <a:effectLst/>
                         <a:latin typeface="Calibri" panose="020F0502020204030204" pitchFamily="34" charset="0"/>
                         <a:ea typeface="Calibri" panose="020F0502020204030204" pitchFamily="34" charset="0"/>
@@ -7166,10 +8944,22 @@
                         </a:spcAft>
                       </a:pPr>
                       <a:r>
-                        <a:rPr lang="en-US" sz="1000">
+                        <a:rPr lang="en-US" sz="1400" dirty="0">
                           <a:effectLst/>
                         </a:rPr>
-                        <a:t>first_point_index &lt;= 512 - num_points;</a:t>
+                        <a:t>first_point_index &lt;= 512 - </a:t>
+                      </a:r>
+                      <a:r>
+                        <a:rPr lang="en-US" sz="1400" dirty="0" err="1">
+                          <a:effectLst/>
+                        </a:rPr>
+                        <a:t>num_points</a:t>
+                      </a:r>
+                      <a:r>
+                        <a:rPr lang="en-US" sz="1400" dirty="0">
+                          <a:effectLst/>
+                        </a:rPr>
+                        <a:t>;</a:t>
                       </a:r>
                     </a:p>
                     <a:p>
@@ -7185,12 +8975,12 @@
                         </a:spcAft>
                       </a:pPr>
                       <a:r>
-                        <a:rPr lang="en-US" sz="1000">
+                        <a:rPr lang="en-US" sz="1400" dirty="0">
                           <a:effectLst/>
                         </a:rPr>
-                        <a:t>		first_point_index &gt;=1;</a:t>
-                      </a:r>
-                      <a:endParaRPr lang="en-US" sz="1000">
+                        <a:t>first_point_index &gt;=1;</a:t>
+                      </a:r>
+                      <a:endParaRPr lang="en-US" sz="1400" dirty="0">
                         <a:effectLst/>
                         <a:latin typeface="Calibri" panose="020F0502020204030204" pitchFamily="34" charset="0"/>
                         <a:ea typeface="Calibri" panose="020F0502020204030204" pitchFamily="34" charset="0"/>
@@ -7217,12 +9007,12 @@
                         </a:spcAft>
                       </a:pPr>
                       <a:r>
-                        <a:rPr lang="en-US" sz="1000">
+                        <a:rPr lang="en-US" sz="1400" dirty="0">
                           <a:effectLst/>
                         </a:rPr>
                         <a:t>Used to randomly generate the RAM index where the first data point will be stored</a:t>
                       </a:r>
-                      <a:endParaRPr lang="en-US" sz="1000">
+                      <a:endParaRPr lang="en-US" sz="1400" dirty="0">
                         <a:effectLst/>
                         <a:latin typeface="Calibri" panose="020F0502020204030204" pitchFamily="34" charset="0"/>
                         <a:ea typeface="Calibri" panose="020F0502020204030204" pitchFamily="34" charset="0"/>
@@ -7256,12 +9046,12 @@
                         </a:spcAft>
                       </a:pPr>
                       <a:r>
-                        <a:rPr lang="en-US" sz="1000" dirty="0">
+                        <a:rPr lang="en-US" sz="1400" dirty="0">
                           <a:effectLst/>
                         </a:rPr>
                         <a:t>last_point_index</a:t>
                       </a:r>
-                      <a:endParaRPr lang="en-US" sz="1000" dirty="0">
+                      <a:endParaRPr lang="en-US" sz="1400" dirty="0">
                         <a:effectLst/>
                         <a:latin typeface="Calibri" panose="020F0502020204030204" pitchFamily="34" charset="0"/>
                         <a:ea typeface="Calibri" panose="020F0502020204030204" pitchFamily="34" charset="0"/>
@@ -7288,12 +9078,12 @@
                         </a:spcAft>
                       </a:pPr>
                       <a:r>
-                        <a:rPr lang="en-US" sz="1000">
+                        <a:rPr lang="en-US" sz="1400">
                           <a:effectLst/>
                         </a:rPr>
                         <a:t>Rand logic [13]</a:t>
                       </a:r>
-                      <a:endParaRPr lang="en-US" sz="1000">
+                      <a:endParaRPr lang="en-US" sz="1400">
                         <a:effectLst/>
                         <a:latin typeface="Calibri" panose="020F0502020204030204" pitchFamily="34" charset="0"/>
                         <a:ea typeface="Calibri" panose="020F0502020204030204" pitchFamily="34" charset="0"/>
@@ -7320,12 +9110,12 @@
                         </a:spcAft>
                       </a:pPr>
                       <a:r>
-                        <a:rPr lang="en-US" sz="1000">
+                        <a:rPr lang="en-US" sz="1400">
                           <a:effectLst/>
                         </a:rPr>
                         <a:t>last_point_index == num_points + first_point_index - 13'b1</a:t>
                       </a:r>
-                      <a:endParaRPr lang="en-US" sz="1000">
+                      <a:endParaRPr lang="en-US" sz="1400">
                         <a:effectLst/>
                         <a:latin typeface="Calibri" panose="020F0502020204030204" pitchFamily="34" charset="0"/>
                         <a:ea typeface="Calibri" panose="020F0502020204030204" pitchFamily="34" charset="0"/>
@@ -7352,12 +9142,12 @@
                         </a:spcAft>
                       </a:pPr>
                       <a:r>
-                        <a:rPr lang="en-US" sz="1000" dirty="0">
+                        <a:rPr lang="en-US" sz="1400" dirty="0">
                           <a:effectLst/>
                         </a:rPr>
                         <a:t>Used to randomly generate the RAM index where the last data point will be stored</a:t>
                       </a:r>
-                      <a:endParaRPr lang="en-US" sz="1000" dirty="0">
+                      <a:endParaRPr lang="en-US" sz="1400" dirty="0">
                         <a:effectLst/>
                         <a:latin typeface="Calibri" panose="020F0502020204030204" pitchFamily="34" charset="0"/>
                         <a:ea typeface="Calibri" panose="020F0502020204030204" pitchFamily="34" charset="0"/>
@@ -7454,7 +9244,7 @@
         <p:spPr/>
         <p:txBody>
           <a:bodyPr>
-            <a:normAutofit fontScale="85000" lnSpcReduction="10000"/>
+            <a:normAutofit fontScale="92500" lnSpcReduction="10000"/>
           </a:bodyPr>
           <a:lstStyle/>
           <a:p>
@@ -7468,7 +9258,13 @@
             </a:r>
             <a:r>
               <a:rPr lang="en-US" dirty="0"/>
-              <a:t>. It is a class is derived from the UVM built in class </a:t>
+              <a:t>. </a:t>
+            </a:r>
+          </a:p>
+          <a:p>
+            <a:r>
+              <a:rPr lang="en-US" dirty="0"/>
+              <a:t>It is a class is derived from the UVM built in class </a:t>
             </a:r>
             <a:r>
               <a:rPr lang="en-US" dirty="0" err="1"/>
@@ -7476,7 +9272,28 @@
             </a:r>
             <a:r>
               <a:rPr lang="en-US" dirty="0"/>
-              <a:t> .In this class, there is a variable called </a:t>
+              <a:t> .</a:t>
+            </a:r>
+          </a:p>
+          <a:p>
+            <a:r>
+              <a:rPr lang="en-US" dirty="0"/>
+              <a:t>In </a:t>
+            </a:r>
+            <a:r>
+              <a:rPr lang="en-US" dirty="0" err="1"/>
+              <a:t>Kmeans_in_sequence</a:t>
+            </a:r>
+            <a:r>
+              <a:rPr lang="en-US" dirty="0"/>
+              <a:t>:</a:t>
+            </a:r>
+          </a:p>
+          <a:p>
+            <a:pPr lvl="1"/>
+            <a:r>
+              <a:rPr lang="en-US" dirty="0"/>
+              <a:t>Variable called </a:t>
             </a:r>
             <a:r>
               <a:rPr lang="en-US" dirty="0" err="1"/>
@@ -7484,13 +9301,14 @@
             </a:r>
             <a:r>
               <a:rPr lang="en-US" dirty="0"/>
-              <a:t>  which is set to be the number of transactions the Testbench will produce and send, i.e. the number of actual tests performed.</a:t>
-            </a:r>
-          </a:p>
-          <a:p>
+              <a:t>  which is set to be the number of transactions the Testbench will produce and send</a:t>
+            </a:r>
+          </a:p>
+          <a:p>
+            <a:pPr lvl="1"/>
             <a:r>
               <a:rPr lang="en-US" dirty="0"/>
-              <a:t>Also in this class, in a loop which runs </a:t>
+              <a:t>a loop which runs </a:t>
             </a:r>
             <a:r>
               <a:rPr lang="en-US" dirty="0" err="1"/>
@@ -7498,13 +9316,22 @@
             </a:r>
             <a:r>
               <a:rPr lang="en-US" dirty="0"/>
-              <a:t>  times, a Kmeans_transaction is instantiated and the built-in function randomize is called in order to generate all variables which are “rand” type in the K means transaction,.</a:t>
-            </a:r>
-          </a:p>
-          <a:p>
+              <a:t>  times. Each </a:t>
+            </a:r>
+            <a:r>
+              <a:rPr lang="en-US" dirty="0" err="1"/>
+              <a:t>iteration,a</a:t>
+            </a:r>
             <a:r>
               <a:rPr lang="en-US" dirty="0"/>
-              <a:t>Also in this loop, the build in function </a:t>
+              <a:t> Kmeans_transaction is instantiated, and the function randomize is called to generate all variables which are “rand” type in the K means transaction.</a:t>
+            </a:r>
+          </a:p>
+          <a:p>
+            <a:pPr lvl="1"/>
+            <a:r>
+              <a:rPr lang="en-US" dirty="0"/>
+              <a:t>The Instantiated transaction is then sent to the driver with the function </a:t>
             </a:r>
             <a:r>
               <a:rPr lang="en-US" dirty="0" err="1"/>
@@ -7512,7 +9339,22 @@
             </a:r>
             <a:r>
               <a:rPr lang="en-US" dirty="0"/>
-              <a:t> is called with the previous instantiated   Kmeans_transaction as parameter, in order to “send" it to the driver through the sequencer. After the driver finishes using the transaction sent to it, the sequence class then calls the build in function </a:t>
+              <a:t>(</a:t>
+            </a:r>
+            <a:r>
+              <a:rPr lang="en-US" dirty="0" err="1"/>
+              <a:t>thorught</a:t>
+            </a:r>
+            <a:r>
+              <a:rPr lang="en-US" dirty="0"/>
+              <a:t> the sequencer) </a:t>
+            </a:r>
+          </a:p>
+          <a:p>
+            <a:pPr lvl="1"/>
+            <a:r>
+              <a:rPr lang="en-US" dirty="0"/>
+              <a:t>When the driver finishes the transaction , the sequence ends this transaction with the function </a:t>
             </a:r>
             <a:r>
               <a:rPr lang="en-US" dirty="0" err="1"/>
@@ -7520,7 +9362,7 @@
             </a:r>
             <a:r>
               <a:rPr lang="en-US" dirty="0"/>
-              <a:t> with the same Kmeans_transaction as parameter, in order to end this transaction.</a:t>
+              <a:t> .</a:t>
             </a:r>
           </a:p>
           <a:p>
@@ -7909,7 +9751,7 @@
         <p:spPr/>
         <p:txBody>
           <a:bodyPr>
-            <a:normAutofit fontScale="85000" lnSpcReduction="20000"/>
+            <a:normAutofit fontScale="85000" lnSpcReduction="10000"/>
           </a:bodyPr>
           <a:lstStyle/>
           <a:p>
@@ -7958,28 +9800,6 @@
           <a:p>
             <a:r>
               <a:rPr lang="en-US" dirty="0"/>
-              <a:t>This class uses the </a:t>
-            </a:r>
-            <a:r>
-              <a:rPr lang="en-US" dirty="0" err="1"/>
-              <a:t>uvm_tlm_analysis_fifo</a:t>
-            </a:r>
-            <a:r>
-              <a:rPr lang="en-US" dirty="0"/>
-              <a:t> and </a:t>
-            </a:r>
-            <a:r>
-              <a:rPr lang="en-US" dirty="0" err="1"/>
-              <a:t>uvm_analysis_export</a:t>
-            </a:r>
-            <a:r>
-              <a:rPr lang="en-US" dirty="0"/>
-              <a:t> in order to get the results from the DUT and Ref Model (the eight centroids of each of them). </a:t>
-            </a:r>
-          </a:p>
-          <a:p>
-            <a:r>
-              <a:rPr lang="en-US" dirty="0"/>
               <a:t>In is Run task, the Scoreboard class calls the function </a:t>
             </a:r>
             <a:r>
@@ -7988,7 +9808,19 @@
             </a:r>
             <a:r>
               <a:rPr lang="en-US" dirty="0"/>
-              <a:t> in order to determine if a test run failed or passed. This function determines the result by comparing the centroids od the DUT and the Ref Model, if the overall difference between all coordinates off all centroids is smaller than 16 times the value of the threshold. The pass/fail condition was derived from the functionality of the DUT and Ref Model, which consider a centroid converged if the  absolute value of the distance between it and the last iteration centroid is smaller than the threshold value. </a:t>
+              <a:t> in order to determine if a test run failed or passed. </a:t>
+            </a:r>
+          </a:p>
+          <a:p>
+            <a:r>
+              <a:rPr lang="en-US" dirty="0"/>
+              <a:t>This function determines the result by comparing the centroids od the DUT and the Ref Model, if the overall difference between all coordinates off all centroids is smaller than 16 times the value of the threshold.</a:t>
+            </a:r>
+          </a:p>
+          <a:p>
+            <a:r>
+              <a:rPr lang="en-US" dirty="0"/>
+              <a:t> The pass/fail condition was derived from the functionality of the DUT and Ref Model, which consider a centroid converged if the  absolute value of the distance between it and the last iteration centroid is smaller than the threshold value. </a:t>
             </a:r>
           </a:p>
           <a:p>
@@ -8078,31 +9910,31 @@
           <a:lstStyle/>
           <a:p>
             <a:r>
-              <a:rPr lang="en-US" dirty="0"/>
+              <a:rPr lang="en-US" sz="2200" dirty="0"/>
               <a:t>The Reference Model used to check the DUT results was written using </a:t>
             </a:r>
             <a:r>
-              <a:rPr lang="en-US" dirty="0" err="1"/>
+              <a:rPr lang="en-US" sz="2200" dirty="0" err="1"/>
               <a:t>Matlab</a:t>
             </a:r>
             <a:r>
-              <a:rPr lang="en-US" dirty="0"/>
+              <a:rPr lang="en-US" sz="2200" dirty="0"/>
               <a:t>. It is </a:t>
             </a:r>
             <a:r>
-              <a:rPr lang="en-US" dirty="0" err="1"/>
+              <a:rPr lang="en-US" sz="2200" dirty="0" err="1"/>
               <a:t>Matlab</a:t>
             </a:r>
             <a:r>
-              <a:rPr lang="en-US" dirty="0"/>
+              <a:rPr lang="en-US" sz="2200" dirty="0"/>
               <a:t> function named </a:t>
             </a:r>
             <a:r>
-              <a:rPr lang="en-US" dirty="0" err="1"/>
+              <a:rPr lang="en-US" sz="2200" dirty="0" err="1"/>
               <a:t>RefModel.m</a:t>
             </a:r>
             <a:r>
-              <a:rPr lang="en-US" dirty="0"/>
+              <a:rPr lang="en-US" sz="2200" dirty="0"/>
               <a:t>. This functions implements the K Means algorithm in software. </a:t>
             </a:r>
           </a:p>
@@ -8119,15 +9951,15 @@
               </a:spcAft>
             </a:pPr>
             <a:r>
-              <a:rPr lang="en-US" dirty="0"/>
+              <a:rPr lang="en-US" sz="2200" dirty="0"/>
               <a:t>The </a:t>
             </a:r>
             <a:r>
-              <a:rPr lang="en-US" dirty="0" err="1"/>
+              <a:rPr lang="en-US" sz="2200" dirty="0" err="1"/>
               <a:t>RefModel.m</a:t>
             </a:r>
             <a:r>
-              <a:rPr lang="en-US" dirty="0"/>
+              <a:rPr lang="en-US" sz="2200" dirty="0"/>
               <a:t> function receives five input parameters:</a:t>
             </a:r>
           </a:p>
@@ -8141,34 +9973,8 @@
               </a:spcBef>
             </a:pPr>
             <a:r>
-              <a:rPr lang="en-US" sz="1600" dirty="0">
-                <a:effectLst/>
-                <a:latin typeface="Calibri" panose="020F0502020204030204" pitchFamily="34" charset="0"/>
-                <a:ea typeface="Calibri" panose="020F0502020204030204" pitchFamily="34" charset="0"/>
-                <a:cs typeface="Arial" panose="020B0604020202020204" pitchFamily="34" charset="0"/>
-              </a:rPr>
-              <a:t>Point input matrix with 512 rows and 7 columns, where each row represent a point in the DUT numeric representation model, i.e. each row is a point with 7 dimensions, each dimension is a fixed point number with 13 bits(MSB is the sign bit, the following two bits represent the integer value and the</a:t>
-            </a:r>
-            <a:r>
-              <a:rPr lang="en-US" sz="1600" dirty="0">
-                <a:solidFill>
-                  <a:srgbClr val="FF0000"/>
-                </a:solidFill>
-                <a:effectLst/>
-                <a:latin typeface="Calibri" panose="020F0502020204030204" pitchFamily="34" charset="0"/>
-                <a:ea typeface="Calibri" panose="020F0502020204030204" pitchFamily="34" charset="0"/>
-                <a:cs typeface="Arial" panose="020B0604020202020204" pitchFamily="34" charset="0"/>
-              </a:rPr>
-              <a:t> </a:t>
-            </a:r>
-            <a:r>
-              <a:rPr lang="en-US" sz="1600" dirty="0">
-                <a:effectLst/>
-                <a:latin typeface="Calibri" panose="020F0502020204030204" pitchFamily="34" charset="0"/>
-                <a:ea typeface="Calibri" panose="020F0502020204030204" pitchFamily="34" charset="0"/>
-                <a:cs typeface="Arial" panose="020B0604020202020204" pitchFamily="34" charset="0"/>
-              </a:rPr>
-              <a:t>remaining ten bits represent the fractional part)</a:t>
+              <a:rPr lang="en-US" sz="2200" dirty="0"/>
+              <a:t>Point input matrix with 512 rows and 7 columns, where each row represent a point in the DUT numeric representation model</a:t>
             </a:r>
           </a:p>
           <a:p>
@@ -8181,12 +9987,7 @@
               </a:spcBef>
             </a:pPr>
             <a:r>
-              <a:rPr lang="en-US" sz="1600" dirty="0">
-                <a:effectLst/>
-                <a:latin typeface="Calibri" panose="020F0502020204030204" pitchFamily="34" charset="0"/>
-                <a:ea typeface="Calibri" panose="020F0502020204030204" pitchFamily="34" charset="0"/>
-                <a:cs typeface="Arial" panose="020B0604020202020204" pitchFamily="34" charset="0"/>
-              </a:rPr>
+              <a:rPr lang="en-US" sz="2200" dirty="0"/>
               <a:t>Initial centroid matrix with 8 rows and 7 columns, where each row represents an initial centroid value in the DUT numeric representation model.</a:t>
             </a:r>
           </a:p>
@@ -8200,12 +10001,7 @@
               </a:spcBef>
             </a:pPr>
             <a:r>
-              <a:rPr lang="en-US" sz="1600" dirty="0">
-                <a:effectLst/>
-                <a:latin typeface="Calibri" panose="020F0502020204030204" pitchFamily="34" charset="0"/>
-                <a:ea typeface="Calibri" panose="020F0502020204030204" pitchFamily="34" charset="0"/>
-                <a:cs typeface="Arial" panose="020B0604020202020204" pitchFamily="34" charset="0"/>
-              </a:rPr>
+              <a:rPr lang="en-US" sz="2200" dirty="0"/>
               <a:t>Input threshold value in the DUT numeric representation model</a:t>
             </a:r>
           </a:p>
@@ -8219,12 +10015,7 @@
               </a:spcBef>
             </a:pPr>
             <a:r>
-              <a:rPr lang="en-US" sz="1600" dirty="0">
-                <a:effectLst/>
-                <a:latin typeface="Calibri" panose="020F0502020204030204" pitchFamily="34" charset="0"/>
-                <a:ea typeface="Calibri" panose="020F0502020204030204" pitchFamily="34" charset="0"/>
-                <a:cs typeface="Arial" panose="020B0604020202020204" pitchFamily="34" charset="0"/>
-              </a:rPr>
+              <a:rPr lang="en-US" sz="2200" dirty="0"/>
               <a:t>First point index</a:t>
             </a:r>
           </a:p>
@@ -8241,12 +10032,7 @@
               </a:spcAft>
             </a:pPr>
             <a:r>
-              <a:rPr lang="en-US" sz="1600" dirty="0">
-                <a:effectLst/>
-                <a:latin typeface="Calibri" panose="020F0502020204030204" pitchFamily="34" charset="0"/>
-                <a:ea typeface="Calibri" panose="020F0502020204030204" pitchFamily="34" charset="0"/>
-                <a:cs typeface="Arial" panose="020B0604020202020204" pitchFamily="34" charset="0"/>
-              </a:rPr>
+              <a:rPr lang="en-US" sz="2200" dirty="0"/>
               <a:t>Last point index</a:t>
             </a:r>
           </a:p>
@@ -8341,7 +10127,9 @@
           </a:xfrm>
         </p:spPr>
         <p:txBody>
-          <a:bodyPr/>
+          <a:bodyPr>
+            <a:normAutofit fontScale="92500"/>
+          </a:bodyPr>
           <a:lstStyle/>
           <a:p>
             <a:pPr marL="0" marR="0">
@@ -8356,13 +10144,13 @@
               </a:spcAft>
             </a:pPr>
             <a:r>
-              <a:rPr lang="en-US" sz="1800" dirty="0">
+              <a:rPr lang="en-US" sz="2400" dirty="0">
                 <a:effectLst/>
                 <a:latin typeface="Calibri" panose="020F0502020204030204" pitchFamily="34" charset="0"/>
                 <a:ea typeface="Calibri" panose="020F0502020204030204" pitchFamily="34" charset="0"/>
                 <a:cs typeface="Arial" panose="020B0604020202020204" pitchFamily="34" charset="0"/>
               </a:rPr>
-              <a:t>These parameters are used in the following way: the Reference model function uses the Point input matrix as the DUT uses its RAM, it read the points values from the “First point index” till the “Last point index” into another matrix, named point matrix , which will be used to run the algorithm. </a:t>
+              <a:t>These parameters are used in the following way: the Reference model function reads the points values from the “First point index” till the “Last point index” into another matrix, named point matrix , which will be used to run the algorithm. </a:t>
             </a:r>
           </a:p>
           <a:p>
@@ -8378,7 +10166,7 @@
               </a:spcAft>
             </a:pPr>
             <a:r>
-              <a:rPr lang="en-US" sz="1800" dirty="0">
+              <a:rPr lang="en-US" sz="2400" dirty="0">
                 <a:effectLst/>
                 <a:latin typeface="Calibri" panose="020F0502020204030204" pitchFamily="34" charset="0"/>
                 <a:ea typeface="Calibri" panose="020F0502020204030204" pitchFamily="34" charset="0"/>
@@ -8387,7 +10175,7 @@
               <a:t>Then the function interactively executes the algorithm</a:t>
             </a:r>
             <a:r>
-              <a:rPr lang="en-US" sz="1800" dirty="0">
+              <a:rPr lang="en-US" sz="2400" dirty="0">
                 <a:solidFill>
                   <a:srgbClr val="FF0000"/>
                 </a:solidFill>
@@ -8399,7 +10187,7 @@
               <a:t> </a:t>
             </a:r>
             <a:r>
-              <a:rPr lang="en-US" sz="1800" dirty="0">
+              <a:rPr lang="en-US" sz="2400" dirty="0">
                 <a:effectLst/>
                 <a:latin typeface="Calibri" panose="020F0502020204030204" pitchFamily="34" charset="0"/>
                 <a:ea typeface="Calibri" panose="020F0502020204030204" pitchFamily="34" charset="0"/>
@@ -8421,7 +10209,7 @@
               </a:spcAft>
             </a:pPr>
             <a:r>
-              <a:rPr lang="en-US" sz="1800" dirty="0">
+              <a:rPr lang="en-US" sz="2400" dirty="0">
                 <a:effectLst/>
                 <a:latin typeface="Calibri" panose="020F0502020204030204" pitchFamily="34" charset="0"/>
                 <a:ea typeface="Calibri" panose="020F0502020204030204" pitchFamily="34" charset="0"/>
@@ -8460,7 +10248,7 @@
           <p:nvPr/>
         </p:nvPicPr>
         <p:blipFill>
-          <a:blip r:embed="rId2">
+          <a:blip r:embed="rId3">
             <a:extLst>
               <a:ext uri="{28A0092B-C50C-407E-A947-70E740481C1C}">
                 <a14:useLocalDpi xmlns:a14="http://schemas.microsoft.com/office/drawing/2010/main" val="0"/>
@@ -12467,7 +14255,7 @@
           <a:lstStyle/>
           <a:p>
             <a:r>
-              <a:rPr lang="en-US" sz="2000" dirty="0">
+              <a:rPr lang="en-US" dirty="0">
                 <a:effectLst/>
                 <a:latin typeface="Calibri" panose="020F0502020204030204" pitchFamily="34" charset="0"/>
                 <a:ea typeface="Calibri" panose="020F0502020204030204" pitchFamily="34" charset="0"/>
@@ -12482,7 +14270,7 @@
               <a:buAutoNum type="arabicPeriod"/>
             </a:pPr>
             <a:r>
-              <a:rPr lang="en-US" sz="2000" dirty="0">
+              <a:rPr lang="en-US" sz="2800" dirty="0">
                 <a:latin typeface="Calibri" panose="020F0502020204030204" pitchFamily="34" charset="0"/>
                 <a:cs typeface="Arial" panose="020B0604020202020204" pitchFamily="34" charset="0"/>
               </a:rPr>
@@ -12495,14 +14283,14 @@
               <a:buAutoNum type="arabicPeriod"/>
             </a:pPr>
             <a:r>
-              <a:rPr lang="en-US" sz="2000" dirty="0">
+              <a:rPr lang="en-US" sz="2800" dirty="0">
                 <a:latin typeface="Calibri" panose="020F0502020204030204" pitchFamily="34" charset="0"/>
                 <a:cs typeface="Arial" panose="020B0604020202020204" pitchFamily="34" charset="0"/>
               </a:rPr>
               <a:t>Fix 2's complement representation </a:t>
             </a:r>
             <a:r>
-              <a:rPr lang="en-US" sz="2000" dirty="0">
+              <a:rPr lang="en-US" sz="2800" dirty="0">
                 <a:effectLst/>
                 <a:latin typeface="Calibri" panose="020F0502020204030204" pitchFamily="34" charset="0"/>
                 <a:ea typeface="Calibri" panose="020F0502020204030204" pitchFamily="34" charset="0"/>
@@ -12510,7 +14298,7 @@
               </a:rPr>
               <a:t>of numbers</a:t>
             </a:r>
-            <a:endParaRPr lang="en-US" sz="2800" dirty="0"/>
+            <a:endParaRPr lang="en-US" sz="3600" dirty="0"/>
           </a:p>
         </p:txBody>
       </p:sp>
@@ -12591,7 +14379,7 @@
         <p:spPr/>
         <p:txBody>
           <a:bodyPr>
-            <a:normAutofit fontScale="85000" lnSpcReduction="10000"/>
+            <a:normAutofit fontScale="85000" lnSpcReduction="20000"/>
           </a:bodyPr>
           <a:lstStyle/>
           <a:p>
@@ -12605,13 +14393,19 @@
             </a:r>
             <a:r>
               <a:rPr lang="en-US" dirty="0"/>
-              <a:t>, the new calculated centroids of each iteration are checked for convergence by comparing them to the last iteration’s centroids values(one by one). In the case where convergence was not reached, the new centroids are used in the next iteration as the algorithm centroids.</a:t>
+              <a:t>, the new calculated centroids of each iteration are checked for convergence by comparing them to the last iteration’s centroids values. </a:t>
             </a:r>
           </a:p>
           <a:p>
             <a:r>
               <a:rPr lang="en-US" dirty="0"/>
-              <a:t>In the convergence check module, there is a sensitivity list used to take one old centroid from the 8 and compare it to the correspondingly new centroid which come as input from prior module (new means calculation block).</a:t>
+              <a:t>If convergence was not reached, the new centroids are used in the next iteration as the algorithm centroids.</a:t>
+            </a:r>
+          </a:p>
+          <a:p>
+            <a:r>
+              <a:rPr lang="en-US" dirty="0"/>
+              <a:t>In the convergence check module, there is a sensitivity list used to take one old centroid from the 8 and compare it to the correspondingly new centroid.</a:t>
             </a:r>
           </a:p>
           <a:p>
@@ -12628,7 +14422,24 @@
             </a:pPr>
             <a:r>
               <a:rPr lang="en-US" dirty="0"/>
-              <a:t> This sensitivity list did not cover the change in values of the relevant inputs for this supposedly combinatorial representation of always, the following fix was done to solve the problem:</a:t>
+              <a:t> This sensitivity list did not cover the change in values of the relevant inputs for this supposedly combinatorial representation of always.</a:t>
+            </a:r>
+          </a:p>
+          <a:p>
+            <a:pPr marL="0" marR="0">
+              <a:lnSpc>
+                <a:spcPct val="107000"/>
+              </a:lnSpc>
+              <a:spcBef>
+                <a:spcPts val="0"/>
+              </a:spcBef>
+              <a:spcAft>
+                <a:spcPts val="800"/>
+              </a:spcAft>
+            </a:pPr>
+            <a:r>
+              <a:rPr lang="en-US" dirty="0"/>
+              <a:t> The following fix was done to solve the problem:</a:t>
             </a:r>
           </a:p>
           <a:p>
@@ -12766,7 +14577,9 @@
           </a:xfrm>
         </p:spPr>
         <p:txBody>
-          <a:bodyPr/>
+          <a:bodyPr>
+            <a:normAutofit/>
+          </a:bodyPr>
           <a:lstStyle/>
           <a:p>
             <a:pPr marL="0" marR="0">
@@ -12781,13 +14594,13 @@
               </a:spcAft>
             </a:pPr>
             <a:r>
-              <a:rPr lang="en-US" sz="1800" dirty="0">
+              <a:rPr lang="en-US" sz="2400" dirty="0">
                 <a:effectLst/>
                 <a:latin typeface="Calibri" panose="020F0502020204030204" pitchFamily="34" charset="0"/>
                 <a:ea typeface="Calibri" panose="020F0502020204030204" pitchFamily="34" charset="0"/>
                 <a:cs typeface="Arial" panose="020B0604020202020204" pitchFamily="34" charset="0"/>
               </a:rPr>
-              <a:t>The controller has a signal for enabling the accumulators of the pipe3 of classification block. The signal is in charge of determining when to sample data point, which comes as input from the RAM to the classification block.</a:t>
+              <a:t>The controller has a signal for enabling the accumulators of the pipe3 of classification block. The signal determines when to sample data point, which comes as input from the RAM to the classification block.</a:t>
             </a:r>
           </a:p>
           <a:p>
@@ -12803,31 +14616,13 @@
               </a:spcAft>
             </a:pPr>
             <a:r>
-              <a:rPr lang="en-US" sz="1800" dirty="0">
+              <a:rPr lang="en-US" sz="2400" dirty="0">
                 <a:effectLst/>
                 <a:latin typeface="Calibri" panose="020F0502020204030204" pitchFamily="34" charset="0"/>
                 <a:ea typeface="Calibri" panose="020F0502020204030204" pitchFamily="34" charset="0"/>
                 <a:cs typeface="Arial" panose="020B0604020202020204" pitchFamily="34" charset="0"/>
               </a:rPr>
-              <a:t>After the last data point reached the last pipe stage, no more data should be sample by the </a:t>
-            </a:r>
-            <a:r>
-              <a:rPr lang="en-US" sz="1800" dirty="0" err="1">
-                <a:effectLst/>
-                <a:latin typeface="Calibri" panose="020F0502020204030204" pitchFamily="34" charset="0"/>
-                <a:ea typeface="Calibri" panose="020F0502020204030204" pitchFamily="34" charset="0"/>
-                <a:cs typeface="Arial" panose="020B0604020202020204" pitchFamily="34" charset="0"/>
-              </a:rPr>
-              <a:t>ccumulators</a:t>
-            </a:r>
-            <a:r>
-              <a:rPr lang="en-US" sz="1800" dirty="0">
-                <a:effectLst/>
-                <a:latin typeface="Calibri" panose="020F0502020204030204" pitchFamily="34" charset="0"/>
-                <a:ea typeface="Calibri" panose="020F0502020204030204" pitchFamily="34" charset="0"/>
-                <a:cs typeface="Arial" panose="020B0604020202020204" pitchFamily="34" charset="0"/>
-              </a:rPr>
-              <a:t>(“garbage” data may be present in the pipe) . Therefore, there is a need to pull down the enable so at that in the next state, which is "calculate new means", there would be no sampling of any more data points.</a:t>
+              <a:t>After the last data point reached the last pipe stage, no more data should be sample by the accumulators. </a:t>
             </a:r>
           </a:p>
           <a:p>
@@ -12843,20 +14638,77 @@
               </a:spcAft>
             </a:pPr>
             <a:r>
-              <a:rPr lang="en-US" sz="1800" dirty="0">
+              <a:rPr lang="en-US" sz="2400" dirty="0">
                 <a:effectLst/>
                 <a:latin typeface="Calibri" panose="020F0502020204030204" pitchFamily="34" charset="0"/>
                 <a:ea typeface="Calibri" panose="020F0502020204030204" pitchFamily="34" charset="0"/>
                 <a:cs typeface="Arial" panose="020B0604020202020204" pitchFamily="34" charset="0"/>
               </a:rPr>
-              <a:t>There was a bug which we sampled one more data point since we pulled down the signal only at the "calculate new means" state. Pulling it down one state/cycle earlier, removed the bug.</a:t>
+              <a:t>Therefore,  the enable needs to be turned off so at that in the next state, there would be no sampling of any more data points.</a:t>
+            </a:r>
+          </a:p>
+          <a:p>
+            <a:pPr marL="0" marR="0">
+              <a:lnSpc>
+                <a:spcPct val="107000"/>
+              </a:lnSpc>
+              <a:spcBef>
+                <a:spcPts val="0"/>
+              </a:spcBef>
+              <a:spcAft>
+                <a:spcPts val="800"/>
+              </a:spcAft>
+            </a:pPr>
+            <a:r>
+              <a:rPr lang="en-US" sz="2400" dirty="0">
+                <a:effectLst/>
+                <a:latin typeface="Calibri" panose="020F0502020204030204" pitchFamily="34" charset="0"/>
+                <a:ea typeface="Calibri" panose="020F0502020204030204" pitchFamily="34" charset="0"/>
+                <a:cs typeface="Arial" panose="020B0604020202020204" pitchFamily="34" charset="0"/>
+              </a:rPr>
+              <a:t>The bug was that the DUT sampled one more data point then needed. </a:t>
+            </a:r>
+            <a:endParaRPr lang="en-US" sz="2400" dirty="0">
+              <a:latin typeface="Calibri" panose="020F0502020204030204" pitchFamily="34" charset="0"/>
+              <a:ea typeface="Calibri" panose="020F0502020204030204" pitchFamily="34" charset="0"/>
+              <a:cs typeface="Arial" panose="020B0604020202020204" pitchFamily="34" charset="0"/>
+            </a:endParaRPr>
+          </a:p>
+          <a:p>
+            <a:pPr marL="0" marR="0">
+              <a:lnSpc>
+                <a:spcPct val="107000"/>
+              </a:lnSpc>
+              <a:spcBef>
+                <a:spcPts val="0"/>
+              </a:spcBef>
+              <a:spcAft>
+                <a:spcPts val="800"/>
+              </a:spcAft>
+            </a:pPr>
+            <a:r>
+              <a:rPr lang="en-US" sz="2400" dirty="0">
+                <a:latin typeface="Calibri" panose="020F0502020204030204" pitchFamily="34" charset="0"/>
+                <a:ea typeface="Calibri" panose="020F0502020204030204" pitchFamily="34" charset="0"/>
+                <a:cs typeface="Arial" panose="020B0604020202020204" pitchFamily="34" charset="0"/>
+              </a:rPr>
+              <a:t>Disabling the enable signal </a:t>
+            </a:r>
+            <a:r>
+              <a:rPr lang="en-US" sz="2400" dirty="0">
+                <a:effectLst/>
+                <a:latin typeface="Calibri" panose="020F0502020204030204" pitchFamily="34" charset="0"/>
+                <a:ea typeface="Calibri" panose="020F0502020204030204" pitchFamily="34" charset="0"/>
+                <a:cs typeface="Arial" panose="020B0604020202020204" pitchFamily="34" charset="0"/>
+              </a:rPr>
+              <a:t>one state/cycle earlier, removed the bug.</a:t>
             </a:r>
           </a:p>
           <a:p>
             <a:pPr marL="0" indent="0">
               <a:buNone/>
             </a:pPr>
-            <a:endParaRPr lang="en-US" dirty="0"/>
+            <a:endParaRPr lang="en-US" sz="3600" dirty="0"/>
           </a:p>
         </p:txBody>
       </p:sp>
@@ -13201,7 +15053,9 @@
         </p:nvSpPr>
         <p:spPr/>
         <p:txBody>
-          <a:bodyPr/>
+          <a:bodyPr>
+            <a:normAutofit/>
+          </a:bodyPr>
           <a:lstStyle/>
           <a:p>
             <a:pPr>
@@ -13235,13 +15089,30 @@
               </a:spcBef>
             </a:pPr>
             <a:r>
-              <a:rPr lang="en-US" sz="2000" dirty="0">
+              <a:rPr lang="en-US" dirty="0">
                 <a:effectLst/>
                 <a:latin typeface="Calibri" panose="020F0502020204030204" pitchFamily="34" charset="0"/>
                 <a:ea typeface="Calibri" panose="020F0502020204030204" pitchFamily="34" charset="0"/>
                 <a:cs typeface="Arial" panose="020B0604020202020204" pitchFamily="34" charset="0"/>
               </a:rPr>
-              <a:t>NUM_POINTS - This cover group samples the number of data points randomly generated for each test, to verify that all values  of this variable are uniformly distributed between 8 and 512.</a:t>
+              <a:t>NUM_POINTS - Samples the number of data , </a:t>
+            </a:r>
+            <a:r>
+              <a:rPr lang="en-US" dirty="0">
+                <a:latin typeface="Calibri" panose="020F0502020204030204" pitchFamily="34" charset="0"/>
+                <a:ea typeface="Calibri" panose="020F0502020204030204" pitchFamily="34" charset="0"/>
+                <a:cs typeface="Arial" panose="020B0604020202020204" pitchFamily="34" charset="0"/>
+              </a:rPr>
+              <a:t>to </a:t>
+            </a:r>
+            <a:r>
+              <a:rPr lang="en-US" dirty="0">
+                <a:effectLst/>
+                <a:latin typeface="Calibri" panose="020F0502020204030204" pitchFamily="34" charset="0"/>
+                <a:ea typeface="Calibri" panose="020F0502020204030204" pitchFamily="34" charset="0"/>
+                <a:cs typeface="Arial" panose="020B0604020202020204" pitchFamily="34" charset="0"/>
+              </a:rPr>
+              <a:t>verify that all values  of this variable are uniformly distributed between 8 and 512.</a:t>
             </a:r>
           </a:p>
           <a:p>
@@ -13254,13 +15125,13 @@
               </a:spcBef>
             </a:pPr>
             <a:r>
-              <a:rPr lang="en-US" sz="2000" dirty="0">
+              <a:rPr lang="en-US" dirty="0">
                 <a:effectLst/>
                 <a:latin typeface="Calibri" panose="020F0502020204030204" pitchFamily="34" charset="0"/>
                 <a:ea typeface="Calibri" panose="020F0502020204030204" pitchFamily="34" charset="0"/>
                 <a:cs typeface="Arial" panose="020B0604020202020204" pitchFamily="34" charset="0"/>
               </a:rPr>
-              <a:t>DATA_VALUE - This cover group samples the values of each one of the seven coordinates of all data points randomly generated for each test, to verify that all values  of this variable are uniformly distributed between all the possible values.</a:t>
+              <a:t>DATA_VALUE – Samples the values of each one of the seven coordinates of all data points ,to verify that all values  of this variable are uniformly distributed between all the possible values.</a:t>
             </a:r>
           </a:p>
           <a:p>
@@ -13276,17 +15147,35 @@
               </a:spcAft>
             </a:pPr>
             <a:r>
-              <a:rPr lang="en-US" sz="2000" dirty="0">
+              <a:rPr lang="en-US" dirty="0">
                 <a:effectLst/>
                 <a:latin typeface="Calibri" panose="020F0502020204030204" pitchFamily="34" charset="0"/>
                 <a:ea typeface="Calibri" panose="020F0502020204030204" pitchFamily="34" charset="0"/>
                 <a:cs typeface="Arial" panose="020B0604020202020204" pitchFamily="34" charset="0"/>
               </a:rPr>
-              <a:t>CENTX_VALUE - This cover group samples the value of each one of the seven coordinates of centroid X, randomly generated at each test, to verify that all values of this variable are uniformly distributed between all the possible values.</a:t>
-            </a:r>
-          </a:p>
-          <a:p>
-            <a:endParaRPr lang="en-US" dirty="0"/>
+              <a:t>CENTX_VALUE - Samples the value of each one of the seven coordinates of centroid </a:t>
+            </a:r>
+            <a:r>
+              <a:rPr lang="en-US" dirty="0" err="1">
+                <a:effectLst/>
+                <a:latin typeface="Calibri" panose="020F0502020204030204" pitchFamily="34" charset="0"/>
+                <a:ea typeface="Calibri" panose="020F0502020204030204" pitchFamily="34" charset="0"/>
+                <a:cs typeface="Arial" panose="020B0604020202020204" pitchFamily="34" charset="0"/>
+              </a:rPr>
+              <a:t>X,to</a:t>
+            </a:r>
+            <a:r>
+              <a:rPr lang="en-US" dirty="0">
+                <a:effectLst/>
+                <a:latin typeface="Calibri" panose="020F0502020204030204" pitchFamily="34" charset="0"/>
+                <a:ea typeface="Calibri" panose="020F0502020204030204" pitchFamily="34" charset="0"/>
+                <a:cs typeface="Arial" panose="020B0604020202020204" pitchFamily="34" charset="0"/>
+              </a:rPr>
+              <a:t> verify that all values of this variable are uniformly distributed between all the possible values.</a:t>
+            </a:r>
+          </a:p>
+          <a:p>
+            <a:endParaRPr lang="en-US" sz="3200" dirty="0"/>
           </a:p>
         </p:txBody>
       </p:sp>
@@ -13951,11 +15840,13 @@
           </a:xfrm>
         </p:spPr>
         <p:txBody>
-          <a:bodyPr/>
+          <a:bodyPr>
+            <a:normAutofit lnSpcReduction="10000"/>
+          </a:bodyPr>
           <a:lstStyle/>
           <a:p>
             <a:r>
-              <a:rPr lang="en-US" sz="1800" dirty="0">
+              <a:rPr lang="en-US" sz="2400" dirty="0">
                 <a:latin typeface="Calibri" panose="020F0502020204030204" pitchFamily="34" charset="0"/>
                 <a:ea typeface="Calibri" panose="020F0502020204030204" pitchFamily="34" charset="0"/>
                 <a:cs typeface="Arial" panose="020B0604020202020204" pitchFamily="34" charset="0"/>
@@ -13963,24 +15854,80 @@
               <a:t>T</a:t>
             </a:r>
             <a:r>
-              <a:rPr lang="en-US" sz="1800" dirty="0">
+              <a:rPr lang="en-US" sz="2400" dirty="0">
                 <a:effectLst/>
                 <a:latin typeface="Calibri" panose="020F0502020204030204" pitchFamily="34" charset="0"/>
                 <a:ea typeface="Calibri" panose="020F0502020204030204" pitchFamily="34" charset="0"/>
                 <a:cs typeface="Arial" panose="020B0604020202020204" pitchFamily="34" charset="0"/>
               </a:rPr>
-              <a:t>he built in FSM coverage has a low result due to the fact that it checks all transitions for the FSM, even the one which are not legal. Therefore, a cover group for the legal transitions was built. </a:t>
-            </a:r>
-          </a:p>
-          <a:p>
-            <a:r>
-              <a:rPr lang="en-US" sz="1800" dirty="0">
+              <a:t>he </a:t>
+            </a:r>
+            <a:r>
+              <a:rPr lang="en-US" sz="2400" dirty="0">
+                <a:latin typeface="Calibri" panose="020F0502020204030204" pitchFamily="34" charset="0"/>
+                <a:ea typeface="Calibri" panose="020F0502020204030204" pitchFamily="34" charset="0"/>
+                <a:cs typeface="Arial" panose="020B0604020202020204" pitchFamily="34" charset="0"/>
+              </a:rPr>
+              <a:t>default</a:t>
+            </a:r>
+            <a:r>
+              <a:rPr lang="en-US" sz="2400" dirty="0">
                 <a:effectLst/>
                 <a:latin typeface="Calibri" panose="020F0502020204030204" pitchFamily="34" charset="0"/>
                 <a:ea typeface="Calibri" panose="020F0502020204030204" pitchFamily="34" charset="0"/>
                 <a:cs typeface="Arial" panose="020B0604020202020204" pitchFamily="34" charset="0"/>
               </a:rPr>
-              <a:t>The FSM present in the DUT is the one inside the controller module. The cover group for the valid transitions was written according to the transitions and control signals in the following figure, which describes the K means controller FSM: </a:t>
+              <a:t> FSM coverage has a low result </a:t>
+            </a:r>
+            <a:r>
+              <a:rPr lang="en-US" sz="2400" dirty="0">
+                <a:latin typeface="Calibri" panose="020F0502020204030204" pitchFamily="34" charset="0"/>
+                <a:ea typeface="Calibri" panose="020F0502020204030204" pitchFamily="34" charset="0"/>
+                <a:cs typeface="Arial" panose="020B0604020202020204" pitchFamily="34" charset="0"/>
+              </a:rPr>
+              <a:t>because </a:t>
+            </a:r>
+            <a:r>
+              <a:rPr lang="en-US" sz="2400" dirty="0">
+                <a:effectLst/>
+                <a:latin typeface="Calibri" panose="020F0502020204030204" pitchFamily="34" charset="0"/>
+                <a:ea typeface="Calibri" panose="020F0502020204030204" pitchFamily="34" charset="0"/>
+                <a:cs typeface="Arial" panose="020B0604020202020204" pitchFamily="34" charset="0"/>
+              </a:rPr>
+              <a:t>it checks all transitions for the FSM, even the ones which are not legal. </a:t>
+            </a:r>
+          </a:p>
+          <a:p>
+            <a:r>
+              <a:rPr lang="en-US" sz="2400" dirty="0">
+                <a:effectLst/>
+                <a:latin typeface="Calibri" panose="020F0502020204030204" pitchFamily="34" charset="0"/>
+                <a:ea typeface="Calibri" panose="020F0502020204030204" pitchFamily="34" charset="0"/>
+                <a:cs typeface="Arial" panose="020B0604020202020204" pitchFamily="34" charset="0"/>
+              </a:rPr>
+              <a:t>Therefore, a cover group for the legal transitions was built. </a:t>
+            </a:r>
+          </a:p>
+          <a:p>
+            <a:r>
+              <a:rPr lang="en-US" sz="2400" dirty="0">
+                <a:effectLst/>
+                <a:latin typeface="Calibri" panose="020F0502020204030204" pitchFamily="34" charset="0"/>
+                <a:ea typeface="Calibri" panose="020F0502020204030204" pitchFamily="34" charset="0"/>
+                <a:cs typeface="Arial" panose="020B0604020202020204" pitchFamily="34" charset="0"/>
+              </a:rPr>
+              <a:t>The FSM present in the DUT is the one inside the controller module. </a:t>
+            </a:r>
+          </a:p>
+          <a:p>
+            <a:r>
+              <a:rPr lang="en-US" sz="2400" dirty="0">
+                <a:effectLst/>
+                <a:latin typeface="Calibri" panose="020F0502020204030204" pitchFamily="34" charset="0"/>
+                <a:ea typeface="Calibri" panose="020F0502020204030204" pitchFamily="34" charset="0"/>
+                <a:cs typeface="Arial" panose="020B0604020202020204" pitchFamily="34" charset="0"/>
+              </a:rPr>
+              <a:t>The cover group for the valid transitions was written according to the transitions and control signals in the following figure, which describes the K means controller FSM: </a:t>
             </a:r>
           </a:p>
           <a:p>
@@ -15364,7 +17311,12 @@
             <p:ph idx="1"/>
           </p:nvPr>
         </p:nvSpPr>
-        <p:spPr/>
+        <p:spPr>
+          <a:xfrm>
+            <a:off x="838200" y="1825625"/>
+            <a:ext cx="10515600" cy="4667250"/>
+          </a:xfrm>
+        </p:spPr>
         <p:txBody>
           <a:bodyPr>
             <a:normAutofit lnSpcReduction="10000"/>
@@ -15385,13 +17337,37 @@
               <a:buChar char=""/>
             </a:pPr>
             <a:r>
-              <a:rPr lang="en-US" sz="2000" dirty="0">
+              <a:rPr lang="en-US" sz="2400" dirty="0">
                 <a:effectLst/>
                 <a:latin typeface="Calibri" panose="020F0502020204030204" pitchFamily="34" charset="0"/>
                 <a:ea typeface="Calibri" panose="020F0502020204030204" pitchFamily="34" charset="0"/>
                 <a:cs typeface="Arial" panose="020B0604020202020204" pitchFamily="34" charset="0"/>
               </a:rPr>
-              <a:t>The tests results indicate that are still bugs in the DUT, which we were not able to find and fix. If the DUT was a commercial IP, we would advise the company to do a thorough debugging process.</a:t>
+              <a:t>The tests results indicate that are still bugs in the DUT, which we were not able to find and fix. </a:t>
+            </a:r>
+          </a:p>
+          <a:p>
+            <a:pPr marL="342900" marR="0" lvl="0" indent="-342900" rtl="0">
+              <a:lnSpc>
+                <a:spcPct val="107000"/>
+              </a:lnSpc>
+              <a:spcBef>
+                <a:spcPts val="0"/>
+              </a:spcBef>
+              <a:spcAft>
+                <a:spcPts val="0"/>
+              </a:spcAft>
+              <a:buFont typeface="Symbol" panose="05050102010706020507" pitchFamily="18" charset="2"/>
+              <a:buChar char=""/>
+            </a:pPr>
+            <a:r>
+              <a:rPr lang="en-US" sz="2400" dirty="0">
+                <a:effectLst/>
+                <a:latin typeface="Calibri" panose="020F0502020204030204" pitchFamily="34" charset="0"/>
+                <a:ea typeface="Calibri" panose="020F0502020204030204" pitchFamily="34" charset="0"/>
+                <a:cs typeface="Arial" panose="020B0604020202020204" pitchFamily="34" charset="0"/>
+              </a:rPr>
+              <a:t>The high fail rate in test line 8 indicates that there is an overflow bug when trying to fill the RAMs.</a:t>
             </a:r>
           </a:p>
           <a:p>
@@ -15409,13 +17385,13 @@
               <a:buChar char=""/>
             </a:pPr>
             <a:r>
-              <a:rPr lang="en-US" sz="2000" dirty="0">
+              <a:rPr lang="en-US" sz="2400" dirty="0">
                 <a:effectLst/>
                 <a:latin typeface="Calibri" panose="020F0502020204030204" pitchFamily="34" charset="0"/>
                 <a:ea typeface="Calibri" panose="020F0502020204030204" pitchFamily="34" charset="0"/>
                 <a:cs typeface="Arial" panose="020B0604020202020204" pitchFamily="34" charset="0"/>
               </a:rPr>
-              <a:t>The high fail rate in test line 8 indicates that there is an overflow bug when trying to fill the RAMs.</a:t>
+              <a:t>Test line 3 and 4 indicate that as the number of data points increases so does the number of fails.  This could be related to bugs such as overflow, wrong classification of close points, and/or wrong calculations.</a:t>
             </a:r>
           </a:p>
           <a:p>
@@ -15433,31 +17409,7 @@
               <a:buChar char=""/>
             </a:pPr>
             <a:r>
-              <a:rPr lang="en-US" sz="2000" dirty="0">
-                <a:effectLst/>
-                <a:latin typeface="Calibri" panose="020F0502020204030204" pitchFamily="34" charset="0"/>
-                <a:ea typeface="Calibri" panose="020F0502020204030204" pitchFamily="34" charset="0"/>
-                <a:cs typeface="Arial" panose="020B0604020202020204" pitchFamily="34" charset="0"/>
-              </a:rPr>
-              <a:t>Test line 3 and 4 indicate that as the number of data points increases so does the number of fails.  This could be related to bugs such as overflow, wrong classification of close points, and/or wrong calculations.</a:t>
-            </a:r>
-          </a:p>
-          <a:p>
-            <a:pPr marL="342900" marR="0" lvl="0" indent="-342900">
-              <a:lnSpc>
-                <a:spcPct val="107000"/>
-              </a:lnSpc>
-              <a:spcBef>
-                <a:spcPts val="0"/>
-              </a:spcBef>
-              <a:spcAft>
-                <a:spcPts val="0"/>
-              </a:spcAft>
-              <a:buFont typeface="Symbol" panose="05050102010706020507" pitchFamily="18" charset="2"/>
-              <a:buChar char=""/>
-            </a:pPr>
-            <a:r>
-              <a:rPr lang="en-US" sz="2000" dirty="0">
+              <a:rPr lang="en-US" sz="2400" dirty="0">
                 <a:effectLst/>
                 <a:latin typeface="Calibri" panose="020F0502020204030204" pitchFamily="34" charset="0"/>
                 <a:ea typeface="Calibri" panose="020F0502020204030204" pitchFamily="34" charset="0"/>
@@ -15481,7 +17433,7 @@
               <a:buChar char=""/>
             </a:pPr>
             <a:r>
-              <a:rPr lang="en-US" sz="2000" dirty="0">
+              <a:rPr lang="en-US" sz="2400" dirty="0">
                 <a:effectLst/>
                 <a:latin typeface="Calibri" panose="020F0502020204030204" pitchFamily="34" charset="0"/>
                 <a:ea typeface="Calibri" panose="020F0502020204030204" pitchFamily="34" charset="0"/>
@@ -15490,7 +17442,7 @@
               <a:t>UVM is</a:t>
             </a:r>
             <a:r>
-              <a:rPr lang="en-US" sz="2000" dirty="0">
+              <a:rPr lang="en-US" sz="2400" dirty="0">
                 <a:solidFill>
                   <a:srgbClr val="FF0000"/>
                 </a:solidFill>
@@ -15502,7 +17454,7 @@
               <a:t> </a:t>
             </a:r>
             <a:r>
-              <a:rPr lang="en-US" sz="2000" dirty="0">
+              <a:rPr lang="en-US" sz="2400" dirty="0">
                 <a:effectLst/>
                 <a:latin typeface="Calibri" panose="020F0502020204030204" pitchFamily="34" charset="0"/>
                 <a:ea typeface="Calibri" panose="020F0502020204030204" pitchFamily="34" charset="0"/>
@@ -15512,7 +17464,7 @@
             </a:r>
           </a:p>
           <a:p>
-            <a:endParaRPr lang="en-US" dirty="0"/>
+            <a:endParaRPr lang="en-US" sz="3200" dirty="0"/>
           </a:p>
         </p:txBody>
       </p:sp>

</xml_diff>

<commit_message>
little fixes done to final ptt
</commit_message>
<xml_diff>
--- a/Final presentation.pptx
+++ b/Final presentation.pptx
@@ -240,7 +240,7 @@
           <a:p>
             <a:fld id="{B2E107C9-5FE0-4864-97C4-A8FF847E0675}" type="datetimeFigureOut">
               <a:rPr lang="en-US" smtClean="0"/>
-              <a:t>12/27/2020</a:t>
+              <a:t>12/28/2020</a:t>
             </a:fld>
             <a:endParaRPr lang="en-US"/>
           </a:p>
@@ -2968,7 +2968,7 @@
           <a:p>
             <a:fld id="{CD2AB640-041E-414A-8FDF-E33E6A90A0DD}" type="datetimeFigureOut">
               <a:rPr lang="en-US" smtClean="0"/>
-              <a:t>12/27/2020</a:t>
+              <a:t>12/28/2020</a:t>
             </a:fld>
             <a:endParaRPr lang="en-US"/>
           </a:p>
@@ -3166,7 +3166,7 @@
           <a:p>
             <a:fld id="{CD2AB640-041E-414A-8FDF-E33E6A90A0DD}" type="datetimeFigureOut">
               <a:rPr lang="en-US" smtClean="0"/>
-              <a:t>12/27/2020</a:t>
+              <a:t>12/28/2020</a:t>
             </a:fld>
             <a:endParaRPr lang="en-US"/>
           </a:p>
@@ -3374,7 +3374,7 @@
           <a:p>
             <a:fld id="{CD2AB640-041E-414A-8FDF-E33E6A90A0DD}" type="datetimeFigureOut">
               <a:rPr lang="en-US" smtClean="0"/>
-              <a:t>12/27/2020</a:t>
+              <a:t>12/28/2020</a:t>
             </a:fld>
             <a:endParaRPr lang="en-US"/>
           </a:p>
@@ -3572,7 +3572,7 @@
           <a:p>
             <a:fld id="{CD2AB640-041E-414A-8FDF-E33E6A90A0DD}" type="datetimeFigureOut">
               <a:rPr lang="en-US" smtClean="0"/>
-              <a:t>12/27/2020</a:t>
+              <a:t>12/28/2020</a:t>
             </a:fld>
             <a:endParaRPr lang="en-US"/>
           </a:p>
@@ -3847,7 +3847,7 @@
           <a:p>
             <a:fld id="{CD2AB640-041E-414A-8FDF-E33E6A90A0DD}" type="datetimeFigureOut">
               <a:rPr lang="en-US" smtClean="0"/>
-              <a:t>12/27/2020</a:t>
+              <a:t>12/28/2020</a:t>
             </a:fld>
             <a:endParaRPr lang="en-US"/>
           </a:p>
@@ -4112,7 +4112,7 @@
           <a:p>
             <a:fld id="{CD2AB640-041E-414A-8FDF-E33E6A90A0DD}" type="datetimeFigureOut">
               <a:rPr lang="en-US" smtClean="0"/>
-              <a:t>12/27/2020</a:t>
+              <a:t>12/28/2020</a:t>
             </a:fld>
             <a:endParaRPr lang="en-US"/>
           </a:p>
@@ -4524,7 +4524,7 @@
           <a:p>
             <a:fld id="{CD2AB640-041E-414A-8FDF-E33E6A90A0DD}" type="datetimeFigureOut">
               <a:rPr lang="en-US" smtClean="0"/>
-              <a:t>12/27/2020</a:t>
+              <a:t>12/28/2020</a:t>
             </a:fld>
             <a:endParaRPr lang="en-US"/>
           </a:p>
@@ -4665,7 +4665,7 @@
           <a:p>
             <a:fld id="{CD2AB640-041E-414A-8FDF-E33E6A90A0DD}" type="datetimeFigureOut">
               <a:rPr lang="en-US" smtClean="0"/>
-              <a:t>12/27/2020</a:t>
+              <a:t>12/28/2020</a:t>
             </a:fld>
             <a:endParaRPr lang="en-US"/>
           </a:p>
@@ -4778,7 +4778,7 @@
           <a:p>
             <a:fld id="{CD2AB640-041E-414A-8FDF-E33E6A90A0DD}" type="datetimeFigureOut">
               <a:rPr lang="en-US" smtClean="0"/>
-              <a:t>12/27/2020</a:t>
+              <a:t>12/28/2020</a:t>
             </a:fld>
             <a:endParaRPr lang="en-US"/>
           </a:p>
@@ -5089,7 +5089,7 @@
           <a:p>
             <a:fld id="{CD2AB640-041E-414A-8FDF-E33E6A90A0DD}" type="datetimeFigureOut">
               <a:rPr lang="en-US" smtClean="0"/>
-              <a:t>12/27/2020</a:t>
+              <a:t>12/28/2020</a:t>
             </a:fld>
             <a:endParaRPr lang="en-US"/>
           </a:p>
@@ -5377,7 +5377,7 @@
           <a:p>
             <a:fld id="{CD2AB640-041E-414A-8FDF-E33E6A90A0DD}" type="datetimeFigureOut">
               <a:rPr lang="en-US" smtClean="0"/>
-              <a:t>12/27/2020</a:t>
+              <a:t>12/28/2020</a:t>
             </a:fld>
             <a:endParaRPr lang="en-US"/>
           </a:p>
@@ -5618,7 +5618,7 @@
           <a:p>
             <a:fld id="{CD2AB640-041E-414A-8FDF-E33E6A90A0DD}" type="datetimeFigureOut">
               <a:rPr lang="en-US" smtClean="0"/>
-              <a:t>12/27/2020</a:t>
+              <a:t>12/28/2020</a:t>
             </a:fld>
             <a:endParaRPr lang="en-US"/>
           </a:p>
@@ -6100,7 +6100,7 @@
           <a:p>
             <a:r>
               <a:rPr lang="en-US" dirty="0"/>
-              <a:t>Edi </a:t>
+              <a:t>Eddy </a:t>
             </a:r>
             <a:r>
               <a:rPr lang="en-US" dirty="0" err="1"/>
@@ -7370,8 +7370,8 @@
           </a:p>
         </p:txBody>
       </p:sp>
-      <mc:AlternateContent xmlns:mc="http://schemas.openxmlformats.org/markup-compatibility/2006">
-        <mc:Choice xmlns:a14="http://schemas.microsoft.com/office/drawing/2010/main" Requires="a14">
+      <mc:AlternateContent xmlns:mc="http://schemas.openxmlformats.org/markup-compatibility/2006" xmlns:a14="http://schemas.microsoft.com/office/drawing/2010/main">
+        <mc:Choice Requires="a14">
           <p:sp>
             <p:nvSpPr>
               <p:cNvPr id="3" name="Content Placeholder 2">
@@ -7661,7 +7661,7 @@
             </p:txBody>
           </p:sp>
         </mc:Choice>
-        <mc:Fallback>
+        <mc:Fallback xmlns="">
           <p:sp>
             <p:nvSpPr>
               <p:cNvPr id="3" name="Content Placeholder 2">
@@ -9502,13 +9502,8 @@
           <a:p>
             <a:r>
               <a:rPr lang="en-US" dirty="0"/>
-              <a:t>Summary and </a:t>
-            </a:r>
-            <a:r>
-              <a:rPr lang="en-US" dirty="0" err="1"/>
-              <a:t>Concluion</a:t>
-            </a:r>
-            <a:endParaRPr lang="en-US" dirty="0"/>
+              <a:t>Summary and Conclusion</a:t>
+            </a:r>
           </a:p>
         </p:txBody>
       </p:sp>

</xml_diff>

<commit_message>
little canges to final ptt 2
</commit_message>
<xml_diff>
--- a/Final presentation.pptx
+++ b/Final presentation.pptx
@@ -240,7 +240,7 @@
           <a:p>
             <a:fld id="{B2E107C9-5FE0-4864-97C4-A8FF847E0675}" type="datetimeFigureOut">
               <a:rPr lang="en-US" smtClean="0"/>
-              <a:t>12/28/2020</a:t>
+              <a:t>12/29/2020</a:t>
             </a:fld>
             <a:endParaRPr lang="en-US"/>
           </a:p>
@@ -2968,7 +2968,7 @@
           <a:p>
             <a:fld id="{CD2AB640-041E-414A-8FDF-E33E6A90A0DD}" type="datetimeFigureOut">
               <a:rPr lang="en-US" smtClean="0"/>
-              <a:t>12/28/2020</a:t>
+              <a:t>12/29/2020</a:t>
             </a:fld>
             <a:endParaRPr lang="en-US"/>
           </a:p>
@@ -3166,7 +3166,7 @@
           <a:p>
             <a:fld id="{CD2AB640-041E-414A-8FDF-E33E6A90A0DD}" type="datetimeFigureOut">
               <a:rPr lang="en-US" smtClean="0"/>
-              <a:t>12/28/2020</a:t>
+              <a:t>12/29/2020</a:t>
             </a:fld>
             <a:endParaRPr lang="en-US"/>
           </a:p>
@@ -3374,7 +3374,7 @@
           <a:p>
             <a:fld id="{CD2AB640-041E-414A-8FDF-E33E6A90A0DD}" type="datetimeFigureOut">
               <a:rPr lang="en-US" smtClean="0"/>
-              <a:t>12/28/2020</a:t>
+              <a:t>12/29/2020</a:t>
             </a:fld>
             <a:endParaRPr lang="en-US"/>
           </a:p>
@@ -3572,7 +3572,7 @@
           <a:p>
             <a:fld id="{CD2AB640-041E-414A-8FDF-E33E6A90A0DD}" type="datetimeFigureOut">
               <a:rPr lang="en-US" smtClean="0"/>
-              <a:t>12/28/2020</a:t>
+              <a:t>12/29/2020</a:t>
             </a:fld>
             <a:endParaRPr lang="en-US"/>
           </a:p>
@@ -3847,7 +3847,7 @@
           <a:p>
             <a:fld id="{CD2AB640-041E-414A-8FDF-E33E6A90A0DD}" type="datetimeFigureOut">
               <a:rPr lang="en-US" smtClean="0"/>
-              <a:t>12/28/2020</a:t>
+              <a:t>12/29/2020</a:t>
             </a:fld>
             <a:endParaRPr lang="en-US"/>
           </a:p>
@@ -4112,7 +4112,7 @@
           <a:p>
             <a:fld id="{CD2AB640-041E-414A-8FDF-E33E6A90A0DD}" type="datetimeFigureOut">
               <a:rPr lang="en-US" smtClean="0"/>
-              <a:t>12/28/2020</a:t>
+              <a:t>12/29/2020</a:t>
             </a:fld>
             <a:endParaRPr lang="en-US"/>
           </a:p>
@@ -4524,7 +4524,7 @@
           <a:p>
             <a:fld id="{CD2AB640-041E-414A-8FDF-E33E6A90A0DD}" type="datetimeFigureOut">
               <a:rPr lang="en-US" smtClean="0"/>
-              <a:t>12/28/2020</a:t>
+              <a:t>12/29/2020</a:t>
             </a:fld>
             <a:endParaRPr lang="en-US"/>
           </a:p>
@@ -4665,7 +4665,7 @@
           <a:p>
             <a:fld id="{CD2AB640-041E-414A-8FDF-E33E6A90A0DD}" type="datetimeFigureOut">
               <a:rPr lang="en-US" smtClean="0"/>
-              <a:t>12/28/2020</a:t>
+              <a:t>12/29/2020</a:t>
             </a:fld>
             <a:endParaRPr lang="en-US"/>
           </a:p>
@@ -4778,7 +4778,7 @@
           <a:p>
             <a:fld id="{CD2AB640-041E-414A-8FDF-E33E6A90A0DD}" type="datetimeFigureOut">
               <a:rPr lang="en-US" smtClean="0"/>
-              <a:t>12/28/2020</a:t>
+              <a:t>12/29/2020</a:t>
             </a:fld>
             <a:endParaRPr lang="en-US"/>
           </a:p>
@@ -5089,7 +5089,7 @@
           <a:p>
             <a:fld id="{CD2AB640-041E-414A-8FDF-E33E6A90A0DD}" type="datetimeFigureOut">
               <a:rPr lang="en-US" smtClean="0"/>
-              <a:t>12/28/2020</a:t>
+              <a:t>12/29/2020</a:t>
             </a:fld>
             <a:endParaRPr lang="en-US"/>
           </a:p>
@@ -5377,7 +5377,7 @@
           <a:p>
             <a:fld id="{CD2AB640-041E-414A-8FDF-E33E6A90A0DD}" type="datetimeFigureOut">
               <a:rPr lang="en-US" smtClean="0"/>
-              <a:t>12/28/2020</a:t>
+              <a:t>12/29/2020</a:t>
             </a:fld>
             <a:endParaRPr lang="en-US"/>
           </a:p>
@@ -5618,7 +5618,7 @@
           <a:p>
             <a:fld id="{CD2AB640-041E-414A-8FDF-E33E6A90A0DD}" type="datetimeFigureOut">
               <a:rPr lang="en-US" smtClean="0"/>
-              <a:t>12/28/2020</a:t>
+              <a:t>12/29/2020</a:t>
             </a:fld>
             <a:endParaRPr lang="en-US"/>
           </a:p>
@@ -15721,7 +15721,7 @@
                 <a:ea typeface="Calibri" panose="020F0502020204030204" pitchFamily="34" charset="0"/>
                 <a:cs typeface="Arial" panose="020B0604020202020204" pitchFamily="34" charset="0"/>
               </a:rPr>
-              <a:t>Every verification environment has similar components like drivers, monitors, stimulus generators and scoreboards. </a:t>
+              <a:t>Every verification environment has similar components like drivers, monitors, transactions and scoreboards. </a:t>
             </a:r>
           </a:p>
           <a:p>
@@ -17956,6 +17956,34 @@
           </a:p>
         </p:txBody>
       </p:sp>
+      <p:pic>
+        <p:nvPicPr>
+          <p:cNvPr id="4" name="Picture 3">
+            <a:extLst>
+              <a:ext uri="{FF2B5EF4-FFF2-40B4-BE49-F238E27FC236}">
+                <a16:creationId xmlns:a16="http://schemas.microsoft.com/office/drawing/2014/main" id="{B27F57BF-567F-4D73-8A90-1A1769932671}"/>
+              </a:ext>
+            </a:extLst>
+          </p:cNvPr>
+          <p:cNvPicPr/>
+          <p:nvPr/>
+        </p:nvPicPr>
+        <p:blipFill>
+          <a:blip r:embed="rId3"/>
+          <a:stretch>
+            <a:fillRect/>
+          </a:stretch>
+        </p:blipFill>
+        <p:spPr>
+          <a:xfrm>
+            <a:off x="8606118" y="365125"/>
+            <a:ext cx="3299012" cy="1855976"/>
+          </a:xfrm>
+          <a:prstGeom prst="rect">
+            <a:avLst/>
+          </a:prstGeom>
+        </p:spPr>
+      </p:pic>
     </p:spTree>
     <p:extLst>
       <p:ext uri="{BB962C8B-B14F-4D97-AF65-F5344CB8AC3E}">

</xml_diff>